<commit_message>
[!] zmeny v preznetacii, zmena packu pre brozuru
</commit_message>
<xml_diff>
--- a/Dokumentacie/Ostatne/Prezentacie/LS/Tim10-final_prezentacia.pptx
+++ b/Dokumentacie/Ostatne/Prezentacie/LS/Tim10-final_prezentacia.pptx
@@ -6,7 +6,7 @@
     <p:sldMasterId id="2147483660" r:id="rId2"/>
   </p:sldMasterIdLst>
   <p:notesMasterIdLst>
-    <p:notesMasterId r:id="rId17"/>
+    <p:notesMasterId r:id="rId18"/>
   </p:notesMasterIdLst>
   <p:sldIdLst>
     <p:sldId id="256" r:id="rId3"/>
@@ -16,13 +16,14 @@
     <p:sldId id="271" r:id="rId7"/>
     <p:sldId id="259" r:id="rId8"/>
     <p:sldId id="265" r:id="rId9"/>
-    <p:sldId id="270" r:id="rId10"/>
-    <p:sldId id="261" r:id="rId11"/>
-    <p:sldId id="264" r:id="rId12"/>
-    <p:sldId id="266" r:id="rId13"/>
-    <p:sldId id="258" r:id="rId14"/>
-    <p:sldId id="262" r:id="rId15"/>
-    <p:sldId id="263" r:id="rId16"/>
+    <p:sldId id="274" r:id="rId10"/>
+    <p:sldId id="270" r:id="rId11"/>
+    <p:sldId id="261" r:id="rId12"/>
+    <p:sldId id="264" r:id="rId13"/>
+    <p:sldId id="266" r:id="rId14"/>
+    <p:sldId id="258" r:id="rId15"/>
+    <p:sldId id="262" r:id="rId16"/>
+    <p:sldId id="263" r:id="rId17"/>
   </p:sldIdLst>
   <p:sldSz cx="9144000" cy="5143500" type="screen16x9"/>
   <p:notesSz cx="6858000" cy="9144000"/>
@@ -641,14 +642,41 @@
           <a:p>
             <a:pPr>
               <a:buFont typeface="Arial" pitchFamily="34" charset="0"/>
-              <a:buChar char="•"/>
+              <a:buNone/>
             </a:pPr>
             <a:r>
               <a:rPr lang="sk-SK" sz="1200" dirty="0" smtClean="0">
                 <a:latin typeface="Arial" pitchFamily="34" charset="0"/>
                 <a:cs typeface="Arial" pitchFamily="34" charset="0"/>
               </a:rPr>
-              <a:t>Modernejšie používateľské prostredie</a:t>
+              <a:t> -Optimalizovať funkcionality pre rýchlejšiu a príjemnejšiu prácu v editore</a:t>
+            </a:r>
+          </a:p>
+          <a:p>
+            <a:pPr>
+              <a:buFont typeface="Arial" pitchFamily="34" charset="0"/>
+              <a:buNone/>
+            </a:pPr>
+            <a:r>
+              <a:rPr lang="sk-SK" sz="1200" dirty="0" smtClean="0">
+                <a:latin typeface="Arial" pitchFamily="34" charset="0"/>
+                <a:cs typeface="Arial" pitchFamily="34" charset="0"/>
+              </a:rPr>
+              <a:t>-Vylepšiť analýzu zdrojového kódu pre rôzne jazyky (</a:t>
+            </a:r>
+            <a:r>
+              <a:rPr lang="sk-SK" sz="1200" dirty="0" err="1" smtClean="0">
+                <a:latin typeface="Arial" pitchFamily="34" charset="0"/>
+                <a:cs typeface="Arial" pitchFamily="34" charset="0"/>
+              </a:rPr>
+              <a:t>Java</a:t>
+            </a:r>
+            <a:r>
+              <a:rPr lang="sk-SK" sz="1200" dirty="0" smtClean="0">
+                <a:latin typeface="Arial" pitchFamily="34" charset="0"/>
+                <a:cs typeface="Arial" pitchFamily="34" charset="0"/>
+              </a:rPr>
+              <a:t>, C#, HTML, PHP a pod.)</a:t>
             </a:r>
           </a:p>
           <a:p>
@@ -656,123 +684,19 @@
               <a:buFont typeface="Arial" pitchFamily="34" charset="0"/>
               <a:buChar char="•"/>
             </a:pPr>
-            <a:endParaRPr lang="sk-SK" sz="1100" dirty="0" smtClean="0">
-              <a:latin typeface="Arial" pitchFamily="34" charset="0"/>
-              <a:cs typeface="Arial" pitchFamily="34" charset="0"/>
-            </a:endParaRPr>
-          </a:p>
-          <a:p>
-            <a:pPr>
-              <a:buFont typeface="Arial" pitchFamily="34" charset="0"/>
-              <a:buChar char="•"/>
-            </a:pPr>
             <a:r>
               <a:rPr lang="sk-SK" sz="1200" dirty="0" smtClean="0">
                 <a:latin typeface="Arial" pitchFamily="34" charset="0"/>
                 <a:cs typeface="Arial" pitchFamily="34" charset="0"/>
               </a:rPr>
-              <a:t> Práca s editorom založená na dvoch módoch (textový a grafický)</a:t>
-            </a:r>
-          </a:p>
-          <a:p>
-            <a:endParaRPr lang="sk-SK" sz="1100" dirty="0" smtClean="0">
-              <a:latin typeface="Arial" pitchFamily="34" charset="0"/>
-              <a:cs typeface="Arial" pitchFamily="34" charset="0"/>
-            </a:endParaRPr>
-          </a:p>
-          <a:p>
-            <a:pPr>
-              <a:buFont typeface="Arial" pitchFamily="34" charset="0"/>
-              <a:buChar char="•"/>
-            </a:pPr>
-            <a:r>
-              <a:rPr lang="sk-SK" sz="1200" dirty="0" smtClean="0">
-                <a:latin typeface="Arial" pitchFamily="34" charset="0"/>
-                <a:cs typeface="Arial" pitchFamily="34" charset="0"/>
-              </a:rPr>
-              <a:t> Prenesenie spracovania AST stromu na stranu </a:t>
+              <a:t>  Rozšíriť vstávajúcu funkcionalitu editora (Vyhľadávanie, </a:t>
             </a:r>
             <a:r>
               <a:rPr lang="sk-SK" sz="1200" dirty="0" err="1" smtClean="0">
                 <a:latin typeface="Arial" pitchFamily="34" charset="0"/>
                 <a:cs typeface="Arial" pitchFamily="34" charset="0"/>
               </a:rPr>
-              <a:t>Lua</a:t>
-            </a:r>
-            <a:endParaRPr lang="sk-SK" sz="1200" dirty="0" smtClean="0">
-              <a:latin typeface="Arial" pitchFamily="34" charset="0"/>
-              <a:cs typeface="Arial" pitchFamily="34" charset="0"/>
-            </a:endParaRPr>
-          </a:p>
-          <a:p>
-            <a:endParaRPr lang="sk-SK" sz="1200" dirty="0" smtClean="0">
-              <a:latin typeface="Arial" pitchFamily="34" charset="0"/>
-              <a:cs typeface="Arial" pitchFamily="34" charset="0"/>
-            </a:endParaRPr>
-          </a:p>
-          <a:p>
-            <a:pPr>
-              <a:buFont typeface="Arial" pitchFamily="34" charset="0"/>
-              <a:buChar char="•"/>
-            </a:pPr>
-            <a:r>
-              <a:rPr lang="sk-SK" sz="1200" dirty="0" smtClean="0">
-                <a:latin typeface="Arial" pitchFamily="34" charset="0"/>
-                <a:cs typeface="Arial" pitchFamily="34" charset="0"/>
-              </a:rPr>
-              <a:t> Doplnenie editora o ďalšie špecifikované funkcionality</a:t>
-            </a:r>
-            <a:endParaRPr lang="sk-SK" sz="2000" dirty="0" smtClean="0">
-              <a:latin typeface="Arial" pitchFamily="34" charset="0"/>
-              <a:cs typeface="Arial" pitchFamily="34" charset="0"/>
-            </a:endParaRPr>
-          </a:p>
-          <a:p>
-            <a:pPr>
-              <a:lnSpc>
-                <a:spcPct val="200000"/>
-              </a:lnSpc>
-              <a:buFont typeface="Arial" pitchFamily="34" charset="0"/>
-              <a:buChar char="•"/>
-              <a:defRPr/>
-            </a:pPr>
-            <a:endParaRPr lang="sk-SK" sz="1200" kern="0" dirty="0" smtClean="0">
-              <a:ln w="18415" cmpd="sng">
-                <a:noFill/>
-                <a:prstDash val="solid"/>
-              </a:ln>
-              <a:solidFill>
-                <a:srgbClr val="FFFFFF"/>
-              </a:solidFill>
-              <a:effectLst>
-                <a:outerShdw blurRad="50800" dist="38100" dir="2700000" algn="tl" rotWithShape="0">
-                  <a:prstClr val="black">
-                    <a:alpha val="40000"/>
-                  </a:prstClr>
-                </a:outerShdw>
-              </a:effectLst>
-              <a:latin typeface="Times New Roman" pitchFamily="18" charset="0"/>
-              <a:cs typeface="Times New Roman" pitchFamily="18" charset="0"/>
-            </a:endParaRPr>
-          </a:p>
-          <a:p>
-            <a:pPr>
-              <a:buFont typeface="Arial" pitchFamily="34" charset="0"/>
-              <a:buChar char="•"/>
-            </a:pPr>
-            <a:r>
-              <a:rPr lang="sk-SK" sz="1200" dirty="0" smtClean="0">
-                <a:latin typeface="Arial" pitchFamily="34" charset="0"/>
-                <a:cs typeface="Arial" pitchFamily="34" charset="0"/>
-              </a:rPr>
-              <a:t> Zabudovanie pokročilej práce s textom – </a:t>
-            </a:r>
-            <a:r>
-              <a:rPr lang="sk-SK" sz="1200" dirty="0" err="1" smtClean="0">
-                <a:latin typeface="Arial" pitchFamily="34" charset="0"/>
-                <a:cs typeface="Arial" pitchFamily="34" charset="0"/>
-              </a:rPr>
-              <a:t>Undo</a:t>
+              <a:t>IntelliSense</a:t>
             </a:r>
             <a:r>
               <a:rPr lang="sk-SK" sz="1200" dirty="0" smtClean="0">
@@ -786,310 +710,145 @@
                 <a:latin typeface="Arial" pitchFamily="34" charset="0"/>
                 <a:cs typeface="Arial" pitchFamily="34" charset="0"/>
               </a:rPr>
-              <a:t>Redo</a:t>
+              <a:t>Plug-in</a:t>
             </a:r>
             <a:r>
               <a:rPr lang="sk-SK" sz="1200" dirty="0" smtClean="0">
                 <a:latin typeface="Arial" pitchFamily="34" charset="0"/>
                 <a:cs typeface="Arial" pitchFamily="34" charset="0"/>
               </a:rPr>
-              <a:t>, </a:t>
+              <a:t>, CVS)</a:t>
+            </a:r>
+          </a:p>
+          <a:p>
+            <a:pPr>
+              <a:buFont typeface="Arial" pitchFamily="34" charset="0"/>
+              <a:buChar char="•"/>
+            </a:pPr>
+            <a:r>
+              <a:rPr lang="sk-SK" sz="1200" dirty="0" smtClean="0">
+                <a:latin typeface="Arial" pitchFamily="34" charset="0"/>
+                <a:cs typeface="Arial" pitchFamily="34" charset="0"/>
+              </a:rPr>
+              <a:t>  Vizualizácia softvérových metrík (</a:t>
             </a:r>
             <a:r>
               <a:rPr lang="sk-SK" sz="1200" dirty="0" err="1" smtClean="0">
                 <a:latin typeface="Arial" pitchFamily="34" charset="0"/>
                 <a:cs typeface="Arial" pitchFamily="34" charset="0"/>
               </a:rPr>
-              <a:t>Copy</a:t>
+              <a:t>Cyklomatická</a:t>
             </a:r>
             <a:r>
               <a:rPr lang="sk-SK" sz="1200" dirty="0" smtClean="0">
                 <a:latin typeface="Arial" pitchFamily="34" charset="0"/>
                 <a:cs typeface="Arial" pitchFamily="34" charset="0"/>
               </a:rPr>
-              <a:t>/Paste </a:t>
-            </a:r>
-            <a:r>
-              <a:rPr lang="sk-SK" sz="1200" dirty="0" err="1" smtClean="0">
+              <a:t> zložitosť, CK metriky a pod.)  </a:t>
+            </a:r>
+            <a:endParaRPr lang="sk-SK" dirty="0" smtClean="0">
+              <a:latin typeface="Arial" pitchFamily="34" charset="0"/>
+              <a:cs typeface="Arial" pitchFamily="34" charset="0"/>
+            </a:endParaRPr>
+          </a:p>
+          <a:p>
+            <a:endParaRPr lang="sk-SK" dirty="0" smtClean="0">
+              <a:latin typeface="Arial" pitchFamily="34" charset="0"/>
+              <a:cs typeface="Arial" pitchFamily="34" charset="0"/>
+            </a:endParaRPr>
+          </a:p>
+          <a:p>
+            <a:r>
+              <a:rPr lang="sk-SK" dirty="0" smtClean="0">
                 <a:latin typeface="Arial" pitchFamily="34" charset="0"/>
                 <a:cs typeface="Arial" pitchFamily="34" charset="0"/>
               </a:rPr>
-              <a:t>etc</a:t>
-            </a:r>
+              <a:t>ale by oslovil širšie spektrum vývojárov, ktorí by sa aj zapojili do ďalšieho vývoja editora </a:t>
+            </a:r>
+          </a:p>
+          <a:p>
             <a:r>
               <a:rPr lang="sk-SK" sz="1200" dirty="0" smtClean="0">
                 <a:latin typeface="Arial" pitchFamily="34" charset="0"/>
                 <a:cs typeface="Arial" pitchFamily="34" charset="0"/>
               </a:rPr>
-              <a:t>.</a:t>
-            </a:r>
-          </a:p>
-          <a:p>
-            <a:pPr>
-              <a:buFont typeface="Arial" pitchFamily="34" charset="0"/>
-              <a:buChar char="•"/>
-            </a:pPr>
-            <a:endParaRPr lang="sk-SK" sz="1100" dirty="0" smtClean="0">
+              <a:t>Paralelizovanie výpočtovo náročných operácií - </a:t>
+            </a:r>
+            <a:r>
+              <a:rPr lang="pl-PL" sz="1200" dirty="0" smtClean="0">
+                <a:latin typeface="Arial" pitchFamily="34" charset="0"/>
+                <a:cs typeface="Arial" pitchFamily="34" charset="0"/>
+              </a:rPr>
+              <a:t>spracovanie syntaktickej analýzy na pozadí</a:t>
+            </a:r>
+            <a:endParaRPr lang="sk-SK" dirty="0" smtClean="0">
               <a:latin typeface="Arial" pitchFamily="34" charset="0"/>
               <a:cs typeface="Arial" pitchFamily="34" charset="0"/>
             </a:endParaRPr>
           </a:p>
           <a:p>
-            <a:pPr>
-              <a:buFont typeface="Arial" pitchFamily="34" charset="0"/>
-              <a:buChar char="•"/>
-            </a:pPr>
-            <a:r>
-              <a:rPr lang="sk-SK" sz="1200" dirty="0" smtClean="0">
-                <a:latin typeface="Arial" pitchFamily="34" charset="0"/>
-                <a:cs typeface="Arial" pitchFamily="34" charset="0"/>
-              </a:rPr>
-              <a:t> Zabudovanie a vytvorenie vlastných </a:t>
-            </a:r>
-            <a:r>
-              <a:rPr lang="sk-SK" sz="1200" dirty="0" err="1" smtClean="0">
-                <a:latin typeface="Arial" pitchFamily="34" charset="0"/>
-                <a:cs typeface="Arial" pitchFamily="34" charset="0"/>
-              </a:rPr>
-              <a:t>Shortcuts</a:t>
-            </a:r>
-            <a:endParaRPr lang="sk-SK" sz="1200" dirty="0" smtClean="0">
+            <a:endParaRPr lang="sk-SK" dirty="0" smtClean="0">
               <a:latin typeface="Arial" pitchFamily="34" charset="0"/>
               <a:cs typeface="Arial" pitchFamily="34" charset="0"/>
             </a:endParaRPr>
           </a:p>
           <a:p>
-            <a:pPr>
-              <a:lnSpc>
-                <a:spcPct val="200000"/>
-              </a:lnSpc>
-              <a:buFont typeface="Arial" pitchFamily="34" charset="0"/>
-              <a:buChar char="•"/>
-              <a:defRPr/>
-            </a:pPr>
-            <a:endParaRPr lang="sk-SK" sz="1200" kern="0" dirty="0" smtClean="0">
-              <a:ln w="18415" cmpd="sng">
-                <a:noFill/>
-                <a:prstDash val="solid"/>
-              </a:ln>
-              <a:solidFill>
-                <a:srgbClr val="FFFFFF"/>
-              </a:solidFill>
-              <a:effectLst>
-                <a:outerShdw blurRad="50800" dist="38100" dir="2700000" algn="tl" rotWithShape="0">
-                  <a:prstClr val="black">
-                    <a:alpha val="40000"/>
-                  </a:prstClr>
-                </a:outerShdw>
-              </a:effectLst>
-              <a:latin typeface="Times New Roman" pitchFamily="18" charset="0"/>
-              <a:cs typeface="Times New Roman" pitchFamily="18" charset="0"/>
-            </a:endParaRPr>
-          </a:p>
-          <a:p>
-            <a:pPr>
-              <a:lnSpc>
-                <a:spcPct val="200000"/>
-              </a:lnSpc>
-              <a:buFont typeface="Arial" pitchFamily="34" charset="0"/>
-              <a:buChar char="•"/>
-              <a:defRPr/>
-            </a:pPr>
-            <a:endParaRPr lang="sk-SK" sz="1200" kern="0" dirty="0" smtClean="0">
-              <a:ln w="18415" cmpd="sng">
-                <a:noFill/>
-                <a:prstDash val="solid"/>
-              </a:ln>
-              <a:solidFill>
-                <a:srgbClr val="FFFFFF"/>
-              </a:solidFill>
-              <a:effectLst>
-                <a:outerShdw blurRad="50800" dist="38100" dir="2700000" algn="tl" rotWithShape="0">
-                  <a:prstClr val="black">
-                    <a:alpha val="40000"/>
-                  </a:prstClr>
-                </a:outerShdw>
-              </a:effectLst>
-              <a:latin typeface="Times New Roman" pitchFamily="18" charset="0"/>
-              <a:cs typeface="Times New Roman" pitchFamily="18" charset="0"/>
-            </a:endParaRPr>
-          </a:p>
-          <a:p>
-            <a:pPr>
-              <a:lnSpc>
-                <a:spcPct val="200000"/>
-              </a:lnSpc>
-              <a:buFont typeface="Arial" pitchFamily="34" charset="0"/>
-              <a:buChar char="•"/>
-              <a:defRPr/>
-            </a:pPr>
-            <a:r>
-              <a:rPr lang="sk-SK" sz="1200" kern="0" dirty="0" smtClean="0">
-                <a:ln w="18415" cmpd="sng">
-                  <a:noFill/>
-                  <a:prstDash val="solid"/>
-                </a:ln>
-                <a:solidFill>
-                  <a:srgbClr val="FFFFFF"/>
-                </a:solidFill>
-                <a:effectLst>
-                  <a:outerShdw blurRad="50800" dist="38100" dir="2700000" algn="tl" rotWithShape="0">
-                    <a:prstClr val="black">
-                      <a:alpha val="40000"/>
-                    </a:prstClr>
-                  </a:outerShdw>
-                </a:effectLst>
-                <a:latin typeface="Times New Roman" pitchFamily="18" charset="0"/>
-                <a:cs typeface="Times New Roman" pitchFamily="18" charset="0"/>
-              </a:rPr>
-              <a:t>Zabudovanie </a:t>
-            </a:r>
-            <a:r>
-              <a:rPr lang="sk-SK" sz="1200" kern="0" dirty="0" err="1" smtClean="0">
-                <a:ln w="18415" cmpd="sng">
-                  <a:noFill/>
-                  <a:prstDash val="solid"/>
-                </a:ln>
-                <a:solidFill>
-                  <a:srgbClr val="FFFFFF"/>
-                </a:solidFill>
-                <a:effectLst>
-                  <a:outerShdw blurRad="50800" dist="38100" dir="2700000" algn="tl" rotWithShape="0">
-                    <a:prstClr val="black">
-                      <a:alpha val="40000"/>
-                    </a:prstClr>
-                  </a:outerShdw>
-                </a:effectLst>
-                <a:latin typeface="Times New Roman" pitchFamily="18" charset="0"/>
-                <a:cs typeface="Times New Roman" pitchFamily="18" charset="0"/>
-              </a:rPr>
-              <a:t>Shortcuts</a:t>
-            </a:r>
-            <a:r>
-              <a:rPr lang="sk-SK" sz="1200" kern="0" dirty="0" smtClean="0">
-                <a:ln w="18415" cmpd="sng">
-                  <a:noFill/>
-                  <a:prstDash val="solid"/>
-                </a:ln>
-                <a:solidFill>
-                  <a:srgbClr val="FFFFFF"/>
-                </a:solidFill>
-                <a:effectLst>
-                  <a:outerShdw blurRad="50800" dist="38100" dir="2700000" algn="tl" rotWithShape="0">
-                    <a:prstClr val="black">
-                      <a:alpha val="40000"/>
-                    </a:prstClr>
-                  </a:outerShdw>
-                </a:effectLst>
-                <a:latin typeface="Times New Roman" pitchFamily="18" charset="0"/>
-                <a:cs typeface="Times New Roman" pitchFamily="18" charset="0"/>
-              </a:rPr>
-              <a:t> – rozšírenie existujúcich skratiek </a:t>
-            </a:r>
-          </a:p>
-          <a:p>
-            <a:pPr>
-              <a:lnSpc>
-                <a:spcPct val="200000"/>
-              </a:lnSpc>
-              <a:buFont typeface="Arial" pitchFamily="34" charset="0"/>
-              <a:buChar char="•"/>
-              <a:defRPr/>
-            </a:pPr>
-            <a:r>
-              <a:rPr lang="sk-SK" sz="1200" kern="0" dirty="0" smtClean="0">
-                <a:ln w="18415" cmpd="sng">
-                  <a:noFill/>
-                  <a:prstDash val="solid"/>
-                </a:ln>
-                <a:solidFill>
-                  <a:srgbClr val="FFFFFF"/>
-                </a:solidFill>
-                <a:effectLst>
-                  <a:outerShdw blurRad="50800" dist="38100" dir="2700000" algn="tl" rotWithShape="0">
-                    <a:prstClr val="black">
-                      <a:alpha val="40000"/>
-                    </a:prstClr>
-                  </a:outerShdw>
-                </a:effectLst>
-                <a:latin typeface="Times New Roman" pitchFamily="18" charset="0"/>
-                <a:cs typeface="Times New Roman" pitchFamily="18" charset="0"/>
-              </a:rPr>
-              <a:t>Úprava editora za použitia CSS štýlov</a:t>
-            </a:r>
+            <a:r>
+              <a:rPr lang="sk-SK" dirty="0" smtClean="0"/>
+              <a:t>Prebiehajú  experimenty  s používateľským  rozhraním a pohrávame sa s myšlienkou grafickej vizualizácie zdrojového kódu pre rôzne aspekty ako napr. </a:t>
+            </a:r>
+          </a:p>
+          <a:p>
+            <a:r>
+              <a:rPr lang="sk-SK" dirty="0" smtClean="0"/>
+              <a:t>vizualizáciu softvérových metrík.</a:t>
+            </a:r>
+          </a:p>
+          <a:p>
             <a:endParaRPr lang="sk-SK" dirty="0" smtClean="0"/>
           </a:p>
           <a:p>
-            <a:pPr>
-              <a:buFont typeface="Arial" pitchFamily="34" charset="0"/>
-              <a:buChar char="•"/>
-            </a:pPr>
-            <a:r>
-              <a:rPr lang="pl-PL" sz="1200" kern="0" dirty="0" smtClean="0">
-                <a:ln w="18415" cmpd="sng">
-                  <a:noFill/>
-                  <a:prstDash val="solid"/>
-                </a:ln>
-                <a:solidFill>
-                  <a:srgbClr val="FFFFFF"/>
-                </a:solidFill>
-                <a:effectLst>
-                  <a:outerShdw blurRad="50800" dist="38100" dir="2700000" algn="tl" rotWithShape="0">
-                    <a:prstClr val="black">
-                      <a:alpha val="40000"/>
-                    </a:prstClr>
-                  </a:outerShdw>
-                </a:effectLst>
-                <a:latin typeface="Times New Roman" pitchFamily="18" charset="0"/>
-                <a:cs typeface="Times New Roman" pitchFamily="18" charset="0"/>
-              </a:rPr>
-              <a:t>Držanie AST stromu na strane Lua – dopytovanie na strom z Qt</a:t>
-            </a:r>
-          </a:p>
-          <a:p>
-            <a:pPr>
-              <a:buFont typeface="Arial" pitchFamily="34" charset="0"/>
-              <a:buChar char="•"/>
-            </a:pPr>
-            <a:endParaRPr lang="pl-PL" sz="1200" kern="0" dirty="0" smtClean="0">
-              <a:ln w="18415" cmpd="sng">
-                <a:noFill/>
-                <a:prstDash val="solid"/>
-              </a:ln>
-              <a:solidFill>
-                <a:srgbClr val="FFFFFF"/>
-              </a:solidFill>
-              <a:effectLst>
-                <a:outerShdw blurRad="50800" dist="38100" dir="2700000" algn="tl" rotWithShape="0">
-                  <a:prstClr val="black">
-                    <a:alpha val="40000"/>
-                  </a:prstClr>
-                </a:outerShdw>
-              </a:effectLst>
-              <a:latin typeface="Times New Roman" pitchFamily="18" charset="0"/>
-              <a:cs typeface="Times New Roman" pitchFamily="18" charset="0"/>
-            </a:endParaRPr>
-          </a:p>
-          <a:p>
-            <a:pPr>
-              <a:buFont typeface="Arial" pitchFamily="34" charset="0"/>
-              <a:buNone/>
-            </a:pPr>
             <a:r>
               <a:rPr lang="sk-SK" dirty="0" smtClean="0"/>
-              <a:t>V súčasnom stave editora je implementovaná zakladaná funkcionalita, ktorú sa  postupne snažíme </a:t>
-            </a:r>
-          </a:p>
-          <a:p>
-            <a:pPr>
-              <a:buFont typeface="Arial" pitchFamily="34" charset="0"/>
-              <a:buNone/>
-            </a:pPr>
+              <a:t>tvorba dokumentácie – umožniť písanie dokumentácie priamo do zdrojového kódu, a poskytnúť: </a:t>
+            </a:r>
+          </a:p>
+          <a:p>
             <a:r>
               <a:rPr lang="sk-SK" dirty="0" smtClean="0"/>
-              <a:t>zefektívniť. V súčasnej verzie  projektu  experimentujeme </a:t>
-            </a:r>
-            <a:endParaRPr lang="sk-SK" dirty="0"/>
+              <a:t>o  priame formátovanie textu </a:t>
+            </a:r>
+          </a:p>
+          <a:p>
+            <a:r>
+              <a:rPr lang="sk-SK" dirty="0" smtClean="0"/>
+              <a:t>o  samostatný aj kombinovaný výstup pre kompilovateľný program a dokumentáciu</a:t>
+            </a:r>
+          </a:p>
+          <a:p>
+            <a:endParaRPr lang="sk-SK" dirty="0" smtClean="0"/>
+          </a:p>
+          <a:p>
+            <a:r>
+              <a:rPr lang="sk-SK" dirty="0" smtClean="0"/>
+              <a:t>hlbšia analýza zdrojového kódu za účelom hľadania pachov kódu (</a:t>
+            </a:r>
+            <a:r>
+              <a:rPr lang="sk-SK" dirty="0" err="1" smtClean="0"/>
+              <a:t>code</a:t>
+            </a:r>
+            <a:r>
+              <a:rPr lang="sk-SK" dirty="0" smtClean="0"/>
+              <a:t> </a:t>
+            </a:r>
+            <a:r>
+              <a:rPr lang="sk-SK" dirty="0" err="1" smtClean="0"/>
+              <a:t>smells</a:t>
+            </a:r>
+            <a:r>
+              <a:rPr lang="sk-SK" dirty="0" smtClean="0"/>
+              <a:t>), </a:t>
+            </a:r>
           </a:p>
         </p:txBody>
       </p:sp>
@@ -1176,9 +935,455 @@
           </a:bodyPr>
           <a:lstStyle/>
           <a:p>
+            <a:pPr>
+              <a:buFont typeface="Arial" pitchFamily="34" charset="0"/>
+              <a:buChar char="•"/>
+            </a:pPr>
+            <a:r>
+              <a:rPr lang="sk-SK" sz="1200" dirty="0" smtClean="0">
+                <a:latin typeface="Arial" pitchFamily="34" charset="0"/>
+                <a:cs typeface="Arial" pitchFamily="34" charset="0"/>
+              </a:rPr>
+              <a:t>Modernejšie používateľské prostredie</a:t>
+            </a:r>
+          </a:p>
+          <a:p>
+            <a:pPr>
+              <a:buFont typeface="Arial" pitchFamily="34" charset="0"/>
+              <a:buChar char="•"/>
+            </a:pPr>
+            <a:endParaRPr lang="sk-SK" sz="1100" dirty="0" smtClean="0">
+              <a:latin typeface="Arial" pitchFamily="34" charset="0"/>
+              <a:cs typeface="Arial" pitchFamily="34" charset="0"/>
+            </a:endParaRPr>
+          </a:p>
+          <a:p>
+            <a:pPr>
+              <a:buFont typeface="Arial" pitchFamily="34" charset="0"/>
+              <a:buChar char="•"/>
+            </a:pPr>
+            <a:r>
+              <a:rPr lang="sk-SK" sz="1200" dirty="0" smtClean="0">
+                <a:latin typeface="Arial" pitchFamily="34" charset="0"/>
+                <a:cs typeface="Arial" pitchFamily="34" charset="0"/>
+              </a:rPr>
+              <a:t> Práca s editorom založená na dvoch módoch (textový a grafický)</a:t>
+            </a:r>
+          </a:p>
+          <a:p>
+            <a:endParaRPr lang="sk-SK" sz="1100" dirty="0" smtClean="0">
+              <a:latin typeface="Arial" pitchFamily="34" charset="0"/>
+              <a:cs typeface="Arial" pitchFamily="34" charset="0"/>
+            </a:endParaRPr>
+          </a:p>
+          <a:p>
+            <a:pPr>
+              <a:buFont typeface="Arial" pitchFamily="34" charset="0"/>
+              <a:buChar char="•"/>
+            </a:pPr>
+            <a:r>
+              <a:rPr lang="sk-SK" sz="1200" dirty="0" smtClean="0">
+                <a:latin typeface="Arial" pitchFamily="34" charset="0"/>
+                <a:cs typeface="Arial" pitchFamily="34" charset="0"/>
+              </a:rPr>
+              <a:t> Prenesenie spracovania AST stromu na stranu </a:t>
+            </a:r>
+            <a:r>
+              <a:rPr lang="sk-SK" sz="1200" dirty="0" err="1" smtClean="0">
+                <a:latin typeface="Arial" pitchFamily="34" charset="0"/>
+                <a:cs typeface="Arial" pitchFamily="34" charset="0"/>
+              </a:rPr>
+              <a:t>Lua</a:t>
+            </a:r>
+            <a:endParaRPr lang="sk-SK" sz="1200" dirty="0" smtClean="0">
+              <a:latin typeface="Arial" pitchFamily="34" charset="0"/>
+              <a:cs typeface="Arial" pitchFamily="34" charset="0"/>
+            </a:endParaRPr>
+          </a:p>
+          <a:p>
+            <a:endParaRPr lang="sk-SK" sz="1200" dirty="0" smtClean="0">
+              <a:latin typeface="Arial" pitchFamily="34" charset="0"/>
+              <a:cs typeface="Arial" pitchFamily="34" charset="0"/>
+            </a:endParaRPr>
+          </a:p>
+          <a:p>
+            <a:pPr>
+              <a:buFont typeface="Arial" pitchFamily="34" charset="0"/>
+              <a:buChar char="•"/>
+            </a:pPr>
+            <a:r>
+              <a:rPr lang="sk-SK" sz="1200" dirty="0" smtClean="0">
+                <a:latin typeface="Arial" pitchFamily="34" charset="0"/>
+                <a:cs typeface="Arial" pitchFamily="34" charset="0"/>
+              </a:rPr>
+              <a:t> Doplnenie editora o ďalšie špecifikované funkcionality</a:t>
+            </a:r>
+            <a:endParaRPr lang="sk-SK" sz="2000" dirty="0" smtClean="0">
+              <a:latin typeface="Arial" pitchFamily="34" charset="0"/>
+              <a:cs typeface="Arial" pitchFamily="34" charset="0"/>
+            </a:endParaRPr>
+          </a:p>
+          <a:p>
+            <a:pPr>
+              <a:lnSpc>
+                <a:spcPct val="200000"/>
+              </a:lnSpc>
+              <a:buFont typeface="Arial" pitchFamily="34" charset="0"/>
+              <a:buChar char="•"/>
+              <a:defRPr/>
+            </a:pPr>
+            <a:endParaRPr lang="sk-SK" sz="1200" kern="0" dirty="0" smtClean="0">
+              <a:ln w="18415" cmpd="sng">
+                <a:noFill/>
+                <a:prstDash val="solid"/>
+              </a:ln>
+              <a:solidFill>
+                <a:srgbClr val="FFFFFF"/>
+              </a:solidFill>
+              <a:effectLst>
+                <a:outerShdw blurRad="50800" dist="38100" dir="2700000" algn="tl" rotWithShape="0">
+                  <a:prstClr val="black">
+                    <a:alpha val="40000"/>
+                  </a:prstClr>
+                </a:outerShdw>
+              </a:effectLst>
+              <a:latin typeface="Times New Roman" pitchFamily="18" charset="0"/>
+              <a:cs typeface="Times New Roman" pitchFamily="18" charset="0"/>
+            </a:endParaRPr>
+          </a:p>
+          <a:p>
+            <a:pPr>
+              <a:buFont typeface="Arial" pitchFamily="34" charset="0"/>
+              <a:buChar char="•"/>
+            </a:pPr>
+            <a:r>
+              <a:rPr lang="sk-SK" sz="1200" dirty="0" smtClean="0">
+                <a:latin typeface="Arial" pitchFamily="34" charset="0"/>
+                <a:cs typeface="Arial" pitchFamily="34" charset="0"/>
+              </a:rPr>
+              <a:t> Zabudovanie pokročilej práce s textom – </a:t>
+            </a:r>
+            <a:r>
+              <a:rPr lang="sk-SK" sz="1200" dirty="0" err="1" smtClean="0">
+                <a:latin typeface="Arial" pitchFamily="34" charset="0"/>
+                <a:cs typeface="Arial" pitchFamily="34" charset="0"/>
+              </a:rPr>
+              <a:t>Undo</a:t>
+            </a:r>
+            <a:r>
+              <a:rPr lang="sk-SK" sz="1200" dirty="0" smtClean="0">
+                <a:latin typeface="Arial" pitchFamily="34" charset="0"/>
+                <a:cs typeface="Arial" pitchFamily="34" charset="0"/>
+              </a:rPr>
+              <a:t>, </a:t>
+            </a:r>
+            <a:r>
+              <a:rPr lang="sk-SK" sz="1200" dirty="0" err="1" smtClean="0">
+                <a:latin typeface="Arial" pitchFamily="34" charset="0"/>
+                <a:cs typeface="Arial" pitchFamily="34" charset="0"/>
+              </a:rPr>
+              <a:t>Redo</a:t>
+            </a:r>
+            <a:r>
+              <a:rPr lang="sk-SK" sz="1200" dirty="0" smtClean="0">
+                <a:latin typeface="Arial" pitchFamily="34" charset="0"/>
+                <a:cs typeface="Arial" pitchFamily="34" charset="0"/>
+              </a:rPr>
+              <a:t>, </a:t>
+            </a:r>
+            <a:r>
+              <a:rPr lang="sk-SK" sz="1200" dirty="0" err="1" smtClean="0">
+                <a:latin typeface="Arial" pitchFamily="34" charset="0"/>
+                <a:cs typeface="Arial" pitchFamily="34" charset="0"/>
+              </a:rPr>
+              <a:t>Copy</a:t>
+            </a:r>
+            <a:r>
+              <a:rPr lang="sk-SK" sz="1200" dirty="0" smtClean="0">
+                <a:latin typeface="Arial" pitchFamily="34" charset="0"/>
+                <a:cs typeface="Arial" pitchFamily="34" charset="0"/>
+              </a:rPr>
+              <a:t>/Paste </a:t>
+            </a:r>
+            <a:r>
+              <a:rPr lang="sk-SK" sz="1200" dirty="0" err="1" smtClean="0">
+                <a:latin typeface="Arial" pitchFamily="34" charset="0"/>
+                <a:cs typeface="Arial" pitchFamily="34" charset="0"/>
+              </a:rPr>
+              <a:t>etc</a:t>
+            </a:r>
+            <a:r>
+              <a:rPr lang="sk-SK" sz="1200" dirty="0" smtClean="0">
+                <a:latin typeface="Arial" pitchFamily="34" charset="0"/>
+                <a:cs typeface="Arial" pitchFamily="34" charset="0"/>
+              </a:rPr>
+              <a:t>.</a:t>
+            </a:r>
+          </a:p>
+          <a:p>
+            <a:pPr>
+              <a:buFont typeface="Arial" pitchFamily="34" charset="0"/>
+              <a:buChar char="•"/>
+            </a:pPr>
+            <a:endParaRPr lang="sk-SK" sz="1100" dirty="0" smtClean="0">
+              <a:latin typeface="Arial" pitchFamily="34" charset="0"/>
+              <a:cs typeface="Arial" pitchFamily="34" charset="0"/>
+            </a:endParaRPr>
+          </a:p>
+          <a:p>
+            <a:pPr>
+              <a:buFont typeface="Arial" pitchFamily="34" charset="0"/>
+              <a:buChar char="•"/>
+            </a:pPr>
+            <a:r>
+              <a:rPr lang="sk-SK" sz="1200" dirty="0" smtClean="0">
+                <a:latin typeface="Arial" pitchFamily="34" charset="0"/>
+                <a:cs typeface="Arial" pitchFamily="34" charset="0"/>
+              </a:rPr>
+              <a:t> Zabudovanie a vytvorenie vlastných </a:t>
+            </a:r>
+            <a:r>
+              <a:rPr lang="sk-SK" sz="1200" dirty="0" err="1" smtClean="0">
+                <a:latin typeface="Arial" pitchFamily="34" charset="0"/>
+                <a:cs typeface="Arial" pitchFamily="34" charset="0"/>
+              </a:rPr>
+              <a:t>Shortcuts</a:t>
+            </a:r>
+            <a:endParaRPr lang="sk-SK" sz="1200" dirty="0" smtClean="0">
+              <a:latin typeface="Arial" pitchFamily="34" charset="0"/>
+              <a:cs typeface="Arial" pitchFamily="34" charset="0"/>
+            </a:endParaRPr>
+          </a:p>
+          <a:p>
+            <a:pPr>
+              <a:lnSpc>
+                <a:spcPct val="200000"/>
+              </a:lnSpc>
+              <a:buFont typeface="Arial" pitchFamily="34" charset="0"/>
+              <a:buChar char="•"/>
+              <a:defRPr/>
+            </a:pPr>
+            <a:endParaRPr lang="sk-SK" sz="1200" kern="0" dirty="0" smtClean="0">
+              <a:ln w="18415" cmpd="sng">
+                <a:noFill/>
+                <a:prstDash val="solid"/>
+              </a:ln>
+              <a:solidFill>
+                <a:srgbClr val="FFFFFF"/>
+              </a:solidFill>
+              <a:effectLst>
+                <a:outerShdw blurRad="50800" dist="38100" dir="2700000" algn="tl" rotWithShape="0">
+                  <a:prstClr val="black">
+                    <a:alpha val="40000"/>
+                  </a:prstClr>
+                </a:outerShdw>
+              </a:effectLst>
+              <a:latin typeface="Times New Roman" pitchFamily="18" charset="0"/>
+              <a:cs typeface="Times New Roman" pitchFamily="18" charset="0"/>
+            </a:endParaRPr>
+          </a:p>
+          <a:p>
+            <a:pPr>
+              <a:lnSpc>
+                <a:spcPct val="200000"/>
+              </a:lnSpc>
+              <a:buFont typeface="Arial" pitchFamily="34" charset="0"/>
+              <a:buChar char="•"/>
+              <a:defRPr/>
+            </a:pPr>
+            <a:endParaRPr lang="sk-SK" sz="1200" kern="0" dirty="0" smtClean="0">
+              <a:ln w="18415" cmpd="sng">
+                <a:noFill/>
+                <a:prstDash val="solid"/>
+              </a:ln>
+              <a:solidFill>
+                <a:srgbClr val="FFFFFF"/>
+              </a:solidFill>
+              <a:effectLst>
+                <a:outerShdw blurRad="50800" dist="38100" dir="2700000" algn="tl" rotWithShape="0">
+                  <a:prstClr val="black">
+                    <a:alpha val="40000"/>
+                  </a:prstClr>
+                </a:outerShdw>
+              </a:effectLst>
+              <a:latin typeface="Times New Roman" pitchFamily="18" charset="0"/>
+              <a:cs typeface="Times New Roman" pitchFamily="18" charset="0"/>
+            </a:endParaRPr>
+          </a:p>
+          <a:p>
+            <a:pPr>
+              <a:lnSpc>
+                <a:spcPct val="200000"/>
+              </a:lnSpc>
+              <a:buFont typeface="Arial" pitchFamily="34" charset="0"/>
+              <a:buChar char="•"/>
+              <a:defRPr/>
+            </a:pPr>
+            <a:r>
+              <a:rPr lang="sk-SK" sz="1200" kern="0" dirty="0" smtClean="0">
+                <a:ln w="18415" cmpd="sng">
+                  <a:noFill/>
+                  <a:prstDash val="solid"/>
+                </a:ln>
+                <a:solidFill>
+                  <a:srgbClr val="FFFFFF"/>
+                </a:solidFill>
+                <a:effectLst>
+                  <a:outerShdw blurRad="50800" dist="38100" dir="2700000" algn="tl" rotWithShape="0">
+                    <a:prstClr val="black">
+                      <a:alpha val="40000"/>
+                    </a:prstClr>
+                  </a:outerShdw>
+                </a:effectLst>
+                <a:latin typeface="Times New Roman" pitchFamily="18" charset="0"/>
+                <a:cs typeface="Times New Roman" pitchFamily="18" charset="0"/>
+              </a:rPr>
+              <a:t>Zabudovanie </a:t>
+            </a:r>
+            <a:r>
+              <a:rPr lang="sk-SK" sz="1200" kern="0" dirty="0" err="1" smtClean="0">
+                <a:ln w="18415" cmpd="sng">
+                  <a:noFill/>
+                  <a:prstDash val="solid"/>
+                </a:ln>
+                <a:solidFill>
+                  <a:srgbClr val="FFFFFF"/>
+                </a:solidFill>
+                <a:effectLst>
+                  <a:outerShdw blurRad="50800" dist="38100" dir="2700000" algn="tl" rotWithShape="0">
+                    <a:prstClr val="black">
+                      <a:alpha val="40000"/>
+                    </a:prstClr>
+                  </a:outerShdw>
+                </a:effectLst>
+                <a:latin typeface="Times New Roman" pitchFamily="18" charset="0"/>
+                <a:cs typeface="Times New Roman" pitchFamily="18" charset="0"/>
+              </a:rPr>
+              <a:t>Shortcuts</a:t>
+            </a:r>
+            <a:r>
+              <a:rPr lang="sk-SK" sz="1200" kern="0" dirty="0" smtClean="0">
+                <a:ln w="18415" cmpd="sng">
+                  <a:noFill/>
+                  <a:prstDash val="solid"/>
+                </a:ln>
+                <a:solidFill>
+                  <a:srgbClr val="FFFFFF"/>
+                </a:solidFill>
+                <a:effectLst>
+                  <a:outerShdw blurRad="50800" dist="38100" dir="2700000" algn="tl" rotWithShape="0">
+                    <a:prstClr val="black">
+                      <a:alpha val="40000"/>
+                    </a:prstClr>
+                  </a:outerShdw>
+                </a:effectLst>
+                <a:latin typeface="Times New Roman" pitchFamily="18" charset="0"/>
+                <a:cs typeface="Times New Roman" pitchFamily="18" charset="0"/>
+              </a:rPr>
+              <a:t> – rozšírenie existujúcich skratiek </a:t>
+            </a:r>
+          </a:p>
+          <a:p>
+            <a:pPr>
+              <a:lnSpc>
+                <a:spcPct val="200000"/>
+              </a:lnSpc>
+              <a:buFont typeface="Arial" pitchFamily="34" charset="0"/>
+              <a:buChar char="•"/>
+              <a:defRPr/>
+            </a:pPr>
+            <a:r>
+              <a:rPr lang="sk-SK" sz="1200" kern="0" dirty="0" smtClean="0">
+                <a:ln w="18415" cmpd="sng">
+                  <a:noFill/>
+                  <a:prstDash val="solid"/>
+                </a:ln>
+                <a:solidFill>
+                  <a:srgbClr val="FFFFFF"/>
+                </a:solidFill>
+                <a:effectLst>
+                  <a:outerShdw blurRad="50800" dist="38100" dir="2700000" algn="tl" rotWithShape="0">
+                    <a:prstClr val="black">
+                      <a:alpha val="40000"/>
+                    </a:prstClr>
+                  </a:outerShdw>
+                </a:effectLst>
+                <a:latin typeface="Times New Roman" pitchFamily="18" charset="0"/>
+                <a:cs typeface="Times New Roman" pitchFamily="18" charset="0"/>
+              </a:rPr>
+              <a:t>Úprava editora za použitia CSS štýlov</a:t>
+            </a:r>
+            <a:endParaRPr lang="sk-SK" dirty="0" smtClean="0"/>
+          </a:p>
+          <a:p>
+            <a:pPr>
+              <a:buFont typeface="Arial" pitchFamily="34" charset="0"/>
+              <a:buChar char="•"/>
+            </a:pPr>
+            <a:r>
+              <a:rPr lang="pl-PL" sz="1200" kern="0" dirty="0" smtClean="0">
+                <a:ln w="18415" cmpd="sng">
+                  <a:noFill/>
+                  <a:prstDash val="solid"/>
+                </a:ln>
+                <a:solidFill>
+                  <a:srgbClr val="FFFFFF"/>
+                </a:solidFill>
+                <a:effectLst>
+                  <a:outerShdw blurRad="50800" dist="38100" dir="2700000" algn="tl" rotWithShape="0">
+                    <a:prstClr val="black">
+                      <a:alpha val="40000"/>
+                    </a:prstClr>
+                  </a:outerShdw>
+                </a:effectLst>
+                <a:latin typeface="Times New Roman" pitchFamily="18" charset="0"/>
+                <a:cs typeface="Times New Roman" pitchFamily="18" charset="0"/>
+              </a:rPr>
+              <a:t>Držanie AST stromu na strane Lua – dopytovanie na strom z Qt</a:t>
+            </a:r>
+          </a:p>
+          <a:p>
+            <a:pPr>
+              <a:buFont typeface="Arial" pitchFamily="34" charset="0"/>
+              <a:buChar char="•"/>
+            </a:pPr>
+            <a:endParaRPr lang="pl-PL" sz="1200" kern="0" dirty="0" smtClean="0">
+              <a:ln w="18415" cmpd="sng">
+                <a:noFill/>
+                <a:prstDash val="solid"/>
+              </a:ln>
+              <a:solidFill>
+                <a:srgbClr val="FFFFFF"/>
+              </a:solidFill>
+              <a:effectLst>
+                <a:outerShdw blurRad="50800" dist="38100" dir="2700000" algn="tl" rotWithShape="0">
+                  <a:prstClr val="black">
+                    <a:alpha val="40000"/>
+                  </a:prstClr>
+                </a:outerShdw>
+              </a:effectLst>
+              <a:latin typeface="Times New Roman" pitchFamily="18" charset="0"/>
+              <a:cs typeface="Times New Roman" pitchFamily="18" charset="0"/>
+            </a:endParaRPr>
+          </a:p>
+          <a:p>
+            <a:pPr>
+              <a:buFont typeface="Arial" pitchFamily="34" charset="0"/>
+              <a:buNone/>
+            </a:pPr>
             <a:r>
               <a:rPr lang="sk-SK" dirty="0" smtClean="0"/>
-              <a:t> </a:t>
+              <a:t>V súčasnom stave editora je implementovaná zakladaná funkcionalita, ktorú sa  postupne snažíme </a:t>
+            </a:r>
+          </a:p>
+          <a:p>
+            <a:pPr>
+              <a:buFont typeface="Arial" pitchFamily="34" charset="0"/>
+              <a:buNone/>
+            </a:pPr>
+            <a:r>
+              <a:rPr lang="sk-SK" dirty="0" smtClean="0"/>
+              <a:t>zefektívniť. V súčasnej verzie  projektu  experimentujeme </a:t>
             </a:r>
             <a:endParaRPr lang="sk-SK" dirty="0"/>
           </a:p>
@@ -1202,7 +1407,98 @@
             <a:fld id="{45D1DA62-001F-4525-B5C7-5BA4A19F932D}" type="slidenum">
               <a:rPr lang="sk-SK" smtClean="0"/>
               <a:pPr/>
-              <a:t>14</a:t>
+              <a:t>12</a:t>
+            </a:fld>
+            <a:endParaRPr lang="sk-SK" dirty="0"/>
+          </a:p>
+        </p:txBody>
+      </p:sp>
+    </p:spTree>
+  </p:cSld>
+  <p:clrMapOvr>
+    <a:masterClrMapping/>
+  </p:clrMapOvr>
+</p:notes>
+</file>
+
+<file path=ppt/notesSlides/notesSlide12.xml><?xml version="1.0" encoding="utf-8"?>
+<p:notes xmlns:a="http://schemas.openxmlformats.org/drawingml/2006/main" xmlns:r="http://schemas.openxmlformats.org/officeDocument/2006/relationships" xmlns:p="http://schemas.openxmlformats.org/presentationml/2006/main">
+  <p:cSld>
+    <p:spTree>
+      <p:nvGrpSpPr>
+        <p:cNvPr id="1" name=""/>
+        <p:cNvGrpSpPr/>
+        <p:nvPr/>
+      </p:nvGrpSpPr>
+      <p:grpSpPr>
+        <a:xfrm>
+          <a:off x="0" y="0"/>
+          <a:ext cx="0" cy="0"/>
+          <a:chOff x="0" y="0"/>
+          <a:chExt cx="0" cy="0"/>
+        </a:xfrm>
+      </p:grpSpPr>
+      <p:sp>
+        <p:nvSpPr>
+          <p:cNvPr id="2" name="Zástupný symbol obrazu snímky 1"/>
+          <p:cNvSpPr>
+            <a:spLocks noGrp="1" noRot="1" noChangeAspect="1"/>
+          </p:cNvSpPr>
+          <p:nvPr>
+            <p:ph type="sldImg"/>
+          </p:nvPr>
+        </p:nvSpPr>
+        <p:spPr>
+          <a:xfrm>
+            <a:off x="381000" y="685800"/>
+            <a:ext cx="6096000" cy="3429000"/>
+          </a:xfrm>
+        </p:spPr>
+      </p:sp>
+      <p:sp>
+        <p:nvSpPr>
+          <p:cNvPr id="3" name="Zástupný symbol poznámok 2"/>
+          <p:cNvSpPr>
+            <a:spLocks noGrp="1"/>
+          </p:cNvSpPr>
+          <p:nvPr>
+            <p:ph type="body" idx="1"/>
+          </p:nvPr>
+        </p:nvSpPr>
+        <p:spPr/>
+        <p:txBody>
+          <a:bodyPr>
+            <a:normAutofit/>
+          </a:bodyPr>
+          <a:lstStyle/>
+          <a:p>
+            <a:r>
+              <a:rPr lang="sk-SK" dirty="0" smtClean="0"/>
+              <a:t> </a:t>
+            </a:r>
+            <a:endParaRPr lang="sk-SK" dirty="0"/>
+          </a:p>
+        </p:txBody>
+      </p:sp>
+      <p:sp>
+        <p:nvSpPr>
+          <p:cNvPr id="4" name="Zástupný symbol čísla snímky 3"/>
+          <p:cNvSpPr>
+            <a:spLocks noGrp="1"/>
+          </p:cNvSpPr>
+          <p:nvPr>
+            <p:ph type="sldNum" sz="quarter" idx="10"/>
+          </p:nvPr>
+        </p:nvSpPr>
+        <p:spPr/>
+        <p:txBody>
+          <a:bodyPr/>
+          <a:lstStyle/>
+          <a:p>
+            <a:fld id="{45D1DA62-001F-4525-B5C7-5BA4A19F932D}" type="slidenum">
+              <a:rPr lang="sk-SK" smtClean="0"/>
+              <a:pPr/>
+              <a:t>15</a:t>
             </a:fld>
             <a:endParaRPr lang="sk-SK" dirty="0"/>
           </a:p>
@@ -4483,53 +4779,97 @@
           </a:bodyPr>
           <a:lstStyle/>
           <a:p>
-            <a:pPr>
-              <a:lnSpc>
-                <a:spcPct val="200000"/>
-              </a:lnSpc>
-              <a:buFont typeface="Arial" pitchFamily="34" charset="0"/>
-              <a:buNone/>
-              <a:defRPr/>
-            </a:pPr>
-            <a:r>
-              <a:rPr lang="sk-SK" dirty="0" smtClean="0"/>
-              <a:t>Lepšie raz </a:t>
-            </a:r>
-            <a:r>
-              <a:rPr lang="sk-SK" dirty="0" err="1" smtClean="0"/>
-              <a:t>videt</a:t>
-            </a:r>
-            <a:r>
-              <a:rPr lang="sk-SK" dirty="0" smtClean="0"/>
-              <a:t> ako sto </a:t>
-            </a:r>
-            <a:r>
-              <a:rPr lang="sk-SK" dirty="0" err="1" smtClean="0"/>
-              <a:t>krat</a:t>
-            </a:r>
-            <a:r>
-              <a:rPr lang="sk-SK" dirty="0" smtClean="0"/>
+            <a:r>
+              <a:rPr lang="sk-SK" u="sng" dirty="0" err="1" smtClean="0">
+                <a:latin typeface="Arial" pitchFamily="34" charset="0"/>
+                <a:cs typeface="Arial" pitchFamily="34" charset="0"/>
+              </a:rPr>
+              <a:t>Blokova</a:t>
+            </a:r>
+            <a:r>
+              <a:rPr lang="sk-SK" u="sng" dirty="0" smtClean="0">
+                <a:latin typeface="Arial" pitchFamily="34" charset="0"/>
+                <a:cs typeface="Arial" pitchFamily="34" charset="0"/>
+              </a:rPr>
               <a:t> </a:t>
             </a:r>
             <a:r>
-              <a:rPr lang="sk-SK" dirty="0" err="1" smtClean="0"/>
-              <a:t>počut</a:t>
-            </a:r>
-            <a:r>
-              <a:rPr lang="sk-SK" dirty="0" smtClean="0"/>
-              <a:t> a teraz</a:t>
-            </a:r>
-            <a:r>
-              <a:rPr lang="sk-SK" baseline="0" dirty="0" smtClean="0"/>
-              <a:t> </a:t>
-            </a:r>
-            <a:r>
-              <a:rPr lang="sk-SK" baseline="0" dirty="0" err="1" smtClean="0"/>
-              <a:t>demo</a:t>
-            </a:r>
-            <a:r>
-              <a:rPr lang="sk-SK" baseline="0" dirty="0" smtClean="0"/>
-              <a:t> ....</a:t>
+              <a:rPr lang="sk-SK" u="sng" dirty="0" err="1" smtClean="0">
+                <a:latin typeface="Arial" pitchFamily="34" charset="0"/>
+                <a:cs typeface="Arial" pitchFamily="34" charset="0"/>
+              </a:rPr>
+              <a:t>schema</a:t>
+            </a:r>
+            <a:r>
+              <a:rPr lang="sk-SK" u="sng" baseline="0" dirty="0" smtClean="0">
+                <a:latin typeface="Arial" pitchFamily="34" charset="0"/>
+                <a:cs typeface="Arial" pitchFamily="34" charset="0"/>
+              </a:rPr>
+              <a:t> programu- ako je </a:t>
+            </a:r>
+            <a:r>
+              <a:rPr lang="sk-SK" u="sng" baseline="0" dirty="0" err="1" smtClean="0">
+                <a:latin typeface="Arial" pitchFamily="34" charset="0"/>
+                <a:cs typeface="Arial" pitchFamily="34" charset="0"/>
+              </a:rPr>
+              <a:t>rozčleneny</a:t>
+            </a:r>
+            <a:r>
+              <a:rPr lang="sk-SK" u="sng" baseline="0" dirty="0" smtClean="0">
+                <a:latin typeface="Arial" pitchFamily="34" charset="0"/>
+                <a:cs typeface="Arial" pitchFamily="34" charset="0"/>
+              </a:rPr>
+              <a:t>- </a:t>
+            </a:r>
+            <a:r>
+              <a:rPr lang="sk-SK" u="sng" baseline="0" dirty="0" err="1" smtClean="0">
+                <a:latin typeface="Arial" pitchFamily="34" charset="0"/>
+                <a:cs typeface="Arial" pitchFamily="34" charset="0"/>
+              </a:rPr>
+              <a:t>povedat</a:t>
+            </a:r>
+            <a:r>
+              <a:rPr lang="sk-SK" u="sng" baseline="0" dirty="0" smtClean="0">
+                <a:latin typeface="Arial" pitchFamily="34" charset="0"/>
+                <a:cs typeface="Arial" pitchFamily="34" charset="0"/>
+              </a:rPr>
+              <a:t> kde je čo ...</a:t>
+            </a:r>
+          </a:p>
+          <a:p>
+            <a:endParaRPr lang="sk-SK" u="sng" baseline="0" dirty="0" smtClean="0">
+              <a:latin typeface="Arial" pitchFamily="34" charset="0"/>
+              <a:cs typeface="Arial" pitchFamily="34" charset="0"/>
+            </a:endParaRPr>
+          </a:p>
+          <a:p>
+            <a:r>
+              <a:rPr lang="sk-SK" u="sng" baseline="0" dirty="0" err="1" smtClean="0">
+                <a:latin typeface="Arial" pitchFamily="34" charset="0"/>
+                <a:cs typeface="Arial" pitchFamily="34" charset="0"/>
+              </a:rPr>
+              <a:t>Povedat</a:t>
+            </a:r>
+            <a:r>
+              <a:rPr lang="sk-SK" u="sng" baseline="0" dirty="0" smtClean="0">
+                <a:latin typeface="Arial" pitchFamily="34" charset="0"/>
+                <a:cs typeface="Arial" pitchFamily="34" charset="0"/>
+              </a:rPr>
+              <a:t> o </a:t>
+            </a:r>
+            <a:r>
+              <a:rPr lang="sk-SK" u="sng" baseline="0" dirty="0" err="1" smtClean="0">
+                <a:latin typeface="Arial" pitchFamily="34" charset="0"/>
+                <a:cs typeface="Arial" pitchFamily="34" charset="0"/>
+              </a:rPr>
+              <a:t>submoduloch</a:t>
+            </a:r>
+            <a:r>
+              <a:rPr lang="sk-SK" u="sng" baseline="0" dirty="0" smtClean="0">
+                <a:latin typeface="Arial" pitchFamily="34" charset="0"/>
+                <a:cs typeface="Arial" pitchFamily="34" charset="0"/>
+              </a:rPr>
+              <a:t> ... </a:t>
             </a:r>
             <a:endParaRPr lang="sk-SK" dirty="0"/>
           </a:p>
@@ -4614,443 +4954,59 @@
         <p:spPr/>
         <p:txBody>
           <a:bodyPr>
-            <a:normAutofit fontScale="92500" lnSpcReduction="20000"/>
+            <a:normAutofit/>
           </a:bodyPr>
           <a:lstStyle/>
           <a:p>
-            <a:r>
-              <a:rPr lang="sk-SK" sz="1200" b="1" kern="1200" dirty="0" smtClean="0">
-                <a:solidFill>
-                  <a:schemeClr val="tx1"/>
-                </a:solidFill>
-                <a:latin typeface="+mn-lt"/>
-                <a:ea typeface="+mn-ea"/>
-                <a:cs typeface="+mn-cs"/>
-              </a:rPr>
-              <a:t>Zhrnutie súčasného stavu  projektu</a:t>
-            </a:r>
-          </a:p>
-          <a:p>
-            <a:r>
-              <a:rPr lang="sk-SK" sz="1200" kern="1200" dirty="0" smtClean="0">
-                <a:solidFill>
-                  <a:schemeClr val="tx1"/>
-                </a:solidFill>
-                <a:latin typeface="+mn-lt"/>
-                <a:ea typeface="+mn-ea"/>
-                <a:cs typeface="+mn-cs"/>
-              </a:rPr>
-              <a:t>V súčasnom stave editora je implementovaná zakladaná funkcionalita, ktorú sa postupne snažíme zefektívniť. V súčasnej verzie projektu experimentujeme z efektívnejším prístupom pre vytvorenie abstraktného syntaktický stromu (</a:t>
-            </a:r>
-            <a:r>
-              <a:rPr lang="sk-SK" sz="1200" i="1" kern="1200" dirty="0" smtClean="0">
-                <a:solidFill>
-                  <a:schemeClr val="tx1"/>
-                </a:solidFill>
-                <a:latin typeface="+mn-lt"/>
-                <a:ea typeface="+mn-ea"/>
-                <a:cs typeface="+mn-cs"/>
-              </a:rPr>
-              <a:t>AST</a:t>
-            </a:r>
-            <a:r>
-              <a:rPr lang="sk-SK" sz="1200" kern="1200" dirty="0" smtClean="0">
-                <a:solidFill>
-                  <a:schemeClr val="tx1"/>
-                </a:solidFill>
-                <a:latin typeface="+mn-lt"/>
-                <a:ea typeface="+mn-ea"/>
-                <a:cs typeface="+mn-cs"/>
-              </a:rPr>
-              <a:t>) zo zdrojového kódu a taktiež rozširujeme možnosti syntaktickej analýzy pre viaceré jazyky. Prebiehajú experimenty s používateľským rozhraním a pohrávame sa s myšlienkou grafickej vizualizácie zdrojového kódu pre rôzne aspekty ako napr. vizualizáciu softvérových metrík. Ako sme spomenuli, je poskytnutá možnosť nastavenia klávesových skratiek, no pracuje sa aj na možnosti nastavenia vlastnej funkcionality pre jednotlivé skratky.</a:t>
-            </a:r>
-          </a:p>
-          <a:p>
             <a:pPr>
               <a:lnSpc>
-                <a:spcPct val="175000"/>
+                <a:spcPct val="200000"/>
               </a:lnSpc>
               <a:buFont typeface="Arial" pitchFamily="34" charset="0"/>
               <a:buNone/>
               <a:defRPr/>
             </a:pPr>
-            <a:endParaRPr lang="sk-SK" sz="1200" kern="0" dirty="0" smtClean="0">
-              <a:ln w="18415" cmpd="sng">
-                <a:noFill/>
-                <a:prstDash val="solid"/>
-              </a:ln>
-              <a:solidFill>
-                <a:srgbClr val="FFFFFF"/>
-              </a:solidFill>
-              <a:effectLst>
-                <a:outerShdw blurRad="50800" dist="38100" dir="2700000" algn="tl" rotWithShape="0">
-                  <a:prstClr val="black">
-                    <a:alpha val="40000"/>
-                  </a:prstClr>
-                </a:outerShdw>
-              </a:effectLst>
-              <a:latin typeface="Times New Roman" pitchFamily="18" charset="0"/>
-              <a:cs typeface="Times New Roman" pitchFamily="18" charset="0"/>
-            </a:endParaRPr>
-          </a:p>
-          <a:p>
-            <a:pPr>
-              <a:lnSpc>
-                <a:spcPct val="175000"/>
-              </a:lnSpc>
-              <a:buFont typeface="Arial" pitchFamily="34" charset="0"/>
-              <a:buChar char="•"/>
-              <a:defRPr/>
-            </a:pPr>
-            <a:r>
-              <a:rPr lang="sk-SK" sz="1200" kern="0" dirty="0" smtClean="0">
-                <a:ln w="18415" cmpd="sng">
-                  <a:noFill/>
-                  <a:prstDash val="solid"/>
-                </a:ln>
-                <a:solidFill>
-                  <a:srgbClr val="FFFFFF"/>
-                </a:solidFill>
-                <a:effectLst>
-                  <a:outerShdw blurRad="50800" dist="38100" dir="2700000" algn="tl" rotWithShape="0">
-                    <a:prstClr val="black">
-                      <a:alpha val="40000"/>
-                    </a:prstClr>
-                  </a:outerShdw>
-                </a:effectLst>
-                <a:latin typeface="Times New Roman" pitchFamily="18" charset="0"/>
-                <a:cs typeface="Times New Roman" pitchFamily="18" charset="0"/>
-              </a:rPr>
-              <a:t> Čo sme implementovali:</a:t>
-            </a:r>
-          </a:p>
-          <a:p>
-            <a:pPr>
-              <a:lnSpc>
-                <a:spcPct val="200000"/>
-              </a:lnSpc>
-              <a:buFont typeface="Arial" pitchFamily="34" charset="0"/>
-              <a:buChar char="•"/>
-              <a:defRPr/>
-            </a:pPr>
-            <a:r>
-              <a:rPr lang="sk-SK" sz="1200" kern="0" dirty="0" smtClean="0">
-                <a:ln w="18415" cmpd="sng">
-                  <a:noFill/>
-                  <a:prstDash val="solid"/>
-                </a:ln>
-                <a:solidFill>
-                  <a:srgbClr val="FFFFFF"/>
-                </a:solidFill>
-                <a:effectLst>
-                  <a:outerShdw blurRad="50800" dist="38100" dir="2700000" algn="tl" rotWithShape="0">
-                    <a:prstClr val="black">
-                      <a:alpha val="40000"/>
-                    </a:prstClr>
-                  </a:outerShdw>
-                </a:effectLst>
-                <a:latin typeface="Times New Roman" pitchFamily="18" charset="0"/>
-                <a:cs typeface="Times New Roman" pitchFamily="18" charset="0"/>
-              </a:rPr>
-              <a:t>Paralelizovanie výpočtovo náročných operácií </a:t>
-            </a:r>
-          </a:p>
-          <a:p>
-            <a:pPr>
-              <a:lnSpc>
-                <a:spcPct val="200000"/>
-              </a:lnSpc>
-              <a:buFont typeface="Arial" pitchFamily="34" charset="0"/>
-              <a:buChar char="•"/>
-              <a:defRPr/>
-            </a:pPr>
-            <a:r>
-              <a:rPr lang="sk-SK" sz="1200" kern="0" dirty="0" smtClean="0">
-                <a:ln w="18415" cmpd="sng">
-                  <a:noFill/>
-                  <a:prstDash val="solid"/>
-                </a:ln>
-                <a:solidFill>
-                  <a:srgbClr val="FFFFFF"/>
-                </a:solidFill>
-                <a:effectLst>
-                  <a:outerShdw blurRad="50800" dist="38100" dir="2700000" algn="tl" rotWithShape="0">
-                    <a:prstClr val="black">
-                      <a:alpha val="40000"/>
-                    </a:prstClr>
-                  </a:outerShdw>
-                </a:effectLst>
-                <a:latin typeface="Times New Roman" pitchFamily="18" charset="0"/>
-                <a:cs typeface="Times New Roman" pitchFamily="18" charset="0"/>
-              </a:rPr>
-              <a:t> Prenesenie spracovania AST stromu na stranu Lua</a:t>
-            </a:r>
-          </a:p>
-          <a:p>
-            <a:pPr>
-              <a:lnSpc>
-                <a:spcPct val="200000"/>
-              </a:lnSpc>
-              <a:buFont typeface="Arial" pitchFamily="34" charset="0"/>
-              <a:buChar char="•"/>
-              <a:defRPr/>
-            </a:pPr>
-            <a:r>
-              <a:rPr lang="sk-SK" sz="1200" kern="0" dirty="0" smtClean="0">
-                <a:ln w="18415" cmpd="sng">
-                  <a:noFill/>
-                  <a:prstDash val="solid"/>
-                </a:ln>
-                <a:solidFill>
-                  <a:srgbClr val="FFFFFF"/>
-                </a:solidFill>
-                <a:effectLst>
-                  <a:outerShdw blurRad="50800" dist="38100" dir="2700000" algn="tl" rotWithShape="0">
-                    <a:prstClr val="black">
-                      <a:alpha val="40000"/>
-                    </a:prstClr>
-                  </a:outerShdw>
-                </a:effectLst>
-                <a:latin typeface="Times New Roman" pitchFamily="18" charset="0"/>
-                <a:cs typeface="Times New Roman" pitchFamily="18" charset="0"/>
-              </a:rPr>
-              <a:t> Zabudovanie pokročilej práce s textom – Undo, Redo, Copy/Paste</a:t>
-            </a:r>
-          </a:p>
-          <a:p>
-            <a:pPr>
-              <a:lnSpc>
-                <a:spcPct val="200000"/>
-              </a:lnSpc>
-              <a:buFont typeface="Arial" pitchFamily="34" charset="0"/>
-              <a:buChar char="•"/>
-              <a:defRPr/>
-            </a:pPr>
-            <a:r>
-              <a:rPr lang="sk-SK" sz="1200" kern="0" dirty="0" smtClean="0">
-                <a:ln w="18415" cmpd="sng">
-                  <a:noFill/>
-                  <a:prstDash val="solid"/>
-                </a:ln>
-                <a:solidFill>
-                  <a:srgbClr val="FFFFFF"/>
-                </a:solidFill>
-                <a:effectLst>
-                  <a:outerShdw blurRad="50800" dist="38100" dir="2700000" algn="tl" rotWithShape="0">
-                    <a:prstClr val="black">
-                      <a:alpha val="40000"/>
-                    </a:prstClr>
-                  </a:outerShdw>
-                </a:effectLst>
-                <a:latin typeface="Times New Roman" pitchFamily="18" charset="0"/>
-                <a:cs typeface="Times New Roman" pitchFamily="18" charset="0"/>
-              </a:rPr>
-              <a:t> Zabudovanie a vytvorenie vlastných Shortcuts</a:t>
-            </a:r>
-            <a:endParaRPr lang="pl-PL" sz="1200" kern="0" dirty="0" smtClean="0">
-              <a:ln w="18415" cmpd="sng">
-                <a:noFill/>
-                <a:prstDash val="solid"/>
-              </a:ln>
-              <a:solidFill>
-                <a:srgbClr val="FFFFFF"/>
-              </a:solidFill>
-              <a:effectLst>
-                <a:outerShdw blurRad="50800" dist="38100" dir="2700000" algn="tl" rotWithShape="0">
-                  <a:prstClr val="black">
-                    <a:alpha val="40000"/>
-                  </a:prstClr>
-                </a:outerShdw>
-              </a:effectLst>
-              <a:latin typeface="Times New Roman" pitchFamily="18" charset="0"/>
-              <a:cs typeface="Times New Roman" pitchFamily="18" charset="0"/>
-            </a:endParaRPr>
-          </a:p>
-          <a:p>
-            <a:r>
-              <a:rPr lang="sk-SK" sz="1200" kern="0" dirty="0" smtClean="0">
-                <a:ln w="18415" cmpd="sng">
-                  <a:noFill/>
-                  <a:prstDash val="solid"/>
-                </a:ln>
-                <a:solidFill>
-                  <a:srgbClr val="FFFFFF"/>
-                </a:solidFill>
-                <a:effectLst>
-                  <a:outerShdw blurRad="50800" dist="38100" dir="2700000" algn="tl" rotWithShape="0">
-                    <a:prstClr val="black">
-                      <a:alpha val="40000"/>
-                    </a:prstClr>
-                  </a:outerShdw>
-                </a:effectLst>
-                <a:latin typeface="Times New Roman" pitchFamily="18" charset="0"/>
-                <a:cs typeface="Times New Roman" pitchFamily="18" charset="0"/>
-              </a:rPr>
-              <a:t>Práca s editorom založená na dvoch módoch (textový a grafický)</a:t>
-            </a:r>
-          </a:p>
-          <a:p>
-            <a:endParaRPr lang="sk-SK" sz="1200" kern="0" dirty="0" smtClean="0">
-              <a:ln w="18415" cmpd="sng">
-                <a:noFill/>
-                <a:prstDash val="solid"/>
-              </a:ln>
-              <a:solidFill>
-                <a:srgbClr val="FFFFFF"/>
-              </a:solidFill>
-              <a:effectLst>
-                <a:outerShdw blurRad="50800" dist="38100" dir="2700000" algn="tl" rotWithShape="0">
-                  <a:prstClr val="black">
-                    <a:alpha val="40000"/>
-                  </a:prstClr>
-                </a:outerShdw>
-              </a:effectLst>
-              <a:latin typeface="Times New Roman" pitchFamily="18" charset="0"/>
-              <a:cs typeface="Times New Roman" pitchFamily="18" charset="0"/>
-            </a:endParaRPr>
-          </a:p>
-          <a:p>
-            <a:r>
-              <a:rPr lang="sk-SK" sz="1200" kern="0" dirty="0" smtClean="0">
-                <a:ln w="18415" cmpd="sng">
-                  <a:noFill/>
-                  <a:prstDash val="solid"/>
-                </a:ln>
-                <a:solidFill>
-                  <a:srgbClr val="FFFFFF"/>
-                </a:solidFill>
-                <a:effectLst>
-                  <a:outerShdw blurRad="50800" dist="38100" dir="2700000" algn="tl" rotWithShape="0">
-                    <a:prstClr val="black">
-                      <a:alpha val="40000"/>
-                    </a:prstClr>
-                  </a:outerShdw>
-                </a:effectLst>
-                <a:latin typeface="Times New Roman" pitchFamily="18" charset="0"/>
-                <a:cs typeface="Times New Roman" pitchFamily="18" charset="0"/>
-              </a:rPr>
-              <a:t>Povedat niečo</a:t>
-            </a:r>
-            <a:r>
-              <a:rPr lang="sk-SK" sz="1200" kern="0" baseline="0" dirty="0" smtClean="0">
-                <a:ln w="18415" cmpd="sng">
-                  <a:noFill/>
-                  <a:prstDash val="solid"/>
-                </a:ln>
-                <a:solidFill>
-                  <a:srgbClr val="FFFFFF"/>
-                </a:solidFill>
-                <a:effectLst>
-                  <a:outerShdw blurRad="50800" dist="38100" dir="2700000" algn="tl" rotWithShape="0">
-                    <a:prstClr val="black">
-                      <a:alpha val="40000"/>
-                    </a:prstClr>
-                  </a:outerShdw>
-                </a:effectLst>
-                <a:latin typeface="Times New Roman" pitchFamily="18" charset="0"/>
-                <a:cs typeface="Times New Roman" pitchFamily="18" charset="0"/>
-              </a:rPr>
-              <a:t> o funkcionalite :</a:t>
-            </a:r>
-          </a:p>
-          <a:p>
-            <a:pPr>
-              <a:buFontTx/>
-              <a:buChar char="-"/>
-            </a:pPr>
-            <a:r>
-              <a:rPr lang="sk-SK" sz="1200" kern="0" baseline="0" dirty="0" smtClean="0">
-                <a:ln w="18415" cmpd="sng">
-                  <a:noFill/>
-                  <a:prstDash val="solid"/>
-                </a:ln>
-                <a:solidFill>
-                  <a:srgbClr val="FFFFFF"/>
-                </a:solidFill>
-                <a:effectLst>
-                  <a:outerShdw blurRad="50800" dist="38100" dir="2700000" algn="tl" rotWithShape="0">
-                    <a:prstClr val="black">
-                      <a:alpha val="40000"/>
-                    </a:prstClr>
-                  </a:outerShdw>
-                </a:effectLst>
-                <a:latin typeface="Times New Roman" pitchFamily="18" charset="0"/>
-                <a:cs typeface="Times New Roman" pitchFamily="18" charset="0"/>
-              </a:rPr>
-              <a:t> Shortcuts</a:t>
-            </a:r>
-          </a:p>
-          <a:p>
-            <a:pPr>
-              <a:buFontTx/>
-              <a:buChar char="-"/>
-            </a:pPr>
-            <a:r>
-              <a:rPr lang="sk-SK" sz="1200" kern="0" baseline="0" dirty="0" smtClean="0">
-                <a:ln w="18415" cmpd="sng">
-                  <a:noFill/>
-                  <a:prstDash val="solid"/>
-                </a:ln>
-                <a:solidFill>
-                  <a:srgbClr val="FFFFFF"/>
-                </a:solidFill>
-                <a:effectLst>
-                  <a:outerShdw blurRad="50800" dist="38100" dir="2700000" algn="tl" rotWithShape="0">
-                    <a:prstClr val="black">
-                      <a:alpha val="40000"/>
-                    </a:prstClr>
-                  </a:outerShdw>
-                </a:effectLst>
-                <a:latin typeface="Times New Roman" pitchFamily="18" charset="0"/>
-                <a:cs typeface="Times New Roman" pitchFamily="18" charset="0"/>
-              </a:rPr>
-              <a:t>  dopytovani do Lua </a:t>
-            </a:r>
-          </a:p>
-          <a:p>
-            <a:pPr>
-              <a:buFontTx/>
-              <a:buChar char="-"/>
-            </a:pPr>
-            <a:r>
-              <a:rPr lang="sk-SK" sz="1200" kern="0" baseline="0" dirty="0" smtClean="0">
-                <a:ln w="18415" cmpd="sng">
-                  <a:noFill/>
-                  <a:prstDash val="solid"/>
-                </a:ln>
-                <a:solidFill>
-                  <a:srgbClr val="FFFFFF"/>
-                </a:solidFill>
-                <a:effectLst>
-                  <a:outerShdw blurRad="50800" dist="38100" dir="2700000" algn="tl" rotWithShape="0">
-                    <a:prstClr val="black">
-                      <a:alpha val="40000"/>
-                    </a:prstClr>
-                  </a:outerShdw>
-                </a:effectLst>
-                <a:latin typeface="Times New Roman" pitchFamily="18" charset="0"/>
-                <a:cs typeface="Times New Roman" pitchFamily="18" charset="0"/>
-              </a:rPr>
-              <a:t>  dva  mody ukazat </a:t>
-            </a:r>
-            <a:endParaRPr lang="sk-SK" sz="1200" kern="0" dirty="0" smtClean="0">
-              <a:ln w="18415" cmpd="sng">
-                <a:noFill/>
-                <a:prstDash val="solid"/>
-              </a:ln>
-              <a:solidFill>
-                <a:srgbClr val="FFFFFF"/>
-              </a:solidFill>
-              <a:effectLst>
-                <a:outerShdw blurRad="50800" dist="38100" dir="2700000" algn="tl" rotWithShape="0">
-                  <a:prstClr val="black">
-                    <a:alpha val="40000"/>
-                  </a:prstClr>
-                </a:outerShdw>
-              </a:effectLst>
-              <a:latin typeface="Times New Roman" pitchFamily="18" charset="0"/>
-              <a:cs typeface="Times New Roman" pitchFamily="18" charset="0"/>
-            </a:endParaRPr>
+            <a:r>
+              <a:rPr lang="sk-SK" dirty="0" smtClean="0"/>
+              <a:t>Lepšie raz </a:t>
+            </a:r>
+            <a:r>
+              <a:rPr lang="sk-SK" dirty="0" err="1" smtClean="0"/>
+              <a:t>videt</a:t>
+            </a:r>
+            <a:r>
+              <a:rPr lang="sk-SK" dirty="0" smtClean="0"/>
+              <a:t> ako sto </a:t>
+            </a:r>
+            <a:r>
+              <a:rPr lang="sk-SK" dirty="0" err="1" smtClean="0"/>
+              <a:t>krat</a:t>
+            </a:r>
+            <a:r>
+              <a:rPr lang="sk-SK" dirty="0" smtClean="0"/>
+              <a:t> </a:t>
+            </a:r>
+            <a:r>
+              <a:rPr lang="sk-SK" dirty="0" err="1" smtClean="0"/>
+              <a:t>počut</a:t>
+            </a:r>
+            <a:r>
+              <a:rPr lang="sk-SK" dirty="0" smtClean="0"/>
+              <a:t> a teraz</a:t>
+            </a:r>
+            <a:r>
+              <a:rPr lang="sk-SK" baseline="0" dirty="0" smtClean="0"/>
+              <a:t> </a:t>
+            </a:r>
+            <a:r>
+              <a:rPr lang="sk-SK" baseline="0" dirty="0" err="1" smtClean="0"/>
+              <a:t>demo</a:t>
+            </a:r>
+            <a:r>
+              <a:rPr lang="sk-SK" baseline="0" dirty="0" smtClean="0"/>
+              <a:t> ....</a:t>
+            </a:r>
+            <a:endParaRPr lang="sk-SK" dirty="0"/>
           </a:p>
         </p:txBody>
       </p:sp>
@@ -5133,219 +5089,443 @@
         <p:spPr/>
         <p:txBody>
           <a:bodyPr>
-            <a:normAutofit/>
+            <a:normAutofit fontScale="92500" lnSpcReduction="20000"/>
           </a:bodyPr>
           <a:lstStyle/>
           <a:p>
+            <a:r>
+              <a:rPr lang="sk-SK" sz="1200" b="1" kern="1200" dirty="0" smtClean="0">
+                <a:solidFill>
+                  <a:schemeClr val="tx1"/>
+                </a:solidFill>
+                <a:latin typeface="+mn-lt"/>
+                <a:ea typeface="+mn-ea"/>
+                <a:cs typeface="+mn-cs"/>
+              </a:rPr>
+              <a:t>Zhrnutie súčasného stavu  projektu</a:t>
+            </a:r>
+          </a:p>
+          <a:p>
+            <a:r>
+              <a:rPr lang="sk-SK" sz="1200" kern="1200" dirty="0" smtClean="0">
+                <a:solidFill>
+                  <a:schemeClr val="tx1"/>
+                </a:solidFill>
+                <a:latin typeface="+mn-lt"/>
+                <a:ea typeface="+mn-ea"/>
+                <a:cs typeface="+mn-cs"/>
+              </a:rPr>
+              <a:t>V súčasnom stave editora je implementovaná zakladaná funkcionalita, ktorú sa postupne snažíme zefektívniť. V súčasnej verzie projektu experimentujeme z efektívnejším prístupom pre vytvorenie abstraktného syntaktický stromu (</a:t>
+            </a:r>
+            <a:r>
+              <a:rPr lang="sk-SK" sz="1200" i="1" kern="1200" dirty="0" smtClean="0">
+                <a:solidFill>
+                  <a:schemeClr val="tx1"/>
+                </a:solidFill>
+                <a:latin typeface="+mn-lt"/>
+                <a:ea typeface="+mn-ea"/>
+                <a:cs typeface="+mn-cs"/>
+              </a:rPr>
+              <a:t>AST</a:t>
+            </a:r>
+            <a:r>
+              <a:rPr lang="sk-SK" sz="1200" kern="1200" dirty="0" smtClean="0">
+                <a:solidFill>
+                  <a:schemeClr val="tx1"/>
+                </a:solidFill>
+                <a:latin typeface="+mn-lt"/>
+                <a:ea typeface="+mn-ea"/>
+                <a:cs typeface="+mn-cs"/>
+              </a:rPr>
+              <a:t>) zo zdrojového kódu a taktiež rozširujeme možnosti syntaktickej analýzy pre viaceré jazyky. Prebiehajú experimenty s používateľským rozhraním a pohrávame sa s myšlienkou grafickej vizualizácie zdrojového kódu pre rôzne aspekty ako napr. vizualizáciu softvérových metrík. Ako sme spomenuli, je poskytnutá možnosť nastavenia klávesových skratiek, no pracuje sa aj na možnosti nastavenia vlastnej funkcionality pre jednotlivé skratky.</a:t>
+            </a:r>
+          </a:p>
+          <a:p>
             <a:pPr>
+              <a:lnSpc>
+                <a:spcPct val="175000"/>
+              </a:lnSpc>
               <a:buFont typeface="Arial" pitchFamily="34" charset="0"/>
               <a:buNone/>
+              <a:defRPr/>
             </a:pPr>
-            <a:r>
-              <a:rPr lang="sk-SK" sz="1200" dirty="0" smtClean="0">
-                <a:latin typeface="Arial" pitchFamily="34" charset="0"/>
-                <a:cs typeface="Arial" pitchFamily="34" charset="0"/>
-              </a:rPr>
-              <a:t> -Optimalizovať funkcionality pre rýchlejšiu a príjemnejšiu prácu v editore</a:t>
-            </a:r>
+            <a:endParaRPr lang="sk-SK" sz="1200" kern="0" dirty="0" smtClean="0">
+              <a:ln w="18415" cmpd="sng">
+                <a:noFill/>
+                <a:prstDash val="solid"/>
+              </a:ln>
+              <a:solidFill>
+                <a:srgbClr val="FFFFFF"/>
+              </a:solidFill>
+              <a:effectLst>
+                <a:outerShdw blurRad="50800" dist="38100" dir="2700000" algn="tl" rotWithShape="0">
+                  <a:prstClr val="black">
+                    <a:alpha val="40000"/>
+                  </a:prstClr>
+                </a:outerShdw>
+              </a:effectLst>
+              <a:latin typeface="Times New Roman" pitchFamily="18" charset="0"/>
+              <a:cs typeface="Times New Roman" pitchFamily="18" charset="0"/>
+            </a:endParaRPr>
           </a:p>
           <a:p>
             <a:pPr>
-              <a:buFont typeface="Arial" pitchFamily="34" charset="0"/>
-              <a:buNone/>
-            </a:pPr>
-            <a:r>
-              <a:rPr lang="sk-SK" sz="1200" dirty="0" smtClean="0">
-                <a:latin typeface="Arial" pitchFamily="34" charset="0"/>
-                <a:cs typeface="Arial" pitchFamily="34" charset="0"/>
-              </a:rPr>
-              <a:t>-Vylepšiť analýzu zdrojového kódu pre rôzne jazyky (</a:t>
-            </a:r>
-            <a:r>
-              <a:rPr lang="sk-SK" sz="1200" dirty="0" err="1" smtClean="0">
-                <a:latin typeface="Arial" pitchFamily="34" charset="0"/>
-                <a:cs typeface="Arial" pitchFamily="34" charset="0"/>
-              </a:rPr>
-              <a:t>Java</a:t>
-            </a:r>
-            <a:r>
-              <a:rPr lang="sk-SK" sz="1200" dirty="0" smtClean="0">
-                <a:latin typeface="Arial" pitchFamily="34" charset="0"/>
-                <a:cs typeface="Arial" pitchFamily="34" charset="0"/>
-              </a:rPr>
-              <a:t>, C#, HTML, PHP a pod.)</a:t>
-            </a:r>
-          </a:p>
-          <a:p>
-            <a:pPr>
+              <a:lnSpc>
+                <a:spcPct val="175000"/>
+              </a:lnSpc>
               <a:buFont typeface="Arial" pitchFamily="34" charset="0"/>
               <a:buChar char="•"/>
+              <a:defRPr/>
             </a:pPr>
             <a:r>
-              <a:rPr lang="sk-SK" sz="1200" dirty="0" smtClean="0">
-                <a:latin typeface="Arial" pitchFamily="34" charset="0"/>
-                <a:cs typeface="Arial" pitchFamily="34" charset="0"/>
+              <a:rPr lang="sk-SK" sz="1200" kern="0" dirty="0" smtClean="0">
+                <a:ln w="18415" cmpd="sng">
+                  <a:noFill/>
+                  <a:prstDash val="solid"/>
+                </a:ln>
+                <a:solidFill>
+                  <a:srgbClr val="FFFFFF"/>
+                </a:solidFill>
+                <a:effectLst>
+                  <a:outerShdw blurRad="50800" dist="38100" dir="2700000" algn="tl" rotWithShape="0">
+                    <a:prstClr val="black">
+                      <a:alpha val="40000"/>
+                    </a:prstClr>
+                  </a:outerShdw>
+                </a:effectLst>
+                <a:latin typeface="Times New Roman" pitchFamily="18" charset="0"/>
+                <a:cs typeface="Times New Roman" pitchFamily="18" charset="0"/>
               </a:rPr>
-              <a:t>  Rozšíriť vstávajúcu funkcionalitu editora (Vyhľadávanie, </a:t>
-            </a:r>
-            <a:r>
-              <a:rPr lang="sk-SK" sz="1200" dirty="0" err="1" smtClean="0">
-                <a:latin typeface="Arial" pitchFamily="34" charset="0"/>
-                <a:cs typeface="Arial" pitchFamily="34" charset="0"/>
-              </a:rPr>
-              <a:t>IntelliSense</a:t>
-            </a:r>
-            <a:r>
-              <a:rPr lang="sk-SK" sz="1200" dirty="0" smtClean="0">
-                <a:latin typeface="Arial" pitchFamily="34" charset="0"/>
-                <a:cs typeface="Arial" pitchFamily="34" charset="0"/>
-              </a:rPr>
-              <a:t>, </a:t>
-            </a:r>
-            <a:r>
-              <a:rPr lang="sk-SK" sz="1200" dirty="0" err="1" smtClean="0">
-                <a:latin typeface="Arial" pitchFamily="34" charset="0"/>
-                <a:cs typeface="Arial" pitchFamily="34" charset="0"/>
-              </a:rPr>
-              <a:t>Plug-in</a:t>
-            </a:r>
-            <a:r>
-              <a:rPr lang="sk-SK" sz="1200" dirty="0" smtClean="0">
-                <a:latin typeface="Arial" pitchFamily="34" charset="0"/>
-                <a:cs typeface="Arial" pitchFamily="34" charset="0"/>
-              </a:rPr>
-              <a:t>, CVS)</a:t>
+              <a:t> Čo sme implementovali:</a:t>
             </a:r>
           </a:p>
           <a:p>
             <a:pPr>
+              <a:lnSpc>
+                <a:spcPct val="200000"/>
+              </a:lnSpc>
               <a:buFont typeface="Arial" pitchFamily="34" charset="0"/>
               <a:buChar char="•"/>
+              <a:defRPr/>
             </a:pPr>
             <a:r>
-              <a:rPr lang="sk-SK" sz="1200" dirty="0" smtClean="0">
-                <a:latin typeface="Arial" pitchFamily="34" charset="0"/>
-                <a:cs typeface="Arial" pitchFamily="34" charset="0"/>
+              <a:rPr lang="sk-SK" sz="1200" kern="0" dirty="0" smtClean="0">
+                <a:ln w="18415" cmpd="sng">
+                  <a:noFill/>
+                  <a:prstDash val="solid"/>
+                </a:ln>
+                <a:solidFill>
+                  <a:srgbClr val="FFFFFF"/>
+                </a:solidFill>
+                <a:effectLst>
+                  <a:outerShdw blurRad="50800" dist="38100" dir="2700000" algn="tl" rotWithShape="0">
+                    <a:prstClr val="black">
+                      <a:alpha val="40000"/>
+                    </a:prstClr>
+                  </a:outerShdw>
+                </a:effectLst>
+                <a:latin typeface="Times New Roman" pitchFamily="18" charset="0"/>
+                <a:cs typeface="Times New Roman" pitchFamily="18" charset="0"/>
               </a:rPr>
-              <a:t>  Vizualizácia softvérových metrík (</a:t>
-            </a:r>
-            <a:r>
-              <a:rPr lang="sk-SK" sz="1200" dirty="0" err="1" smtClean="0">
-                <a:latin typeface="Arial" pitchFamily="34" charset="0"/>
-                <a:cs typeface="Arial" pitchFamily="34" charset="0"/>
+              <a:t>Paralelizovanie výpočtovo náročných operácií </a:t>
+            </a:r>
+          </a:p>
+          <a:p>
+            <a:pPr>
+              <a:lnSpc>
+                <a:spcPct val="200000"/>
+              </a:lnSpc>
+              <a:buFont typeface="Arial" pitchFamily="34" charset="0"/>
+              <a:buChar char="•"/>
+              <a:defRPr/>
+            </a:pPr>
+            <a:r>
+              <a:rPr lang="sk-SK" sz="1200" kern="0" dirty="0" smtClean="0">
+                <a:ln w="18415" cmpd="sng">
+                  <a:noFill/>
+                  <a:prstDash val="solid"/>
+                </a:ln>
+                <a:solidFill>
+                  <a:srgbClr val="FFFFFF"/>
+                </a:solidFill>
+                <a:effectLst>
+                  <a:outerShdw blurRad="50800" dist="38100" dir="2700000" algn="tl" rotWithShape="0">
+                    <a:prstClr val="black">
+                      <a:alpha val="40000"/>
+                    </a:prstClr>
+                  </a:outerShdw>
+                </a:effectLst>
+                <a:latin typeface="Times New Roman" pitchFamily="18" charset="0"/>
+                <a:cs typeface="Times New Roman" pitchFamily="18" charset="0"/>
               </a:rPr>
-              <a:t>Cyklomatická</a:t>
-            </a:r>
-            <a:r>
-              <a:rPr lang="sk-SK" sz="1200" dirty="0" smtClean="0">
-                <a:latin typeface="Arial" pitchFamily="34" charset="0"/>
-                <a:cs typeface="Arial" pitchFamily="34" charset="0"/>
+              <a:t> Prenesenie spracovania AST stromu na stranu Lua</a:t>
+            </a:r>
+          </a:p>
+          <a:p>
+            <a:pPr>
+              <a:lnSpc>
+                <a:spcPct val="200000"/>
+              </a:lnSpc>
+              <a:buFont typeface="Arial" pitchFamily="34" charset="0"/>
+              <a:buChar char="•"/>
+              <a:defRPr/>
+            </a:pPr>
+            <a:r>
+              <a:rPr lang="sk-SK" sz="1200" kern="0" dirty="0" smtClean="0">
+                <a:ln w="18415" cmpd="sng">
+                  <a:noFill/>
+                  <a:prstDash val="solid"/>
+                </a:ln>
+                <a:solidFill>
+                  <a:srgbClr val="FFFFFF"/>
+                </a:solidFill>
+                <a:effectLst>
+                  <a:outerShdw blurRad="50800" dist="38100" dir="2700000" algn="tl" rotWithShape="0">
+                    <a:prstClr val="black">
+                      <a:alpha val="40000"/>
+                    </a:prstClr>
+                  </a:outerShdw>
+                </a:effectLst>
+                <a:latin typeface="Times New Roman" pitchFamily="18" charset="0"/>
+                <a:cs typeface="Times New Roman" pitchFamily="18" charset="0"/>
               </a:rPr>
-              <a:t> zložitosť, CK metriky a pod.)  </a:t>
-            </a:r>
-            <a:endParaRPr lang="sk-SK" dirty="0" smtClean="0">
-              <a:latin typeface="Arial" pitchFamily="34" charset="0"/>
-              <a:cs typeface="Arial" pitchFamily="34" charset="0"/>
+              <a:t> Zabudovanie pokročilej práce s textom – Undo, Redo, Copy/Paste</a:t>
+            </a:r>
+          </a:p>
+          <a:p>
+            <a:pPr>
+              <a:lnSpc>
+                <a:spcPct val="200000"/>
+              </a:lnSpc>
+              <a:buFont typeface="Arial" pitchFamily="34" charset="0"/>
+              <a:buChar char="•"/>
+              <a:defRPr/>
+            </a:pPr>
+            <a:r>
+              <a:rPr lang="sk-SK" sz="1200" kern="0" dirty="0" smtClean="0">
+                <a:ln w="18415" cmpd="sng">
+                  <a:noFill/>
+                  <a:prstDash val="solid"/>
+                </a:ln>
+                <a:solidFill>
+                  <a:srgbClr val="FFFFFF"/>
+                </a:solidFill>
+                <a:effectLst>
+                  <a:outerShdw blurRad="50800" dist="38100" dir="2700000" algn="tl" rotWithShape="0">
+                    <a:prstClr val="black">
+                      <a:alpha val="40000"/>
+                    </a:prstClr>
+                  </a:outerShdw>
+                </a:effectLst>
+                <a:latin typeface="Times New Roman" pitchFamily="18" charset="0"/>
+                <a:cs typeface="Times New Roman" pitchFamily="18" charset="0"/>
+              </a:rPr>
+              <a:t> Zabudovanie a vytvorenie vlastných Shortcuts</a:t>
+            </a:r>
+            <a:endParaRPr lang="pl-PL" sz="1200" kern="0" dirty="0" smtClean="0">
+              <a:ln w="18415" cmpd="sng">
+                <a:noFill/>
+                <a:prstDash val="solid"/>
+              </a:ln>
+              <a:solidFill>
+                <a:srgbClr val="FFFFFF"/>
+              </a:solidFill>
+              <a:effectLst>
+                <a:outerShdw blurRad="50800" dist="38100" dir="2700000" algn="tl" rotWithShape="0">
+                  <a:prstClr val="black">
+                    <a:alpha val="40000"/>
+                  </a:prstClr>
+                </a:outerShdw>
+              </a:effectLst>
+              <a:latin typeface="Times New Roman" pitchFamily="18" charset="0"/>
+              <a:cs typeface="Times New Roman" pitchFamily="18" charset="0"/>
             </a:endParaRPr>
           </a:p>
           <a:p>
-            <a:endParaRPr lang="sk-SK" dirty="0" smtClean="0">
-              <a:latin typeface="Arial" pitchFamily="34" charset="0"/>
-              <a:cs typeface="Arial" pitchFamily="34" charset="0"/>
+            <a:r>
+              <a:rPr lang="sk-SK" sz="1200" kern="0" dirty="0" smtClean="0">
+                <a:ln w="18415" cmpd="sng">
+                  <a:noFill/>
+                  <a:prstDash val="solid"/>
+                </a:ln>
+                <a:solidFill>
+                  <a:srgbClr val="FFFFFF"/>
+                </a:solidFill>
+                <a:effectLst>
+                  <a:outerShdw blurRad="50800" dist="38100" dir="2700000" algn="tl" rotWithShape="0">
+                    <a:prstClr val="black">
+                      <a:alpha val="40000"/>
+                    </a:prstClr>
+                  </a:outerShdw>
+                </a:effectLst>
+                <a:latin typeface="Times New Roman" pitchFamily="18" charset="0"/>
+                <a:cs typeface="Times New Roman" pitchFamily="18" charset="0"/>
+              </a:rPr>
+              <a:t>Práca s editorom založená na dvoch módoch (textový a grafický)</a:t>
+            </a:r>
+          </a:p>
+          <a:p>
+            <a:endParaRPr lang="sk-SK" sz="1200" kern="0" dirty="0" smtClean="0">
+              <a:ln w="18415" cmpd="sng">
+                <a:noFill/>
+                <a:prstDash val="solid"/>
+              </a:ln>
+              <a:solidFill>
+                <a:srgbClr val="FFFFFF"/>
+              </a:solidFill>
+              <a:effectLst>
+                <a:outerShdw blurRad="50800" dist="38100" dir="2700000" algn="tl" rotWithShape="0">
+                  <a:prstClr val="black">
+                    <a:alpha val="40000"/>
+                  </a:prstClr>
+                </a:outerShdw>
+              </a:effectLst>
+              <a:latin typeface="Times New Roman" pitchFamily="18" charset="0"/>
+              <a:cs typeface="Times New Roman" pitchFamily="18" charset="0"/>
             </a:endParaRPr>
           </a:p>
           <a:p>
             <a:r>
-              <a:rPr lang="sk-SK" dirty="0" smtClean="0">
-                <a:latin typeface="Arial" pitchFamily="34" charset="0"/>
-                <a:cs typeface="Arial" pitchFamily="34" charset="0"/>
+              <a:rPr lang="sk-SK" sz="1200" kern="0" dirty="0" smtClean="0">
+                <a:ln w="18415" cmpd="sng">
+                  <a:noFill/>
+                  <a:prstDash val="solid"/>
+                </a:ln>
+                <a:solidFill>
+                  <a:srgbClr val="FFFFFF"/>
+                </a:solidFill>
+                <a:effectLst>
+                  <a:outerShdw blurRad="50800" dist="38100" dir="2700000" algn="tl" rotWithShape="0">
+                    <a:prstClr val="black">
+                      <a:alpha val="40000"/>
+                    </a:prstClr>
+                  </a:outerShdw>
+                </a:effectLst>
+                <a:latin typeface="Times New Roman" pitchFamily="18" charset="0"/>
+                <a:cs typeface="Times New Roman" pitchFamily="18" charset="0"/>
               </a:rPr>
-              <a:t>ale by oslovil širšie spektrum vývojárov, ktorí by sa aj zapojili do ďalšieho vývoja editora </a:t>
-            </a:r>
-          </a:p>
-          <a:p>
-            <a:r>
-              <a:rPr lang="sk-SK" sz="1200" dirty="0" smtClean="0">
-                <a:latin typeface="Arial" pitchFamily="34" charset="0"/>
-                <a:cs typeface="Arial" pitchFamily="34" charset="0"/>
+              <a:t>Povedat niečo</a:t>
+            </a:r>
+            <a:r>
+              <a:rPr lang="sk-SK" sz="1200" kern="0" baseline="0" dirty="0" smtClean="0">
+                <a:ln w="18415" cmpd="sng">
+                  <a:noFill/>
+                  <a:prstDash val="solid"/>
+                </a:ln>
+                <a:solidFill>
+                  <a:srgbClr val="FFFFFF"/>
+                </a:solidFill>
+                <a:effectLst>
+                  <a:outerShdw blurRad="50800" dist="38100" dir="2700000" algn="tl" rotWithShape="0">
+                    <a:prstClr val="black">
+                      <a:alpha val="40000"/>
+                    </a:prstClr>
+                  </a:outerShdw>
+                </a:effectLst>
+                <a:latin typeface="Times New Roman" pitchFamily="18" charset="0"/>
+                <a:cs typeface="Times New Roman" pitchFamily="18" charset="0"/>
               </a:rPr>
-              <a:t>Paralelizovanie výpočtovo náročných operácií - </a:t>
-            </a:r>
-            <a:r>
-              <a:rPr lang="pl-PL" sz="1200" dirty="0" smtClean="0">
-                <a:latin typeface="Arial" pitchFamily="34" charset="0"/>
-                <a:cs typeface="Arial" pitchFamily="34" charset="0"/>
+              <a:t> o funkcionalite :</a:t>
+            </a:r>
+          </a:p>
+          <a:p>
+            <a:pPr>
+              <a:buFontTx/>
+              <a:buChar char="-"/>
+            </a:pPr>
+            <a:r>
+              <a:rPr lang="sk-SK" sz="1200" kern="0" baseline="0" dirty="0" smtClean="0">
+                <a:ln w="18415" cmpd="sng">
+                  <a:noFill/>
+                  <a:prstDash val="solid"/>
+                </a:ln>
+                <a:solidFill>
+                  <a:srgbClr val="FFFFFF"/>
+                </a:solidFill>
+                <a:effectLst>
+                  <a:outerShdw blurRad="50800" dist="38100" dir="2700000" algn="tl" rotWithShape="0">
+                    <a:prstClr val="black">
+                      <a:alpha val="40000"/>
+                    </a:prstClr>
+                  </a:outerShdw>
+                </a:effectLst>
+                <a:latin typeface="Times New Roman" pitchFamily="18" charset="0"/>
+                <a:cs typeface="Times New Roman" pitchFamily="18" charset="0"/>
               </a:rPr>
-              <a:t>spracovanie syntaktickej analýzy na pozadí</a:t>
-            </a:r>
-            <a:endParaRPr lang="sk-SK" dirty="0" smtClean="0">
-              <a:latin typeface="Arial" pitchFamily="34" charset="0"/>
-              <a:cs typeface="Arial" pitchFamily="34" charset="0"/>
+              <a:t> Shortcuts</a:t>
+            </a:r>
+          </a:p>
+          <a:p>
+            <a:pPr>
+              <a:buFontTx/>
+              <a:buChar char="-"/>
+            </a:pPr>
+            <a:r>
+              <a:rPr lang="sk-SK" sz="1200" kern="0" baseline="0" dirty="0" smtClean="0">
+                <a:ln w="18415" cmpd="sng">
+                  <a:noFill/>
+                  <a:prstDash val="solid"/>
+                </a:ln>
+                <a:solidFill>
+                  <a:srgbClr val="FFFFFF"/>
+                </a:solidFill>
+                <a:effectLst>
+                  <a:outerShdw blurRad="50800" dist="38100" dir="2700000" algn="tl" rotWithShape="0">
+                    <a:prstClr val="black">
+                      <a:alpha val="40000"/>
+                    </a:prstClr>
+                  </a:outerShdw>
+                </a:effectLst>
+                <a:latin typeface="Times New Roman" pitchFamily="18" charset="0"/>
+                <a:cs typeface="Times New Roman" pitchFamily="18" charset="0"/>
+              </a:rPr>
+              <a:t>  dopytovani do Lua </a:t>
+            </a:r>
+          </a:p>
+          <a:p>
+            <a:pPr>
+              <a:buFontTx/>
+              <a:buChar char="-"/>
+            </a:pPr>
+            <a:r>
+              <a:rPr lang="sk-SK" sz="1200" kern="0" baseline="0" dirty="0" smtClean="0">
+                <a:ln w="18415" cmpd="sng">
+                  <a:noFill/>
+                  <a:prstDash val="solid"/>
+                </a:ln>
+                <a:solidFill>
+                  <a:srgbClr val="FFFFFF"/>
+                </a:solidFill>
+                <a:effectLst>
+                  <a:outerShdw blurRad="50800" dist="38100" dir="2700000" algn="tl" rotWithShape="0">
+                    <a:prstClr val="black">
+                      <a:alpha val="40000"/>
+                    </a:prstClr>
+                  </a:outerShdw>
+                </a:effectLst>
+                <a:latin typeface="Times New Roman" pitchFamily="18" charset="0"/>
+                <a:cs typeface="Times New Roman" pitchFamily="18" charset="0"/>
+              </a:rPr>
+              <a:t>  dva  mody ukazat </a:t>
+            </a:r>
+            <a:endParaRPr lang="sk-SK" sz="1200" kern="0" dirty="0" smtClean="0">
+              <a:ln w="18415" cmpd="sng">
+                <a:noFill/>
+                <a:prstDash val="solid"/>
+              </a:ln>
+              <a:solidFill>
+                <a:srgbClr val="FFFFFF"/>
+              </a:solidFill>
+              <a:effectLst>
+                <a:outerShdw blurRad="50800" dist="38100" dir="2700000" algn="tl" rotWithShape="0">
+                  <a:prstClr val="black">
+                    <a:alpha val="40000"/>
+                  </a:prstClr>
+                </a:outerShdw>
+              </a:effectLst>
+              <a:latin typeface="Times New Roman" pitchFamily="18" charset="0"/>
+              <a:cs typeface="Times New Roman" pitchFamily="18" charset="0"/>
             </a:endParaRPr>
-          </a:p>
-          <a:p>
-            <a:endParaRPr lang="sk-SK" dirty="0" smtClean="0">
-              <a:latin typeface="Arial" pitchFamily="34" charset="0"/>
-              <a:cs typeface="Arial" pitchFamily="34" charset="0"/>
-            </a:endParaRPr>
-          </a:p>
-          <a:p>
-            <a:r>
-              <a:rPr lang="sk-SK" dirty="0" smtClean="0"/>
-              <a:t>Prebiehajú  experimenty  s používateľským  rozhraním a pohrávame sa s myšlienkou grafickej vizualizácie zdrojového kódu pre rôzne aspekty ako napr. </a:t>
-            </a:r>
-          </a:p>
-          <a:p>
-            <a:r>
-              <a:rPr lang="sk-SK" dirty="0" smtClean="0"/>
-              <a:t>vizualizáciu softvérových metrík.</a:t>
-            </a:r>
-          </a:p>
-          <a:p>
-            <a:endParaRPr lang="sk-SK" dirty="0" smtClean="0"/>
-          </a:p>
-          <a:p>
-            <a:r>
-              <a:rPr lang="sk-SK" dirty="0" smtClean="0"/>
-              <a:t>tvorba dokumentácie – umožniť písanie dokumentácie priamo do zdrojového kódu, a poskytnúť: </a:t>
-            </a:r>
-          </a:p>
-          <a:p>
-            <a:r>
-              <a:rPr lang="sk-SK" dirty="0" smtClean="0"/>
-              <a:t>o  priame formátovanie textu </a:t>
-            </a:r>
-          </a:p>
-          <a:p>
-            <a:r>
-              <a:rPr lang="sk-SK" dirty="0" smtClean="0"/>
-              <a:t>o  samostatný aj kombinovaný výstup pre kompilovateľný program a dokumentáciu</a:t>
-            </a:r>
-          </a:p>
-          <a:p>
-            <a:endParaRPr lang="sk-SK" dirty="0" smtClean="0"/>
-          </a:p>
-          <a:p>
-            <a:r>
-              <a:rPr lang="sk-SK" dirty="0" smtClean="0"/>
-              <a:t>hlbšia analýza zdrojového kódu za účelom hľadania pachov kódu (</a:t>
-            </a:r>
-            <a:r>
-              <a:rPr lang="sk-SK" dirty="0" err="1" smtClean="0"/>
-              <a:t>code</a:t>
-            </a:r>
-            <a:r>
-              <a:rPr lang="sk-SK" dirty="0" smtClean="0"/>
-              <a:t> </a:t>
-            </a:r>
-            <a:r>
-              <a:rPr lang="sk-SK" dirty="0" err="1" smtClean="0"/>
-              <a:t>smells</a:t>
-            </a:r>
-            <a:r>
-              <a:rPr lang="sk-SK" dirty="0" smtClean="0"/>
-              <a:t>), </a:t>
-            </a:r>
           </a:p>
         </p:txBody>
       </p:sp>
@@ -11867,6 +12047,303 @@
 </file>
 
 <file path=ppt/slides/slide10.xml><?xml version="1.0" encoding="utf-8"?>
+<p:sld xmlns:a="http://schemas.openxmlformats.org/drawingml/2006/main" xmlns:r="http://schemas.openxmlformats.org/officeDocument/2006/relationships" xmlns:p="http://schemas.openxmlformats.org/presentationml/2006/main">
+  <p:cSld>
+    <p:spTree>
+      <p:nvGrpSpPr>
+        <p:cNvPr id="1" name=""/>
+        <p:cNvGrpSpPr/>
+        <p:nvPr/>
+      </p:nvGrpSpPr>
+      <p:grpSpPr>
+        <a:xfrm>
+          <a:off x="0" y="0"/>
+          <a:ext cx="0" cy="0"/>
+          <a:chOff x="0" y="0"/>
+          <a:chExt cx="0" cy="0"/>
+        </a:xfrm>
+      </p:grpSpPr>
+      <p:sp>
+        <p:nvSpPr>
+          <p:cNvPr id="8" name="BlokTextu 7"/>
+          <p:cNvSpPr txBox="1"/>
+          <p:nvPr/>
+        </p:nvSpPr>
+        <p:spPr>
+          <a:xfrm>
+            <a:off x="683568" y="123478"/>
+            <a:ext cx="4680520" cy="707886"/>
+          </a:xfrm>
+          <a:prstGeom prst="rect">
+            <a:avLst/>
+          </a:prstGeom>
+          <a:noFill/>
+        </p:spPr>
+        <p:txBody>
+          <a:bodyPr wrap="square" rtlCol="0">
+            <a:spAutoFit/>
+          </a:bodyPr>
+          <a:lstStyle/>
+          <a:p>
+            <a:r>
+              <a:rPr lang="sk-SK" sz="4000" b="1" dirty="0" smtClean="0">
+                <a:solidFill>
+                  <a:srgbClr val="404040"/>
+                </a:solidFill>
+                <a:ea typeface="KaiTi" pitchFamily="49" charset="-122"/>
+              </a:rPr>
+              <a:t>Ukážka </a:t>
+            </a:r>
+            <a:r>
+              <a:rPr lang="sk-SK" sz="4000" b="1" dirty="0" smtClean="0">
+                <a:solidFill>
+                  <a:srgbClr val="720606"/>
+                </a:solidFill>
+                <a:ea typeface="KaiTi" pitchFamily="49" charset="-122"/>
+              </a:rPr>
+              <a:t>projektu</a:t>
+            </a:r>
+            <a:endParaRPr lang="sk-SK" sz="4000" b="1" dirty="0">
+              <a:solidFill>
+                <a:srgbClr val="720606"/>
+              </a:solidFill>
+              <a:ea typeface="KaiTi" pitchFamily="49" charset="-122"/>
+            </a:endParaRPr>
+          </a:p>
+        </p:txBody>
+      </p:sp>
+      <p:sp>
+        <p:nvSpPr>
+          <p:cNvPr id="13" name="TextBox 2"/>
+          <p:cNvSpPr txBox="1"/>
+          <p:nvPr/>
+        </p:nvSpPr>
+        <p:spPr>
+          <a:xfrm>
+            <a:off x="2951312" y="2139702"/>
+            <a:ext cx="6192688" cy="2431435"/>
+          </a:xfrm>
+          <a:prstGeom prst="rect">
+            <a:avLst/>
+          </a:prstGeom>
+          <a:noFill/>
+        </p:spPr>
+        <p:txBody>
+          <a:bodyPr wrap="square" lIns="0" tIns="0" rIns="0" bIns="0" rtlCol="0">
+            <a:spAutoFit/>
+          </a:bodyPr>
+          <a:lstStyle/>
+          <a:p>
+            <a:pPr marL="0" marR="0" lvl="0" indent="0" defTabSz="914400" eaLnBrk="1" fontAlgn="auto" latinLnBrk="0" hangingPunct="1">
+              <a:lnSpc>
+                <a:spcPct val="100000"/>
+              </a:lnSpc>
+              <a:spcBef>
+                <a:spcPts val="0"/>
+              </a:spcBef>
+              <a:spcAft>
+                <a:spcPts val="0"/>
+              </a:spcAft>
+              <a:buClrTx/>
+              <a:buSzTx/>
+              <a:buFontTx/>
+              <a:buNone/>
+              <a:tabLst/>
+              <a:defRPr/>
+            </a:pPr>
+            <a:r>
+              <a:rPr lang="sk-SK" sz="13200" i="1" kern="0" spc="-300" dirty="0" smtClean="0">
+                <a:ln w="18415" cmpd="sng">
+                  <a:solidFill>
+                    <a:srgbClr val="FFFFFF"/>
+                  </a:solidFill>
+                  <a:prstDash val="solid"/>
+                </a:ln>
+                <a:solidFill>
+                  <a:srgbClr val="FFFFFF"/>
+                </a:solidFill>
+                <a:effectLst>
+                  <a:outerShdw blurRad="50800" dist="38100" dir="2700000" algn="tl" rotWithShape="0">
+                    <a:prstClr val="black">
+                      <a:alpha val="40000"/>
+                    </a:prstClr>
+                  </a:outerShdw>
+                  <a:reflection blurRad="6350" stA="55000" endA="300" endPos="45500" dir="5400000" sy="-100000" algn="bl" rotWithShape="0"/>
+                </a:effectLst>
+                <a:latin typeface="Square721 BT" pitchFamily="34" charset="0"/>
+              </a:rPr>
+              <a:t> </a:t>
+            </a:r>
+            <a:r>
+              <a:rPr lang="sk-SK" sz="15800" b="1" kern="0" spc="-300" dirty="0" err="1" smtClean="0">
+                <a:ln w="18415" cmpd="sng">
+                  <a:noFill/>
+                  <a:prstDash val="solid"/>
+                </a:ln>
+                <a:solidFill>
+                  <a:srgbClr val="404040"/>
+                </a:solidFill>
+                <a:latin typeface="Arial" pitchFamily="34" charset="0"/>
+                <a:cs typeface="Arial" pitchFamily="34" charset="0"/>
+              </a:rPr>
+              <a:t>demo</a:t>
+            </a:r>
+            <a:r>
+              <a:rPr lang="sk-SK" sz="15800" b="1" i="1" kern="0" spc="-300" dirty="0" smtClean="0">
+                <a:ln w="18415" cmpd="sng">
+                  <a:noFill/>
+                  <a:prstDash val="solid"/>
+                </a:ln>
+                <a:solidFill>
+                  <a:srgbClr val="404040"/>
+                </a:solidFill>
+                <a:latin typeface="Arial" pitchFamily="34" charset="0"/>
+                <a:cs typeface="Arial" pitchFamily="34" charset="0"/>
+              </a:rPr>
+              <a:t> </a:t>
+            </a:r>
+            <a:r>
+              <a:rPr lang="sk-SK" sz="6000" b="1" i="1" kern="0" spc="-300" dirty="0" smtClean="0">
+                <a:ln w="18415" cmpd="sng">
+                  <a:noFill/>
+                  <a:prstDash val="solid"/>
+                </a:ln>
+                <a:solidFill>
+                  <a:srgbClr val="404040"/>
+                </a:solidFill>
+                <a:latin typeface="Square721 BT" pitchFamily="34" charset="0"/>
+              </a:rPr>
+              <a:t> </a:t>
+            </a:r>
+            <a:endParaRPr kumimoji="0" lang="en-US" sz="11000" b="1" i="1" u="none" strike="noStrike" kern="0" cap="none" spc="-300" normalizeH="0" baseline="0" noProof="0" dirty="0" smtClean="0">
+              <a:ln w="18415" cmpd="sng">
+                <a:noFill/>
+                <a:prstDash val="solid"/>
+              </a:ln>
+              <a:solidFill>
+                <a:srgbClr val="404040"/>
+              </a:solidFill>
+              <a:uLnTx/>
+              <a:uFillTx/>
+              <a:latin typeface="Square721 BT" pitchFamily="34" charset="0"/>
+            </a:endParaRPr>
+          </a:p>
+        </p:txBody>
+      </p:sp>
+      <p:sp>
+        <p:nvSpPr>
+          <p:cNvPr id="6" name="AutoShape 7"/>
+          <p:cNvSpPr>
+            <a:spLocks noChangeArrowheads="1"/>
+          </p:cNvSpPr>
+          <p:nvPr/>
+        </p:nvSpPr>
+        <p:spPr bwMode="auto">
+          <a:xfrm flipV="1">
+            <a:off x="0" y="267494"/>
+            <a:ext cx="467544" cy="456406"/>
+          </a:xfrm>
+          <a:prstGeom prst="homePlate">
+            <a:avLst>
+              <a:gd name="adj" fmla="val 0"/>
+            </a:avLst>
+          </a:prstGeom>
+          <a:solidFill>
+            <a:srgbClr val="720606"/>
+          </a:solidFill>
+          <a:ln w="9525">
+            <a:noFill/>
+            <a:miter lim="800000"/>
+            <a:headEnd/>
+            <a:tailEnd/>
+          </a:ln>
+        </p:spPr>
+        <p:txBody>
+          <a:bodyPr vert="horz" wrap="square" lIns="91778" tIns="45894" rIns="91778" bIns="45894" numCol="1" anchor="t" anchorCtr="0" compatLnSpc="1">
+            <a:prstTxWarp prst="textNoShape">
+              <a:avLst/>
+            </a:prstTxWarp>
+          </a:bodyPr>
+          <a:lstStyle/>
+          <a:p>
+            <a:pPr algn="ctr" defTabSz="917808" fontAlgn="base">
+              <a:spcBef>
+                <a:spcPct val="0"/>
+              </a:spcBef>
+              <a:spcAft>
+                <a:spcPts val="1003"/>
+              </a:spcAft>
+            </a:pPr>
+            <a:r>
+              <a:rPr lang="sk-SK" sz="1500" b="1" dirty="0" smtClean="0">
+                <a:latin typeface="Calibri" pitchFamily="34" charset="0"/>
+                <a:cs typeface="Arial" pitchFamily="34" charset="0"/>
+              </a:rPr>
+              <a:t> </a:t>
+            </a:r>
+            <a:endParaRPr lang="sk-SK" sz="2000" dirty="0" smtClean="0">
+              <a:latin typeface="Arial" pitchFamily="34" charset="0"/>
+              <a:cs typeface="Arial" pitchFamily="34" charset="0"/>
+            </a:endParaRPr>
+          </a:p>
+        </p:txBody>
+      </p:sp>
+      <p:cxnSp>
+        <p:nvCxnSpPr>
+          <p:cNvPr id="7" name="Rovná spojnica 6"/>
+          <p:cNvCxnSpPr/>
+          <p:nvPr/>
+        </p:nvCxnSpPr>
+        <p:spPr>
+          <a:xfrm>
+            <a:off x="762000" y="800100"/>
+            <a:ext cx="5638800" cy="0"/>
+          </a:xfrm>
+          <a:prstGeom prst="line">
+            <a:avLst/>
+          </a:prstGeom>
+          <a:ln>
+            <a:solidFill>
+              <a:schemeClr val="bg1">
+                <a:lumMod val="50000"/>
+              </a:schemeClr>
+            </a:solidFill>
+          </a:ln>
+        </p:spPr>
+        <p:style>
+          <a:lnRef idx="1">
+            <a:schemeClr val="accent1"/>
+          </a:lnRef>
+          <a:fillRef idx="0">
+            <a:schemeClr val="accent1"/>
+          </a:fillRef>
+          <a:effectRef idx="0">
+            <a:schemeClr val="accent1"/>
+          </a:effectRef>
+          <a:fontRef idx="minor">
+            <a:schemeClr val="tx1"/>
+          </a:fontRef>
+        </p:style>
+      </p:cxnSp>
+    </p:spTree>
+  </p:cSld>
+  <p:clrMapOvr>
+    <a:masterClrMapping/>
+  </p:clrMapOvr>
+  <p:transition>
+    <p:push/>
+  </p:transition>
+  <p:timing>
+    <p:tnLst>
+      <p:par>
+        <p:cTn id="1" dur="indefinite" restart="never" nodeType="tmRoot"/>
+      </p:par>
+    </p:tnLst>
+  </p:timing>
+</p:sld>
+</file>
+
+<file path=ppt/slides/slide11.xml><?xml version="1.0" encoding="utf-8"?>
 <p:sld xmlns:a="http://schemas.openxmlformats.org/drawingml/2006/main" xmlns:r="http://schemas.openxmlformats.org/officeDocument/2006/relationships" xmlns:p="http://schemas.openxmlformats.org/presentationml/2006/main">
   <p:cSld>
     <p:spTree>
@@ -12403,19 +12880,7 @@
                   <a:latin typeface="Arial" pitchFamily="34" charset="0"/>
                   <a:cs typeface="Arial" pitchFamily="34" charset="0"/>
                 </a:rPr>
-                <a:t>podpora </a:t>
-              </a:r>
-              <a:r>
-                <a:rPr lang="sk-SK" sz="1200" smtClean="0">
-                  <a:solidFill>
-                    <a:schemeClr val="bg1">
-                      <a:lumMod val="50000"/>
-                    </a:schemeClr>
-                  </a:solidFill>
-                  <a:latin typeface="Arial" pitchFamily="34" charset="0"/>
-                  <a:cs typeface="Arial" pitchFamily="34" charset="0"/>
-                </a:rPr>
-                <a:t>plug-in</a:t>
+                <a:t>podpora plug-in</a:t>
               </a:r>
               <a:endParaRPr lang="sk-SK" sz="1200" dirty="0">
                 <a:solidFill>
@@ -12518,67 +12983,7 @@
                   <a:latin typeface="Arial" pitchFamily="34" charset="0"/>
                   <a:cs typeface="Arial" pitchFamily="34" charset="0"/>
                 </a:rPr>
-                <a:t>podpora </a:t>
-              </a:r>
-              <a:r>
-                <a:rPr lang="sk-SK" sz="1200" smtClean="0">
-                  <a:solidFill>
-                    <a:schemeClr val="bg1">
-                      <a:lumMod val="50000"/>
-                    </a:schemeClr>
-                  </a:solidFill>
-                  <a:latin typeface="Arial" pitchFamily="34" charset="0"/>
-                  <a:cs typeface="Arial" pitchFamily="34" charset="0"/>
-                </a:rPr>
-                <a:t>paralelizmu</a:t>
-              </a:r>
-              <a:r>
-                <a:rPr lang="sk-SK" sz="1200" smtClean="0">
-                  <a:solidFill>
-                    <a:schemeClr val="bg1">
-                      <a:lumMod val="50000"/>
-                    </a:schemeClr>
-                  </a:solidFill>
-                  <a:latin typeface="Arial" pitchFamily="34" charset="0"/>
-                  <a:cs typeface="Arial" pitchFamily="34" charset="0"/>
-                </a:rPr>
-                <a:t>, </a:t>
-              </a:r>
-              <a:r>
-                <a:rPr lang="sk-SK" sz="1200" smtClean="0">
-                  <a:solidFill>
-                    <a:schemeClr val="bg1">
-                      <a:lumMod val="50000"/>
-                    </a:schemeClr>
-                  </a:solidFill>
-                  <a:latin typeface="Arial" pitchFamily="34" charset="0"/>
-                  <a:cs typeface="Arial" pitchFamily="34" charset="0"/>
-                </a:rPr>
-                <a:t>nov</a:t>
-              </a:r>
-              <a:r>
-                <a:rPr lang="sk-SK" sz="1200" smtClean="0">
-                  <a:solidFill>
-                    <a:schemeClr val="bg1">
-                      <a:lumMod val="50000"/>
-                    </a:schemeClr>
-                  </a:solidFill>
-                  <a:latin typeface="Arial" pitchFamily="34" charset="0"/>
-                  <a:cs typeface="Arial" pitchFamily="34" charset="0"/>
-                </a:rPr>
-                <a:t>é</a:t>
-              </a:r>
-              <a:r>
-                <a:rPr lang="sk-SK" sz="1200" smtClean="0">
-                  <a:solidFill>
-                    <a:schemeClr val="bg1">
-                      <a:lumMod val="50000"/>
-                    </a:schemeClr>
-                  </a:solidFill>
-                  <a:latin typeface="Arial" pitchFamily="34" charset="0"/>
-                  <a:cs typeface="Arial" pitchFamily="34" charset="0"/>
-                </a:rPr>
-                <a:t> </a:t>
+                <a:t>podpora paralelizmu, nové </a:t>
               </a:r>
               <a:r>
                 <a:rPr lang="sk-SK" sz="1200" dirty="0" smtClean="0">
@@ -13752,7 +14157,7 @@
 </p:sld>
 </file>
 
-<file path=ppt/slides/slide11.xml><?xml version="1.0" encoding="utf-8"?>
+<file path=ppt/slides/slide12.xml><?xml version="1.0" encoding="utf-8"?>
 <p:sld xmlns:a="http://schemas.openxmlformats.org/drawingml/2006/main" xmlns:r="http://schemas.openxmlformats.org/officeDocument/2006/relationships" xmlns:p="http://schemas.openxmlformats.org/presentationml/2006/main">
   <p:cSld>
     <p:spTree>
@@ -14356,19 +14761,7 @@
                   <a:latin typeface="Arial" pitchFamily="34" charset="0"/>
                   <a:cs typeface="Arial" pitchFamily="34" charset="0"/>
                 </a:rPr>
-                <a:t>podpora </a:t>
-              </a:r>
-              <a:r>
-                <a:rPr lang="sk-SK" sz="1200" smtClean="0">
-                  <a:solidFill>
-                    <a:schemeClr val="bg1">
-                      <a:lumMod val="50000"/>
-                    </a:schemeClr>
-                  </a:solidFill>
-                  <a:latin typeface="Arial" pitchFamily="34" charset="0"/>
-                  <a:cs typeface="Arial" pitchFamily="34" charset="0"/>
-                </a:rPr>
-                <a:t>paralelizmu</a:t>
+                <a:t>podpora paralelizmu</a:t>
               </a:r>
               <a:r>
                 <a:rPr lang="sk-SK" sz="1200" dirty="0" smtClean="0">
@@ -15606,7 +15999,7 @@
 </p:sld>
 </file>
 
-<file path=ppt/slides/slide12.xml><?xml version="1.0" encoding="utf-8"?>
+<file path=ppt/slides/slide13.xml><?xml version="1.0" encoding="utf-8"?>
 <p:sld xmlns:a="http://schemas.openxmlformats.org/drawingml/2006/main" xmlns:r="http://schemas.openxmlformats.org/officeDocument/2006/relationships" xmlns:p="http://schemas.openxmlformats.org/presentationml/2006/main">
   <p:cSld>
     <p:spTree>
@@ -16011,7 +16404,7 @@
 </p:sld>
 </file>
 
-<file path=ppt/slides/slide13.xml><?xml version="1.0" encoding="utf-8"?>
+<file path=ppt/slides/slide14.xml><?xml version="1.0" encoding="utf-8"?>
 <p:sld xmlns:a="http://schemas.openxmlformats.org/drawingml/2006/main" xmlns:r="http://schemas.openxmlformats.org/officeDocument/2006/relationships" xmlns:p="http://schemas.openxmlformats.org/presentationml/2006/main">
   <p:cSld>
     <p:spTree>
@@ -16404,7 +16797,7 @@
 </p:sld>
 </file>
 
-<file path=ppt/slides/slide14.xml><?xml version="1.0" encoding="utf-8"?>
+<file path=ppt/slides/slide15.xml><?xml version="1.0" encoding="utf-8"?>
 <p:sld xmlns:a="http://schemas.openxmlformats.org/drawingml/2006/main" xmlns:r="http://schemas.openxmlformats.org/officeDocument/2006/relationships" xmlns:p="http://schemas.openxmlformats.org/presentationml/2006/main">
   <p:cSld>
     <p:spTree>
@@ -21904,30 +22297,21 @@
                             </p:childTnLst>
                           </p:cTn>
                         </p:par>
-                      </p:childTnLst>
-                    </p:cTn>
-                  </p:par>
-                  <p:par>
-                    <p:cTn id="20" fill="hold">
-                      <p:stCondLst>
-                        <p:cond delay="indefinite"/>
-                      </p:stCondLst>
-                      <p:childTnLst>
                         <p:par>
-                          <p:cTn id="21" fill="hold">
+                          <p:cTn id="20" fill="hold">
                             <p:stCondLst>
-                              <p:cond delay="0"/>
+                              <p:cond delay="500"/>
                             </p:stCondLst>
                             <p:childTnLst>
                               <p:par>
-                                <p:cTn id="22" presetID="53" presetClass="entr" presetSubtype="0" fill="hold" nodeType="clickEffect">
+                                <p:cTn id="21" presetID="53" presetClass="entr" presetSubtype="0" fill="hold" nodeType="afterEffect">
                                   <p:stCondLst>
                                     <p:cond delay="0"/>
                                   </p:stCondLst>
                                   <p:childTnLst>
                                     <p:set>
                                       <p:cBhvr>
-                                        <p:cTn id="23" dur="1" fill="hold">
+                                        <p:cTn id="22" dur="1" fill="hold">
                                           <p:stCondLst>
                                             <p:cond delay="0"/>
                                           </p:stCondLst>
@@ -21945,7 +22329,7 @@
                                     </p:set>
                                     <p:anim calcmode="lin" valueType="num">
                                       <p:cBhvr>
-                                        <p:cTn id="24" dur="500" fill="hold"/>
+                                        <p:cTn id="23" dur="500" fill="hold"/>
                                         <p:tgtEl>
                                           <p:spTgt spid="50"/>
                                         </p:tgtEl>
@@ -21968,7 +22352,7 @@
                                     </p:anim>
                                     <p:anim calcmode="lin" valueType="num">
                                       <p:cBhvr>
-                                        <p:cTn id="25" dur="500" fill="hold"/>
+                                        <p:cTn id="24" dur="500" fill="hold"/>
                                         <p:tgtEl>
                                           <p:spTgt spid="50"/>
                                         </p:tgtEl>
@@ -21991,7 +22375,7 @@
                                     </p:anim>
                                     <p:animEffect transition="in" filter="fade">
                                       <p:cBhvr>
-                                        <p:cTn id="26" dur="500"/>
+                                        <p:cTn id="25" dur="500"/>
                                         <p:tgtEl>
                                           <p:spTgt spid="50"/>
                                         </p:tgtEl>
@@ -22004,20 +22388,20 @@
                           </p:cTn>
                         </p:par>
                         <p:par>
-                          <p:cTn id="27" fill="hold">
+                          <p:cTn id="26" fill="hold">
                             <p:stCondLst>
-                              <p:cond delay="500"/>
+                              <p:cond delay="1000"/>
                             </p:stCondLst>
                             <p:childTnLst>
                               <p:par>
-                                <p:cTn id="28" presetID="53" presetClass="entr" presetSubtype="0" fill="hold" nodeType="afterEffect">
+                                <p:cTn id="27" presetID="53" presetClass="entr" presetSubtype="0" fill="hold" nodeType="afterEffect">
                                   <p:stCondLst>
                                     <p:cond delay="0"/>
                                   </p:stCondLst>
                                   <p:childTnLst>
                                     <p:set>
                                       <p:cBhvr>
-                                        <p:cTn id="29" dur="1" fill="hold">
+                                        <p:cTn id="28" dur="1" fill="hold">
                                           <p:stCondLst>
                                             <p:cond delay="0"/>
                                           </p:stCondLst>
@@ -22035,7 +22419,7 @@
                                     </p:set>
                                     <p:anim calcmode="lin" valueType="num">
                                       <p:cBhvr>
-                                        <p:cTn id="30" dur="500" fill="hold"/>
+                                        <p:cTn id="29" dur="500" fill="hold"/>
                                         <p:tgtEl>
                                           <p:spTgt spid="45"/>
                                         </p:tgtEl>
@@ -22058,7 +22442,7 @@
                                     </p:anim>
                                     <p:anim calcmode="lin" valueType="num">
                                       <p:cBhvr>
-                                        <p:cTn id="31" dur="500" fill="hold"/>
+                                        <p:cTn id="30" dur="500" fill="hold"/>
                                         <p:tgtEl>
                                           <p:spTgt spid="45"/>
                                         </p:tgtEl>
@@ -22081,7 +22465,7 @@
                                     </p:anim>
                                     <p:animEffect transition="in" filter="fade">
                                       <p:cBhvr>
-                                        <p:cTn id="32" dur="500"/>
+                                        <p:cTn id="31" dur="500"/>
                                         <p:tgtEl>
                                           <p:spTgt spid="45"/>
                                         </p:tgtEl>
@@ -22094,20 +22478,20 @@
                           </p:cTn>
                         </p:par>
                         <p:par>
-                          <p:cTn id="33" fill="hold">
+                          <p:cTn id="32" fill="hold">
                             <p:stCondLst>
-                              <p:cond delay="1000"/>
+                              <p:cond delay="1500"/>
                             </p:stCondLst>
                             <p:childTnLst>
                               <p:par>
-                                <p:cTn id="34" presetID="53" presetClass="entr" presetSubtype="0" fill="hold" nodeType="afterEffect">
+                                <p:cTn id="33" presetID="53" presetClass="entr" presetSubtype="0" fill="hold" nodeType="afterEffect">
                                   <p:stCondLst>
                                     <p:cond delay="0"/>
                                   </p:stCondLst>
                                   <p:childTnLst>
                                     <p:set>
                                       <p:cBhvr>
-                                        <p:cTn id="35" dur="1" fill="hold">
+                                        <p:cTn id="34" dur="1" fill="hold">
                                           <p:stCondLst>
                                             <p:cond delay="0"/>
                                           </p:stCondLst>
@@ -22125,7 +22509,7 @@
                                     </p:set>
                                     <p:anim calcmode="lin" valueType="num">
                                       <p:cBhvr>
-                                        <p:cTn id="36" dur="500" fill="hold"/>
+                                        <p:cTn id="35" dur="500" fill="hold"/>
                                         <p:tgtEl>
                                           <p:spTgt spid="44"/>
                                         </p:tgtEl>
@@ -22148,7 +22532,7 @@
                                     </p:anim>
                                     <p:anim calcmode="lin" valueType="num">
                                       <p:cBhvr>
-                                        <p:cTn id="37" dur="500" fill="hold"/>
+                                        <p:cTn id="36" dur="500" fill="hold"/>
                                         <p:tgtEl>
                                           <p:spTgt spid="44"/>
                                         </p:tgtEl>
@@ -22171,7 +22555,7 @@
                                     </p:anim>
                                     <p:animEffect transition="in" filter="fade">
                                       <p:cBhvr>
-                                        <p:cTn id="38" dur="500"/>
+                                        <p:cTn id="37" dur="500"/>
                                         <p:tgtEl>
                                           <p:spTgt spid="44"/>
                                         </p:tgtEl>
@@ -24711,17 +25095,7 @@
                   <a:latin typeface="Arial" pitchFamily="34" charset="0"/>
                   <a:cs typeface="Arial" pitchFamily="34" charset="0"/>
                 </a:rPr>
-                <a:t>zdrojového </a:t>
-              </a:r>
-              <a:r>
-                <a:rPr lang="sk-SK" sz="1200" smtClean="0">
-                  <a:solidFill>
-                    <a:schemeClr val="bg1"/>
-                  </a:solidFill>
-                  <a:latin typeface="Arial" pitchFamily="34" charset="0"/>
-                  <a:cs typeface="Arial" pitchFamily="34" charset="0"/>
-                </a:rPr>
-                <a:t>kódu</a:t>
+                <a:t>zdrojového kódu</a:t>
               </a:r>
               <a:r>
                 <a:rPr lang="en-US" sz="1200" smtClean="0">
@@ -25253,17 +25627,7 @@
                   <a:latin typeface="Arial" pitchFamily="34" charset="0"/>
                   <a:cs typeface="Arial" pitchFamily="34" charset="0"/>
                 </a:rPr>
-                <a:t>vykreslenie </a:t>
-              </a:r>
-              <a:r>
-                <a:rPr lang="sk-SK" sz="1200" smtClean="0">
-                  <a:solidFill>
-                    <a:schemeClr val="bg1"/>
-                  </a:solidFill>
-                  <a:latin typeface="Arial" pitchFamily="34" charset="0"/>
-                  <a:cs typeface="Arial" pitchFamily="34" charset="0"/>
-                </a:rPr>
-                <a:t>kódu</a:t>
+                <a:t>vykreslenie kódu</a:t>
               </a:r>
               <a:r>
                 <a:rPr lang="en-US" sz="1200" smtClean="0">
@@ -29300,6 +29664,280 @@
         <p:spPr>
           <a:xfrm>
             <a:off x="683568" y="123478"/>
+            <a:ext cx="5256584" cy="707886"/>
+          </a:xfrm>
+          <a:prstGeom prst="rect">
+            <a:avLst/>
+          </a:prstGeom>
+          <a:noFill/>
+        </p:spPr>
+        <p:txBody>
+          <a:bodyPr wrap="square" rtlCol="0">
+            <a:spAutoFit/>
+          </a:bodyPr>
+          <a:lstStyle/>
+          <a:p>
+            <a:r>
+              <a:rPr lang="sk-SK" sz="4000" b="1" dirty="0" smtClean="0">
+                <a:solidFill>
+                  <a:srgbClr val="404040"/>
+                </a:solidFill>
+                <a:ea typeface="KaiTi" pitchFamily="49" charset="-122"/>
+              </a:rPr>
+              <a:t>Architektúra </a:t>
+            </a:r>
+            <a:r>
+              <a:rPr lang="sk-SK" sz="4000" b="1" dirty="0" smtClean="0">
+                <a:solidFill>
+                  <a:srgbClr val="720606"/>
+                </a:solidFill>
+                <a:ea typeface="KaiTi" pitchFamily="49" charset="-122"/>
+              </a:rPr>
+              <a:t>programu</a:t>
+            </a:r>
+            <a:endParaRPr lang="sk-SK" sz="4000" b="1" dirty="0">
+              <a:solidFill>
+                <a:srgbClr val="720606"/>
+              </a:solidFill>
+              <a:ea typeface="KaiTi" pitchFamily="49" charset="-122"/>
+            </a:endParaRPr>
+          </a:p>
+        </p:txBody>
+      </p:sp>
+      <p:sp>
+        <p:nvSpPr>
+          <p:cNvPr id="19" name="AutoShape 7"/>
+          <p:cNvSpPr>
+            <a:spLocks noChangeArrowheads="1"/>
+          </p:cNvSpPr>
+          <p:nvPr/>
+        </p:nvSpPr>
+        <p:spPr bwMode="auto">
+          <a:xfrm flipV="1">
+            <a:off x="0" y="267494"/>
+            <a:ext cx="467544" cy="456406"/>
+          </a:xfrm>
+          <a:prstGeom prst="homePlate">
+            <a:avLst>
+              <a:gd name="adj" fmla="val 0"/>
+            </a:avLst>
+          </a:prstGeom>
+          <a:solidFill>
+            <a:srgbClr val="720606"/>
+          </a:solidFill>
+          <a:ln w="9525">
+            <a:noFill/>
+            <a:miter lim="800000"/>
+            <a:headEnd/>
+            <a:tailEnd/>
+          </a:ln>
+        </p:spPr>
+        <p:txBody>
+          <a:bodyPr vert="horz" wrap="square" lIns="91778" tIns="45894" rIns="91778" bIns="45894" numCol="1" anchor="t" anchorCtr="0" compatLnSpc="1">
+            <a:prstTxWarp prst="textNoShape">
+              <a:avLst/>
+            </a:prstTxWarp>
+          </a:bodyPr>
+          <a:lstStyle/>
+          <a:p>
+            <a:pPr algn="ctr" defTabSz="917808" fontAlgn="base">
+              <a:spcBef>
+                <a:spcPct val="0"/>
+              </a:spcBef>
+              <a:spcAft>
+                <a:spcPts val="1003"/>
+              </a:spcAft>
+            </a:pPr>
+            <a:r>
+              <a:rPr lang="sk-SK" sz="1500" b="1" dirty="0" smtClean="0">
+                <a:latin typeface="Calibri" pitchFamily="34" charset="0"/>
+                <a:cs typeface="Arial" pitchFamily="34" charset="0"/>
+              </a:rPr>
+              <a:t> </a:t>
+            </a:r>
+            <a:endParaRPr lang="sk-SK" sz="2000" dirty="0" smtClean="0">
+              <a:latin typeface="Arial" pitchFamily="34" charset="0"/>
+              <a:cs typeface="Arial" pitchFamily="34" charset="0"/>
+            </a:endParaRPr>
+          </a:p>
+        </p:txBody>
+      </p:sp>
+      <p:cxnSp>
+        <p:nvCxnSpPr>
+          <p:cNvPr id="20" name="Rovná spojnica 19"/>
+          <p:cNvCxnSpPr/>
+          <p:nvPr/>
+        </p:nvCxnSpPr>
+        <p:spPr>
+          <a:xfrm>
+            <a:off x="762000" y="800100"/>
+            <a:ext cx="5638800" cy="0"/>
+          </a:xfrm>
+          <a:prstGeom prst="line">
+            <a:avLst/>
+          </a:prstGeom>
+          <a:ln>
+            <a:solidFill>
+              <a:schemeClr val="bg1">
+                <a:lumMod val="50000"/>
+              </a:schemeClr>
+            </a:solidFill>
+          </a:ln>
+        </p:spPr>
+        <p:style>
+          <a:lnRef idx="1">
+            <a:schemeClr val="accent1"/>
+          </a:lnRef>
+          <a:fillRef idx="0">
+            <a:schemeClr val="accent1"/>
+          </a:fillRef>
+          <a:effectRef idx="0">
+            <a:schemeClr val="accent1"/>
+          </a:effectRef>
+          <a:fontRef idx="minor">
+            <a:schemeClr val="tx1"/>
+          </a:fontRef>
+        </p:style>
+      </p:cxnSp>
+      <p:grpSp>
+        <p:nvGrpSpPr>
+          <p:cNvPr id="8" name="Skupina 7"/>
+          <p:cNvGrpSpPr/>
+          <p:nvPr/>
+        </p:nvGrpSpPr>
+        <p:grpSpPr>
+          <a:xfrm>
+            <a:off x="755576" y="915566"/>
+            <a:ext cx="4248472" cy="4035165"/>
+            <a:chOff x="611560" y="915566"/>
+            <a:chExt cx="4179948" cy="4035165"/>
+          </a:xfrm>
+        </p:grpSpPr>
+        <p:sp>
+          <p:nvSpPr>
+            <p:cNvPr id="6" name="Obdĺžnik 5"/>
+            <p:cNvSpPr/>
+            <p:nvPr/>
+          </p:nvSpPr>
+          <p:spPr>
+            <a:xfrm>
+              <a:off x="611560" y="915566"/>
+              <a:ext cx="4179948" cy="4032448"/>
+            </a:xfrm>
+            <a:prstGeom prst="rect">
+              <a:avLst/>
+            </a:prstGeom>
+            <a:solidFill>
+              <a:schemeClr val="bg1"/>
+            </a:solidFill>
+            <a:ln>
+              <a:noFill/>
+            </a:ln>
+          </p:spPr>
+          <p:style>
+            <a:lnRef idx="2">
+              <a:schemeClr val="accent1">
+                <a:shade val="50000"/>
+              </a:schemeClr>
+            </a:lnRef>
+            <a:fillRef idx="1">
+              <a:schemeClr val="accent1"/>
+            </a:fillRef>
+            <a:effectRef idx="0">
+              <a:schemeClr val="accent1"/>
+            </a:effectRef>
+            <a:fontRef idx="minor">
+              <a:schemeClr val="lt1"/>
+            </a:fontRef>
+          </p:style>
+          <p:txBody>
+            <a:bodyPr rtlCol="0" anchor="ctr"/>
+            <a:lstStyle/>
+            <a:p>
+              <a:pPr algn="ctr"/>
+              <a:endParaRPr lang="sk-SK"/>
+            </a:p>
+          </p:txBody>
+        </p:sp>
+        <p:pic>
+          <p:nvPicPr>
+            <p:cNvPr id="1026" name="Picture 2"/>
+            <p:cNvPicPr>
+              <a:picLocks noChangeAspect="1" noChangeArrowheads="1"/>
+            </p:cNvPicPr>
+            <p:nvPr/>
+          </p:nvPicPr>
+          <p:blipFill>
+            <a:blip r:embed="rId3" cstate="print"/>
+            <a:srcRect/>
+            <a:stretch>
+              <a:fillRect/>
+            </a:stretch>
+          </p:blipFill>
+          <p:spPr bwMode="auto">
+            <a:xfrm>
+              <a:off x="755576" y="915566"/>
+              <a:ext cx="3960440" cy="4035165"/>
+            </a:xfrm>
+            <a:prstGeom prst="rect">
+              <a:avLst/>
+            </a:prstGeom>
+            <a:solidFill>
+              <a:srgbClr val="FFFFFF"/>
+            </a:solidFill>
+            <a:ln w="9525">
+              <a:noFill/>
+              <a:miter lim="800000"/>
+              <a:headEnd/>
+              <a:tailEnd/>
+            </a:ln>
+          </p:spPr>
+        </p:pic>
+      </p:grpSp>
+    </p:spTree>
+  </p:cSld>
+  <p:clrMapOvr>
+    <a:masterClrMapping/>
+  </p:clrMapOvr>
+  <p:transition>
+    <p:push/>
+  </p:transition>
+  <p:timing>
+    <p:tnLst>
+      <p:par>
+        <p:cTn id="1" dur="indefinite" restart="never" nodeType="tmRoot"/>
+      </p:par>
+    </p:tnLst>
+  </p:timing>
+</p:sld>
+</file>
+
+<file path=ppt/slides/slide9.xml><?xml version="1.0" encoding="utf-8"?>
+<p:sld xmlns:a="http://schemas.openxmlformats.org/drawingml/2006/main" xmlns:r="http://schemas.openxmlformats.org/officeDocument/2006/relationships" xmlns:p="http://schemas.openxmlformats.org/presentationml/2006/main">
+  <p:cSld>
+    <p:spTree>
+      <p:nvGrpSpPr>
+        <p:cNvPr id="1" name=""/>
+        <p:cNvGrpSpPr/>
+        <p:nvPr/>
+      </p:nvGrpSpPr>
+      <p:grpSpPr>
+        <a:xfrm>
+          <a:off x="0" y="0"/>
+          <a:ext cx="0" cy="0"/>
+          <a:chOff x="0" y="0"/>
+          <a:chExt cx="0" cy="0"/>
+        </a:xfrm>
+      </p:grpSpPr>
+      <p:sp>
+        <p:nvSpPr>
+          <p:cNvPr id="7" name="BlokTextu 6"/>
+          <p:cNvSpPr txBox="1"/>
+          <p:nvPr/>
+        </p:nvSpPr>
+        <p:spPr>
+          <a:xfrm>
+            <a:off x="683568" y="123478"/>
             <a:ext cx="4680520" cy="707886"/>
           </a:xfrm>
           <a:prstGeom prst="rect">
@@ -29636,19 +30274,7 @@
                   <a:latin typeface="Arial" pitchFamily="34" charset="0"/>
                   <a:cs typeface="Arial" pitchFamily="34" charset="0"/>
                 </a:rPr>
-                <a:t>módmi </a:t>
-              </a:r>
-              <a:r>
-                <a:rPr lang="sk-SK" sz="1200" smtClean="0">
-                  <a:solidFill>
-                    <a:schemeClr val="bg1">
-                      <a:lumMod val="50000"/>
-                    </a:schemeClr>
-                  </a:solidFill>
-                  <a:latin typeface="Arial" pitchFamily="34" charset="0"/>
-                  <a:cs typeface="Arial" pitchFamily="34" charset="0"/>
-                </a:rPr>
-                <a:t>súčasn</a:t>
+                <a:t>módmi súčasn</a:t>
               </a:r>
               <a:r>
                 <a:rPr lang="en-US" sz="1200" smtClean="0">
@@ -29729,17 +30355,7 @@
                   <a:latin typeface="Arial" pitchFamily="34" charset="0"/>
                   <a:cs typeface="Arial" pitchFamily="34" charset="0"/>
                 </a:rPr>
-                <a:t>blokmi </a:t>
-              </a:r>
-              <a:r>
-                <a:rPr lang="sk-SK" sz="1600" smtClean="0">
-                  <a:solidFill>
-                    <a:srgbClr val="404040"/>
-                  </a:solidFill>
-                  <a:latin typeface="Arial" pitchFamily="34" charset="0"/>
-                  <a:cs typeface="Arial" pitchFamily="34" charset="0"/>
-                </a:rPr>
-                <a:t>textu</a:t>
+                <a:t>blokmi textu</a:t>
               </a:r>
               <a:r>
                 <a:rPr lang="en-US" sz="1600" smtClean="0">
@@ -31100,303 +31716,6 @@
             </p:seq>
           </p:childTnLst>
         </p:cTn>
-      </p:par>
-    </p:tnLst>
-  </p:timing>
-</p:sld>
-</file>
-
-<file path=ppt/slides/slide9.xml><?xml version="1.0" encoding="utf-8"?>
-<p:sld xmlns:a="http://schemas.openxmlformats.org/drawingml/2006/main" xmlns:r="http://schemas.openxmlformats.org/officeDocument/2006/relationships" xmlns:p="http://schemas.openxmlformats.org/presentationml/2006/main">
-  <p:cSld>
-    <p:spTree>
-      <p:nvGrpSpPr>
-        <p:cNvPr id="1" name=""/>
-        <p:cNvGrpSpPr/>
-        <p:nvPr/>
-      </p:nvGrpSpPr>
-      <p:grpSpPr>
-        <a:xfrm>
-          <a:off x="0" y="0"/>
-          <a:ext cx="0" cy="0"/>
-          <a:chOff x="0" y="0"/>
-          <a:chExt cx="0" cy="0"/>
-        </a:xfrm>
-      </p:grpSpPr>
-      <p:sp>
-        <p:nvSpPr>
-          <p:cNvPr id="8" name="BlokTextu 7"/>
-          <p:cNvSpPr txBox="1"/>
-          <p:nvPr/>
-        </p:nvSpPr>
-        <p:spPr>
-          <a:xfrm>
-            <a:off x="683568" y="123478"/>
-            <a:ext cx="4680520" cy="707886"/>
-          </a:xfrm>
-          <a:prstGeom prst="rect">
-            <a:avLst/>
-          </a:prstGeom>
-          <a:noFill/>
-        </p:spPr>
-        <p:txBody>
-          <a:bodyPr wrap="square" rtlCol="0">
-            <a:spAutoFit/>
-          </a:bodyPr>
-          <a:lstStyle/>
-          <a:p>
-            <a:r>
-              <a:rPr lang="sk-SK" sz="4000" b="1" dirty="0" smtClean="0">
-                <a:solidFill>
-                  <a:srgbClr val="404040"/>
-                </a:solidFill>
-                <a:ea typeface="KaiTi" pitchFamily="49" charset="-122"/>
-              </a:rPr>
-              <a:t>Ukážka </a:t>
-            </a:r>
-            <a:r>
-              <a:rPr lang="sk-SK" sz="4000" b="1" dirty="0" smtClean="0">
-                <a:solidFill>
-                  <a:srgbClr val="720606"/>
-                </a:solidFill>
-                <a:ea typeface="KaiTi" pitchFamily="49" charset="-122"/>
-              </a:rPr>
-              <a:t>projektu</a:t>
-            </a:r>
-            <a:endParaRPr lang="sk-SK" sz="4000" b="1" dirty="0">
-              <a:solidFill>
-                <a:srgbClr val="720606"/>
-              </a:solidFill>
-              <a:ea typeface="KaiTi" pitchFamily="49" charset="-122"/>
-            </a:endParaRPr>
-          </a:p>
-        </p:txBody>
-      </p:sp>
-      <p:sp>
-        <p:nvSpPr>
-          <p:cNvPr id="13" name="TextBox 2"/>
-          <p:cNvSpPr txBox="1"/>
-          <p:nvPr/>
-        </p:nvSpPr>
-        <p:spPr>
-          <a:xfrm>
-            <a:off x="2951312" y="2139702"/>
-            <a:ext cx="6192688" cy="2431435"/>
-          </a:xfrm>
-          <a:prstGeom prst="rect">
-            <a:avLst/>
-          </a:prstGeom>
-          <a:noFill/>
-        </p:spPr>
-        <p:txBody>
-          <a:bodyPr wrap="square" lIns="0" tIns="0" rIns="0" bIns="0" rtlCol="0">
-            <a:spAutoFit/>
-          </a:bodyPr>
-          <a:lstStyle/>
-          <a:p>
-            <a:pPr marL="0" marR="0" lvl="0" indent="0" defTabSz="914400" eaLnBrk="1" fontAlgn="auto" latinLnBrk="0" hangingPunct="1">
-              <a:lnSpc>
-                <a:spcPct val="100000"/>
-              </a:lnSpc>
-              <a:spcBef>
-                <a:spcPts val="0"/>
-              </a:spcBef>
-              <a:spcAft>
-                <a:spcPts val="0"/>
-              </a:spcAft>
-              <a:buClrTx/>
-              <a:buSzTx/>
-              <a:buFontTx/>
-              <a:buNone/>
-              <a:tabLst/>
-              <a:defRPr/>
-            </a:pPr>
-            <a:r>
-              <a:rPr lang="sk-SK" sz="13200" i="1" kern="0" spc="-300" dirty="0" smtClean="0">
-                <a:ln w="18415" cmpd="sng">
-                  <a:solidFill>
-                    <a:srgbClr val="FFFFFF"/>
-                  </a:solidFill>
-                  <a:prstDash val="solid"/>
-                </a:ln>
-                <a:solidFill>
-                  <a:srgbClr val="FFFFFF"/>
-                </a:solidFill>
-                <a:effectLst>
-                  <a:outerShdw blurRad="50800" dist="38100" dir="2700000" algn="tl" rotWithShape="0">
-                    <a:prstClr val="black">
-                      <a:alpha val="40000"/>
-                    </a:prstClr>
-                  </a:outerShdw>
-                  <a:reflection blurRad="6350" stA="55000" endA="300" endPos="45500" dir="5400000" sy="-100000" algn="bl" rotWithShape="0"/>
-                </a:effectLst>
-                <a:latin typeface="Square721 BT" pitchFamily="34" charset="0"/>
-              </a:rPr>
-              <a:t> </a:t>
-            </a:r>
-            <a:r>
-              <a:rPr lang="sk-SK" sz="15800" b="1" kern="0" spc="-300" dirty="0" err="1" smtClean="0">
-                <a:ln w="18415" cmpd="sng">
-                  <a:noFill/>
-                  <a:prstDash val="solid"/>
-                </a:ln>
-                <a:solidFill>
-                  <a:srgbClr val="404040"/>
-                </a:solidFill>
-                <a:latin typeface="Arial" pitchFamily="34" charset="0"/>
-                <a:cs typeface="Arial" pitchFamily="34" charset="0"/>
-              </a:rPr>
-              <a:t>demo</a:t>
-            </a:r>
-            <a:r>
-              <a:rPr lang="sk-SK" sz="15800" b="1" i="1" kern="0" spc="-300" dirty="0" smtClean="0">
-                <a:ln w="18415" cmpd="sng">
-                  <a:noFill/>
-                  <a:prstDash val="solid"/>
-                </a:ln>
-                <a:solidFill>
-                  <a:srgbClr val="404040"/>
-                </a:solidFill>
-                <a:latin typeface="Arial" pitchFamily="34" charset="0"/>
-                <a:cs typeface="Arial" pitchFamily="34" charset="0"/>
-              </a:rPr>
-              <a:t> </a:t>
-            </a:r>
-            <a:r>
-              <a:rPr lang="sk-SK" sz="6000" b="1" i="1" kern="0" spc="-300" dirty="0" smtClean="0">
-                <a:ln w="18415" cmpd="sng">
-                  <a:noFill/>
-                  <a:prstDash val="solid"/>
-                </a:ln>
-                <a:solidFill>
-                  <a:srgbClr val="404040"/>
-                </a:solidFill>
-                <a:latin typeface="Square721 BT" pitchFamily="34" charset="0"/>
-              </a:rPr>
-              <a:t> </a:t>
-            </a:r>
-            <a:endParaRPr kumimoji="0" lang="en-US" sz="11000" b="1" i="1" u="none" strike="noStrike" kern="0" cap="none" spc="-300" normalizeH="0" baseline="0" noProof="0" dirty="0" smtClean="0">
-              <a:ln w="18415" cmpd="sng">
-                <a:noFill/>
-                <a:prstDash val="solid"/>
-              </a:ln>
-              <a:solidFill>
-                <a:srgbClr val="404040"/>
-              </a:solidFill>
-              <a:uLnTx/>
-              <a:uFillTx/>
-              <a:latin typeface="Square721 BT" pitchFamily="34" charset="0"/>
-            </a:endParaRPr>
-          </a:p>
-        </p:txBody>
-      </p:sp>
-      <p:sp>
-        <p:nvSpPr>
-          <p:cNvPr id="6" name="AutoShape 7"/>
-          <p:cNvSpPr>
-            <a:spLocks noChangeArrowheads="1"/>
-          </p:cNvSpPr>
-          <p:nvPr/>
-        </p:nvSpPr>
-        <p:spPr bwMode="auto">
-          <a:xfrm flipV="1">
-            <a:off x="0" y="267494"/>
-            <a:ext cx="467544" cy="456406"/>
-          </a:xfrm>
-          <a:prstGeom prst="homePlate">
-            <a:avLst>
-              <a:gd name="adj" fmla="val 0"/>
-            </a:avLst>
-          </a:prstGeom>
-          <a:solidFill>
-            <a:srgbClr val="720606"/>
-          </a:solidFill>
-          <a:ln w="9525">
-            <a:noFill/>
-            <a:miter lim="800000"/>
-            <a:headEnd/>
-            <a:tailEnd/>
-          </a:ln>
-        </p:spPr>
-        <p:txBody>
-          <a:bodyPr vert="horz" wrap="square" lIns="91778" tIns="45894" rIns="91778" bIns="45894" numCol="1" anchor="t" anchorCtr="0" compatLnSpc="1">
-            <a:prstTxWarp prst="textNoShape">
-              <a:avLst/>
-            </a:prstTxWarp>
-          </a:bodyPr>
-          <a:lstStyle/>
-          <a:p>
-            <a:pPr algn="ctr" defTabSz="917808" fontAlgn="base">
-              <a:spcBef>
-                <a:spcPct val="0"/>
-              </a:spcBef>
-              <a:spcAft>
-                <a:spcPts val="1003"/>
-              </a:spcAft>
-            </a:pPr>
-            <a:r>
-              <a:rPr lang="sk-SK" sz="1500" b="1" dirty="0" smtClean="0">
-                <a:latin typeface="Calibri" pitchFamily="34" charset="0"/>
-                <a:cs typeface="Arial" pitchFamily="34" charset="0"/>
-              </a:rPr>
-              <a:t> </a:t>
-            </a:r>
-            <a:endParaRPr lang="sk-SK" sz="2000" dirty="0" smtClean="0">
-              <a:latin typeface="Arial" pitchFamily="34" charset="0"/>
-              <a:cs typeface="Arial" pitchFamily="34" charset="0"/>
-            </a:endParaRPr>
-          </a:p>
-        </p:txBody>
-      </p:sp>
-      <p:cxnSp>
-        <p:nvCxnSpPr>
-          <p:cNvPr id="7" name="Rovná spojnica 6"/>
-          <p:cNvCxnSpPr/>
-          <p:nvPr/>
-        </p:nvCxnSpPr>
-        <p:spPr>
-          <a:xfrm>
-            <a:off x="762000" y="800100"/>
-            <a:ext cx="5638800" cy="0"/>
-          </a:xfrm>
-          <a:prstGeom prst="line">
-            <a:avLst/>
-          </a:prstGeom>
-          <a:ln>
-            <a:solidFill>
-              <a:schemeClr val="bg1">
-                <a:lumMod val="50000"/>
-              </a:schemeClr>
-            </a:solidFill>
-          </a:ln>
-        </p:spPr>
-        <p:style>
-          <a:lnRef idx="1">
-            <a:schemeClr val="accent1"/>
-          </a:lnRef>
-          <a:fillRef idx="0">
-            <a:schemeClr val="accent1"/>
-          </a:fillRef>
-          <a:effectRef idx="0">
-            <a:schemeClr val="accent1"/>
-          </a:effectRef>
-          <a:fontRef idx="minor">
-            <a:schemeClr val="tx1"/>
-          </a:fontRef>
-        </p:style>
-      </p:cxnSp>
-    </p:spTree>
-  </p:cSld>
-  <p:clrMapOvr>
-    <a:masterClrMapping/>
-  </p:clrMapOvr>
-  <p:transition>
-    <p:push/>
-  </p:transition>
-  <p:timing>
-    <p:tnLst>
-      <p:par>
-        <p:cTn id="1" dur="indefinite" restart="never" nodeType="tmRoot"/>
       </p:par>
     </p:tnLst>
   </p:timing>

</xml_diff>

<commit_message>
[!] Prezentacia technicka, upravenie animacii, zgrupnutie, prip. odstranenie, vela tam toho bolo, a urcite by im to vadilo
</commit_message>
<xml_diff>
--- a/Dokumentacie/Ostatne/Prezentacie/LS/Tim10-final_prezentacia.pptx
+++ b/Dokumentacie/Ostatne/Prezentacie/LS/Tim10-final_prezentacia.pptx
@@ -208,7 +208,7 @@
             <a:fld id="{417BABF7-0521-4687-9D2B-807B4AABA4E6}" type="datetimeFigureOut">
               <a:rPr lang="sk-SK" smtClean="0"/>
               <a:pPr/>
-              <a:t>13. 6. 2012</a:t>
+              <a:t>14. 6. 2012</a:t>
             </a:fld>
             <a:endParaRPr lang="sk-SK" dirty="0"/>
           </a:p>
@@ -5743,7 +5743,7 @@
             <a:fld id="{10336B07-8511-4DF2-93E1-5665CA9277ED}" type="datetimeFigureOut">
               <a:rPr lang="sk-SK" smtClean="0"/>
               <a:pPr/>
-              <a:t>13. 6. 2012</a:t>
+              <a:t>14. 6. 2012</a:t>
             </a:fld>
             <a:endParaRPr lang="sk-SK" dirty="0"/>
           </a:p>
@@ -5797,6 +5797,9 @@
   <p:clrMapOvr>
     <a:masterClrMapping/>
   </p:clrMapOvr>
+  <p:transition>
+    <p:cover dir="u"/>
+  </p:transition>
 </p:sldLayout>
 </file>
 
@@ -5910,7 +5913,7 @@
             <a:fld id="{10336B07-8511-4DF2-93E1-5665CA9277ED}" type="datetimeFigureOut">
               <a:rPr lang="sk-SK" smtClean="0"/>
               <a:pPr/>
-              <a:t>13. 6. 2012</a:t>
+              <a:t>14. 6. 2012</a:t>
             </a:fld>
             <a:endParaRPr lang="sk-SK" dirty="0"/>
           </a:p>
@@ -5964,6 +5967,9 @@
   <p:clrMapOvr>
     <a:masterClrMapping/>
   </p:clrMapOvr>
+  <p:transition>
+    <p:cover dir="u"/>
+  </p:transition>
 </p:sldLayout>
 </file>
 
@@ -6087,7 +6093,7 @@
             <a:fld id="{10336B07-8511-4DF2-93E1-5665CA9277ED}" type="datetimeFigureOut">
               <a:rPr lang="sk-SK" smtClean="0"/>
               <a:pPr/>
-              <a:t>13. 6. 2012</a:t>
+              <a:t>14. 6. 2012</a:t>
             </a:fld>
             <a:endParaRPr lang="sk-SK" dirty="0"/>
           </a:p>
@@ -6141,6 +6147,9 @@
   <p:clrMapOvr>
     <a:masterClrMapping/>
   </p:clrMapOvr>
+  <p:transition>
+    <p:cover dir="u"/>
+  </p:transition>
 </p:sldLayout>
 </file>
 
@@ -6332,7 +6341,7 @@
                 </a:solidFill>
               </a:rPr>
               <a:pPr/>
-              <a:t>13. 6. 2012</a:t>
+              <a:t>14. 6. 2012</a:t>
             </a:fld>
             <a:endParaRPr lang="sk-SK" dirty="0">
               <a:solidFill>
@@ -6410,6 +6419,9 @@
   <p:clrMapOvr>
     <a:masterClrMapping/>
   </p:clrMapOvr>
+  <p:transition>
+    <p:cover dir="u"/>
+  </p:transition>
 </p:sldLayout>
 </file>
 
@@ -6529,7 +6541,7 @@
                 </a:solidFill>
               </a:rPr>
               <a:pPr/>
-              <a:t>13. 6. 2012</a:t>
+              <a:t>14. 6. 2012</a:t>
             </a:fld>
             <a:endParaRPr lang="sk-SK" dirty="0">
               <a:solidFill>
@@ -6607,6 +6619,9 @@
   <p:clrMapOvr>
     <a:masterClrMapping/>
   </p:clrMapOvr>
+  <p:transition>
+    <p:cover dir="u"/>
+  </p:transition>
 </p:sldLayout>
 </file>
 
@@ -6802,7 +6817,7 @@
                 </a:solidFill>
               </a:rPr>
               <a:pPr/>
-              <a:t>13. 6. 2012</a:t>
+              <a:t>14. 6. 2012</a:t>
             </a:fld>
             <a:endParaRPr lang="sk-SK" dirty="0">
               <a:solidFill>
@@ -6880,6 +6895,9 @@
   <p:clrMapOvr>
     <a:masterClrMapping/>
   </p:clrMapOvr>
+  <p:transition>
+    <p:cover dir="u"/>
+  </p:transition>
 </p:sldLayout>
 </file>
 
@@ -7117,7 +7135,7 @@
                 </a:solidFill>
               </a:rPr>
               <a:pPr/>
-              <a:t>13. 6. 2012</a:t>
+              <a:t>14. 6. 2012</a:t>
             </a:fld>
             <a:endParaRPr lang="sk-SK" dirty="0">
               <a:solidFill>
@@ -7195,6 +7213,9 @@
   <p:clrMapOvr>
     <a:masterClrMapping/>
   </p:clrMapOvr>
+  <p:transition>
+    <p:cover dir="u"/>
+  </p:transition>
 </p:sldLayout>
 </file>
 
@@ -7566,7 +7587,7 @@
                 </a:solidFill>
               </a:rPr>
               <a:pPr/>
-              <a:t>13. 6. 2012</a:t>
+              <a:t>14. 6. 2012</a:t>
             </a:fld>
             <a:endParaRPr lang="sk-SK" dirty="0">
               <a:solidFill>
@@ -7644,6 +7665,9 @@
   <p:clrMapOvr>
     <a:masterClrMapping/>
   </p:clrMapOvr>
+  <p:transition>
+    <p:cover dir="u"/>
+  </p:transition>
 </p:sldLayout>
 </file>
 
@@ -7711,7 +7735,7 @@
                 </a:solidFill>
               </a:rPr>
               <a:pPr/>
-              <a:t>13. 6. 2012</a:t>
+              <a:t>14. 6. 2012</a:t>
             </a:fld>
             <a:endParaRPr lang="sk-SK" dirty="0">
               <a:solidFill>
@@ -7789,6 +7813,9 @@
   <p:clrMapOvr>
     <a:masterClrMapping/>
   </p:clrMapOvr>
+  <p:transition>
+    <p:cover dir="u"/>
+  </p:transition>
 </p:sldLayout>
 </file>
 
@@ -7833,7 +7860,7 @@
                 </a:solidFill>
               </a:rPr>
               <a:pPr/>
-              <a:t>13. 6. 2012</a:t>
+              <a:t>14. 6. 2012</a:t>
             </a:fld>
             <a:endParaRPr lang="sk-SK" dirty="0">
               <a:solidFill>
@@ -7911,6 +7938,9 @@
   <p:clrMapOvr>
     <a:masterClrMapping/>
   </p:clrMapOvr>
+  <p:transition>
+    <p:cover dir="u"/>
+  </p:transition>
 </p:sldLayout>
 </file>
 
@@ -8137,7 +8167,7 @@
                 </a:solidFill>
               </a:rPr>
               <a:pPr/>
-              <a:t>13. 6. 2012</a:t>
+              <a:t>14. 6. 2012</a:t>
             </a:fld>
             <a:endParaRPr lang="sk-SK" dirty="0">
               <a:solidFill>
@@ -8215,6 +8245,9 @@
   <p:clrMapOvr>
     <a:masterClrMapping/>
   </p:clrMapOvr>
+  <p:transition>
+    <p:cover dir="u"/>
+  </p:transition>
 </p:sldLayout>
 </file>
 
@@ -8328,7 +8361,7 @@
             <a:fld id="{10336B07-8511-4DF2-93E1-5665CA9277ED}" type="datetimeFigureOut">
               <a:rPr lang="sk-SK" smtClean="0"/>
               <a:pPr/>
-              <a:t>13. 6. 2012</a:t>
+              <a:t>14. 6. 2012</a:t>
             </a:fld>
             <a:endParaRPr lang="sk-SK" dirty="0"/>
           </a:p>
@@ -8382,6 +8415,9 @@
   <p:clrMapOvr>
     <a:masterClrMapping/>
   </p:clrMapOvr>
+  <p:transition>
+    <p:cover dir="u"/>
+  </p:transition>
 </p:sldLayout>
 </file>
 
@@ -8584,7 +8620,7 @@
                 </a:solidFill>
               </a:rPr>
               <a:pPr/>
-              <a:t>13. 6. 2012</a:t>
+              <a:t>14. 6. 2012</a:t>
             </a:fld>
             <a:endParaRPr lang="sk-SK" dirty="0">
               <a:solidFill>
@@ -8662,6 +8698,9 @@
   <p:clrMapOvr>
     <a:masterClrMapping/>
   </p:clrMapOvr>
+  <p:transition>
+    <p:cover dir="u"/>
+  </p:transition>
 </p:sldLayout>
 </file>
 
@@ -8781,7 +8820,7 @@
                 </a:solidFill>
               </a:rPr>
               <a:pPr/>
-              <a:t>13. 6. 2012</a:t>
+              <a:t>14. 6. 2012</a:t>
             </a:fld>
             <a:endParaRPr lang="sk-SK" dirty="0">
               <a:solidFill>
@@ -8859,6 +8898,9 @@
   <p:clrMapOvr>
     <a:masterClrMapping/>
   </p:clrMapOvr>
+  <p:transition>
+    <p:cover dir="u"/>
+  </p:transition>
 </p:sldLayout>
 </file>
 
@@ -8988,7 +9030,7 @@
                 </a:solidFill>
               </a:rPr>
               <a:pPr/>
-              <a:t>13. 6. 2012</a:t>
+              <a:t>14. 6. 2012</a:t>
             </a:fld>
             <a:endParaRPr lang="sk-SK" dirty="0">
               <a:solidFill>
@@ -9066,6 +9108,9 @@
   <p:clrMapOvr>
     <a:masterClrMapping/>
   </p:clrMapOvr>
+  <p:transition>
+    <p:cover dir="u"/>
+  </p:transition>
 </p:sldLayout>
 </file>
 
@@ -9255,7 +9300,7 @@
             <a:fld id="{10336B07-8511-4DF2-93E1-5665CA9277ED}" type="datetimeFigureOut">
               <a:rPr lang="sk-SK" smtClean="0"/>
               <a:pPr/>
-              <a:t>13. 6. 2012</a:t>
+              <a:t>14. 6. 2012</a:t>
             </a:fld>
             <a:endParaRPr lang="sk-SK" dirty="0"/>
           </a:p>
@@ -9309,6 +9354,9 @@
   <p:clrMapOvr>
     <a:masterClrMapping/>
   </p:clrMapOvr>
+  <p:transition>
+    <p:cover dir="u"/>
+  </p:transition>
 </p:sldLayout>
 </file>
 
@@ -9540,7 +9588,7 @@
             <a:fld id="{10336B07-8511-4DF2-93E1-5665CA9277ED}" type="datetimeFigureOut">
               <a:rPr lang="sk-SK" smtClean="0"/>
               <a:pPr/>
-              <a:t>13. 6. 2012</a:t>
+              <a:t>14. 6. 2012</a:t>
             </a:fld>
             <a:endParaRPr lang="sk-SK" dirty="0"/>
           </a:p>
@@ -9594,6 +9642,9 @@
   <p:clrMapOvr>
     <a:masterClrMapping/>
   </p:clrMapOvr>
+  <p:transition>
+    <p:cover dir="u"/>
+  </p:transition>
 </p:sldLayout>
 </file>
 
@@ -9964,7 +10015,7 @@
             <a:fld id="{10336B07-8511-4DF2-93E1-5665CA9277ED}" type="datetimeFigureOut">
               <a:rPr lang="sk-SK" smtClean="0"/>
               <a:pPr/>
-              <a:t>13. 6. 2012</a:t>
+              <a:t>14. 6. 2012</a:t>
             </a:fld>
             <a:endParaRPr lang="sk-SK" dirty="0"/>
           </a:p>
@@ -10018,6 +10069,9 @@
   <p:clrMapOvr>
     <a:masterClrMapping/>
   </p:clrMapOvr>
+  <p:transition>
+    <p:cover dir="u"/>
+  </p:transition>
 </p:sldLayout>
 </file>
 
@@ -10079,7 +10133,7 @@
             <a:fld id="{10336B07-8511-4DF2-93E1-5665CA9277ED}" type="datetimeFigureOut">
               <a:rPr lang="sk-SK" smtClean="0"/>
               <a:pPr/>
-              <a:t>13. 6. 2012</a:t>
+              <a:t>14. 6. 2012</a:t>
             </a:fld>
             <a:endParaRPr lang="sk-SK" dirty="0"/>
           </a:p>
@@ -10133,6 +10187,9 @@
   <p:clrMapOvr>
     <a:masterClrMapping/>
   </p:clrMapOvr>
+  <p:transition>
+    <p:cover dir="u"/>
+  </p:transition>
 </p:sldLayout>
 </file>
 
@@ -10171,7 +10228,7 @@
             <a:fld id="{10336B07-8511-4DF2-93E1-5665CA9277ED}" type="datetimeFigureOut">
               <a:rPr lang="sk-SK" smtClean="0"/>
               <a:pPr/>
-              <a:t>13. 6. 2012</a:t>
+              <a:t>14. 6. 2012</a:t>
             </a:fld>
             <a:endParaRPr lang="sk-SK" dirty="0"/>
           </a:p>
@@ -10225,6 +10282,9 @@
   <p:clrMapOvr>
     <a:masterClrMapping/>
   </p:clrMapOvr>
+  <p:transition>
+    <p:cover dir="u"/>
+  </p:transition>
 </p:sldLayout>
 </file>
 
@@ -10445,7 +10505,7 @@
             <a:fld id="{10336B07-8511-4DF2-93E1-5665CA9277ED}" type="datetimeFigureOut">
               <a:rPr lang="sk-SK" smtClean="0"/>
               <a:pPr/>
-              <a:t>13. 6. 2012</a:t>
+              <a:t>14. 6. 2012</a:t>
             </a:fld>
             <a:endParaRPr lang="sk-SK" dirty="0"/>
           </a:p>
@@ -10499,6 +10559,9 @@
   <p:clrMapOvr>
     <a:masterClrMapping/>
   </p:clrMapOvr>
+  <p:transition>
+    <p:cover dir="u"/>
+  </p:transition>
 </p:sldLayout>
 </file>
 
@@ -10695,7 +10758,7 @@
             <a:fld id="{10336B07-8511-4DF2-93E1-5665CA9277ED}" type="datetimeFigureOut">
               <a:rPr lang="sk-SK" smtClean="0"/>
               <a:pPr/>
-              <a:t>13. 6. 2012</a:t>
+              <a:t>14. 6. 2012</a:t>
             </a:fld>
             <a:endParaRPr lang="sk-SK" dirty="0"/>
           </a:p>
@@ -10749,6 +10812,9 @@
   <p:clrMapOvr>
     <a:masterClrMapping/>
   </p:clrMapOvr>
+  <p:transition>
+    <p:cover dir="u"/>
+  </p:transition>
 </p:sldLayout>
 </file>
 
@@ -10905,7 +10971,7 @@
             <a:fld id="{10336B07-8511-4DF2-93E1-5665CA9277ED}" type="datetimeFigureOut">
               <a:rPr lang="sk-SK" smtClean="0"/>
               <a:pPr/>
-              <a:t>13. 6. 2012</a:t>
+              <a:t>14. 6. 2012</a:t>
             </a:fld>
             <a:endParaRPr lang="sk-SK" dirty="0"/>
           </a:p>
@@ -11006,6 +11072,9 @@
     <p:sldLayoutId id="2147483658" r:id="rId10"/>
     <p:sldLayoutId id="2147483659" r:id="rId11"/>
   </p:sldLayoutIdLst>
+  <p:transition>
+    <p:cover dir="u"/>
+  </p:transition>
   <p:txStyles>
     <p:titleStyle>
       <a:lvl1pPr algn="ctr" defTabSz="914400" rtl="0" eaLnBrk="1" latinLnBrk="0" hangingPunct="1">
@@ -11441,7 +11510,7 @@
                 </a:solidFill>
               </a:rPr>
               <a:pPr/>
-              <a:t>13. 6. 2012</a:t>
+              <a:t>14. 6. 2012</a:t>
             </a:fld>
             <a:endParaRPr lang="sk-SK" dirty="0">
               <a:solidFill>
@@ -11566,6 +11635,9 @@
     <p:sldLayoutId id="2147483670" r:id="rId10"/>
     <p:sldLayoutId id="2147483671" r:id="rId11"/>
   </p:sldLayoutIdLst>
+  <p:transition>
+    <p:cover dir="u"/>
+  </p:transition>
   <p:txStyles>
     <p:titleStyle>
       <a:lvl1pPr algn="ctr" defTabSz="914400" rtl="0" eaLnBrk="1" latinLnBrk="0" hangingPunct="1">
@@ -12034,7 +12106,7 @@
     <a:masterClrMapping/>
   </p:clrMapOvr>
   <p:transition>
-    <p:cover/>
+    <p:cover dir="u"/>
   </p:transition>
   <p:timing>
     <p:tnLst>
@@ -12331,7 +12403,7 @@
     <a:masterClrMapping/>
   </p:clrMapOvr>
   <p:transition>
-    <p:push/>
+    <p:cover dir="u"/>
   </p:transition>
   <p:timing>
     <p:tnLst>
@@ -13226,7 +13298,7 @@
     <a:masterClrMapping/>
   </p:clrMapOvr>
   <p:transition>
-    <p:push/>
+    <p:cover dir="u"/>
   </p:transition>
   <p:timing>
     <p:tnLst>
@@ -13240,6 +13312,9 @@
                     <p:cTn id="3" fill="hold">
                       <p:stCondLst>
                         <p:cond delay="indefinite"/>
+                        <p:cond evt="onBegin" delay="0">
+                          <p:tn val="2"/>
+                        </p:cond>
                       </p:stCondLst>
                       <p:childTnLst>
                         <p:par>
@@ -13249,7 +13324,7 @@
                             </p:stCondLst>
                             <p:childTnLst>
                               <p:par>
-                                <p:cTn id="5" presetID="53" presetClass="entr" presetSubtype="0" fill="hold" nodeType="clickEffect">
+                                <p:cTn id="5" presetID="53" presetClass="entr" presetSubtype="0" fill="hold" nodeType="afterEffect">
                                   <p:stCondLst>
                                     <p:cond delay="0"/>
                                   </p:stCondLst>
@@ -13410,24 +13485,15 @@
                                   </p:childTnLst>
                                 </p:cTn>
                               </p:par>
-                            </p:childTnLst>
-                          </p:cTn>
-                        </p:par>
-                        <p:par>
-                          <p:cTn id="15" fill="hold">
-                            <p:stCondLst>
-                              <p:cond delay="500"/>
-                            </p:stCondLst>
-                            <p:childTnLst>
                               <p:par>
-                                <p:cTn id="16" presetID="12" presetClass="entr" presetSubtype="4" fill="hold" nodeType="afterEffect">
+                                <p:cTn id="15" presetID="12" presetClass="entr" presetSubtype="4" fill="hold" nodeType="withEffect">
                                   <p:stCondLst>
                                     <p:cond delay="0"/>
                                   </p:stCondLst>
                                   <p:childTnLst>
                                     <p:set>
                                       <p:cBhvr>
-                                        <p:cTn id="17" dur="1" fill="hold">
+                                        <p:cTn id="16" dur="1" fill="hold">
                                           <p:stCondLst>
                                             <p:cond delay="0"/>
                                           </p:stCondLst>
@@ -13445,7 +13511,7 @@
                                     </p:set>
                                     <p:animEffect transition="in" filter="slide(fromBottom)">
                                       <p:cBhvr>
-                                        <p:cTn id="18" dur="500"/>
+                                        <p:cTn id="17" dur="500"/>
                                         <p:tgtEl>
                                           <p:spTgt spid="33"/>
                                         </p:tgtEl>
@@ -13458,20 +13524,20 @@
                           </p:cTn>
                         </p:par>
                         <p:par>
-                          <p:cTn id="19" fill="hold">
+                          <p:cTn id="18" fill="hold">
                             <p:stCondLst>
-                              <p:cond delay="1000"/>
+                              <p:cond delay="500"/>
                             </p:stCondLst>
                             <p:childTnLst>
                               <p:par>
-                                <p:cTn id="20" presetID="53" presetClass="entr" presetSubtype="0" fill="hold" nodeType="afterEffect">
+                                <p:cTn id="19" presetID="53" presetClass="entr" presetSubtype="0" fill="hold" nodeType="afterEffect">
                                   <p:stCondLst>
                                     <p:cond delay="0"/>
                                   </p:stCondLst>
                                   <p:childTnLst>
                                     <p:set>
                                       <p:cBhvr>
-                                        <p:cTn id="21" dur="1" fill="hold">
+                                        <p:cTn id="20" dur="1" fill="hold">
                                           <p:stCondLst>
                                             <p:cond delay="0"/>
                                           </p:stCondLst>
@@ -13489,7 +13555,7 @@
                                     </p:set>
                                     <p:anim calcmode="lin" valueType="num">
                                       <p:cBhvr>
-                                        <p:cTn id="22" dur="500" fill="hold"/>
+                                        <p:cTn id="21" dur="500" fill="hold"/>
                                         <p:tgtEl>
                                           <p:spTgt spid="22"/>
                                         </p:tgtEl>
@@ -13512,7 +13578,7 @@
                                     </p:anim>
                                     <p:anim calcmode="lin" valueType="num">
                                       <p:cBhvr>
-                                        <p:cTn id="23" dur="500" fill="hold"/>
+                                        <p:cTn id="22" dur="500" fill="hold"/>
                                         <p:tgtEl>
                                           <p:spTgt spid="22"/>
                                         </p:tgtEl>
@@ -13535,7 +13601,7 @@
                                     </p:anim>
                                     <p:animEffect transition="in" filter="fade">
                                       <p:cBhvr>
-                                        <p:cTn id="24" dur="500"/>
+                                        <p:cTn id="23" dur="500"/>
                                         <p:tgtEl>
                                           <p:spTgt spid="22"/>
                                         </p:tgtEl>
@@ -13544,24 +13610,15 @@
                                   </p:childTnLst>
                                 </p:cTn>
                               </p:par>
-                            </p:childTnLst>
-                          </p:cTn>
-                        </p:par>
-                        <p:par>
-                          <p:cTn id="25" fill="hold">
-                            <p:stCondLst>
-                              <p:cond delay="1500"/>
-                            </p:stCondLst>
-                            <p:childTnLst>
                               <p:par>
-                                <p:cTn id="26" presetID="53" presetClass="entr" presetSubtype="0" fill="hold" nodeType="afterEffect">
+                                <p:cTn id="24" presetID="53" presetClass="entr" presetSubtype="0" fill="hold" nodeType="withEffect">
                                   <p:stCondLst>
                                     <p:cond delay="0"/>
                                   </p:stCondLst>
                                   <p:childTnLst>
                                     <p:set>
                                       <p:cBhvr>
-                                        <p:cTn id="27" dur="1" fill="hold">
+                                        <p:cTn id="25" dur="1" fill="hold">
                                           <p:stCondLst>
                                             <p:cond delay="0"/>
                                           </p:stCondLst>
@@ -13579,7 +13636,7 @@
                                     </p:set>
                                     <p:anim calcmode="lin" valueType="num">
                                       <p:cBhvr>
-                                        <p:cTn id="28" dur="500" fill="hold"/>
+                                        <p:cTn id="26" dur="500" fill="hold"/>
                                         <p:tgtEl>
                                           <p:spTgt spid="29"/>
                                         </p:tgtEl>
@@ -13602,7 +13659,7 @@
                                     </p:anim>
                                     <p:anim calcmode="lin" valueType="num">
                                       <p:cBhvr>
-                                        <p:cTn id="29" dur="500" fill="hold"/>
+                                        <p:cTn id="27" dur="500" fill="hold"/>
                                         <p:tgtEl>
                                           <p:spTgt spid="29"/>
                                         </p:tgtEl>
@@ -13625,7 +13682,7 @@
                                     </p:anim>
                                     <p:animEffect transition="in" filter="fade">
                                       <p:cBhvr>
-                                        <p:cTn id="30" dur="500"/>
+                                        <p:cTn id="28" dur="500"/>
                                         <p:tgtEl>
                                           <p:spTgt spid="29"/>
                                         </p:tgtEl>
@@ -13634,24 +13691,15 @@
                                   </p:childTnLst>
                                 </p:cTn>
                               </p:par>
-                            </p:childTnLst>
-                          </p:cTn>
-                        </p:par>
-                        <p:par>
-                          <p:cTn id="31" fill="hold">
-                            <p:stCondLst>
-                              <p:cond delay="2000"/>
-                            </p:stCondLst>
-                            <p:childTnLst>
                               <p:par>
-                                <p:cTn id="32" presetID="12" presetClass="entr" presetSubtype="4" fill="hold" nodeType="afterEffect">
+                                <p:cTn id="29" presetID="12" presetClass="entr" presetSubtype="4" fill="hold" nodeType="withEffect">
                                   <p:stCondLst>
                                     <p:cond delay="0"/>
                                   </p:stCondLst>
                                   <p:childTnLst>
                                     <p:set>
                                       <p:cBhvr>
-                                        <p:cTn id="33" dur="1" fill="hold">
+                                        <p:cTn id="30" dur="1" fill="hold">
                                           <p:stCondLst>
                                             <p:cond delay="0"/>
                                           </p:stCondLst>
@@ -13669,7 +13717,7 @@
                                     </p:set>
                                     <p:animEffect transition="in" filter="slide(fromBottom)">
                                       <p:cBhvr>
-                                        <p:cTn id="34" dur="500"/>
+                                        <p:cTn id="31" dur="500"/>
                                         <p:tgtEl>
                                           <p:spTgt spid="37"/>
                                         </p:tgtEl>
@@ -13682,20 +13730,20 @@
                           </p:cTn>
                         </p:par>
                         <p:par>
-                          <p:cTn id="35" fill="hold">
+                          <p:cTn id="32" fill="hold">
                             <p:stCondLst>
-                              <p:cond delay="2500"/>
+                              <p:cond delay="1000"/>
                             </p:stCondLst>
                             <p:childTnLst>
                               <p:par>
-                                <p:cTn id="36" presetID="53" presetClass="entr" presetSubtype="0" fill="hold" nodeType="afterEffect">
+                                <p:cTn id="33" presetID="53" presetClass="entr" presetSubtype="0" fill="hold" nodeType="afterEffect">
                                   <p:stCondLst>
                                     <p:cond delay="0"/>
                                   </p:stCondLst>
                                   <p:childTnLst>
                                     <p:set>
                                       <p:cBhvr>
-                                        <p:cTn id="37" dur="1" fill="hold">
+                                        <p:cTn id="34" dur="1" fill="hold">
                                           <p:stCondLst>
                                             <p:cond delay="0"/>
                                           </p:stCondLst>
@@ -13713,7 +13761,7 @@
                                     </p:set>
                                     <p:anim calcmode="lin" valueType="num">
                                       <p:cBhvr>
-                                        <p:cTn id="38" dur="500" fill="hold"/>
+                                        <p:cTn id="35" dur="500" fill="hold"/>
                                         <p:tgtEl>
                                           <p:spTgt spid="23"/>
                                         </p:tgtEl>
@@ -13736,7 +13784,7 @@
                                     </p:anim>
                                     <p:anim calcmode="lin" valueType="num">
                                       <p:cBhvr>
-                                        <p:cTn id="39" dur="500" fill="hold"/>
+                                        <p:cTn id="36" dur="500" fill="hold"/>
                                         <p:tgtEl>
                                           <p:spTgt spid="23"/>
                                         </p:tgtEl>
@@ -13759,7 +13807,7 @@
                                     </p:anim>
                                     <p:animEffect transition="in" filter="fade">
                                       <p:cBhvr>
-                                        <p:cTn id="40" dur="500"/>
+                                        <p:cTn id="37" dur="500"/>
                                         <p:tgtEl>
                                           <p:spTgt spid="23"/>
                                         </p:tgtEl>
@@ -13768,24 +13816,15 @@
                                   </p:childTnLst>
                                 </p:cTn>
                               </p:par>
-                            </p:childTnLst>
-                          </p:cTn>
-                        </p:par>
-                        <p:par>
-                          <p:cTn id="41" fill="hold">
-                            <p:stCondLst>
-                              <p:cond delay="3000"/>
-                            </p:stCondLst>
-                            <p:childTnLst>
                               <p:par>
-                                <p:cTn id="42" presetID="53" presetClass="entr" presetSubtype="0" fill="hold" nodeType="afterEffect">
+                                <p:cTn id="38" presetID="53" presetClass="entr" presetSubtype="0" fill="hold" nodeType="withEffect">
                                   <p:stCondLst>
                                     <p:cond delay="0"/>
                                   </p:stCondLst>
                                   <p:childTnLst>
                                     <p:set>
                                       <p:cBhvr>
-                                        <p:cTn id="43" dur="1" fill="hold">
+                                        <p:cTn id="39" dur="1" fill="hold">
                                           <p:stCondLst>
                                             <p:cond delay="0"/>
                                           </p:stCondLst>
@@ -13803,7 +13842,7 @@
                                     </p:set>
                                     <p:anim calcmode="lin" valueType="num">
                                       <p:cBhvr>
-                                        <p:cTn id="44" dur="500" fill="hold"/>
+                                        <p:cTn id="40" dur="500" fill="hold"/>
                                         <p:tgtEl>
                                           <p:spTgt spid="14"/>
                                         </p:tgtEl>
@@ -13826,7 +13865,7 @@
                                     </p:anim>
                                     <p:anim calcmode="lin" valueType="num">
                                       <p:cBhvr>
-                                        <p:cTn id="45" dur="500" fill="hold"/>
+                                        <p:cTn id="41" dur="500" fill="hold"/>
                                         <p:tgtEl>
                                           <p:spTgt spid="14"/>
                                         </p:tgtEl>
@@ -13849,7 +13888,7 @@
                                     </p:anim>
                                     <p:animEffect transition="in" filter="fade">
                                       <p:cBhvr>
-                                        <p:cTn id="46" dur="500"/>
+                                        <p:cTn id="42" dur="500"/>
                                         <p:tgtEl>
                                           <p:spTgt spid="14"/>
                                         </p:tgtEl>
@@ -13858,24 +13897,15 @@
                                   </p:childTnLst>
                                 </p:cTn>
                               </p:par>
-                            </p:childTnLst>
-                          </p:cTn>
-                        </p:par>
-                        <p:par>
-                          <p:cTn id="47" fill="hold">
-                            <p:stCondLst>
-                              <p:cond delay="3500"/>
-                            </p:stCondLst>
-                            <p:childTnLst>
                               <p:par>
-                                <p:cTn id="48" presetID="12" presetClass="entr" presetSubtype="4" fill="hold" nodeType="afterEffect">
+                                <p:cTn id="43" presetID="12" presetClass="entr" presetSubtype="4" fill="hold" nodeType="withEffect">
                                   <p:stCondLst>
                                     <p:cond delay="0"/>
                                   </p:stCondLst>
                                   <p:childTnLst>
                                     <p:set>
                                       <p:cBhvr>
-                                        <p:cTn id="49" dur="1" fill="hold">
+                                        <p:cTn id="44" dur="1" fill="hold">
                                           <p:stCondLst>
                                             <p:cond delay="0"/>
                                           </p:stCondLst>
@@ -13893,7 +13923,7 @@
                                     </p:set>
                                     <p:animEffect transition="in" filter="slide(fromBottom)">
                                       <p:cBhvr>
-                                        <p:cTn id="50" dur="500"/>
+                                        <p:cTn id="45" dur="500"/>
                                         <p:tgtEl>
                                           <p:spTgt spid="30"/>
                                         </p:tgtEl>
@@ -13906,20 +13936,20 @@
                           </p:cTn>
                         </p:par>
                         <p:par>
-                          <p:cTn id="51" fill="hold">
+                          <p:cTn id="46" fill="hold">
                             <p:stCondLst>
-                              <p:cond delay="4000"/>
+                              <p:cond delay="1500"/>
                             </p:stCondLst>
                             <p:childTnLst>
                               <p:par>
-                                <p:cTn id="52" presetID="53" presetClass="entr" presetSubtype="0" fill="hold" nodeType="afterEffect">
+                                <p:cTn id="47" presetID="53" presetClass="entr" presetSubtype="0" fill="hold" nodeType="afterEffect">
                                   <p:stCondLst>
                                     <p:cond delay="0"/>
                                   </p:stCondLst>
                                   <p:childTnLst>
                                     <p:set>
                                       <p:cBhvr>
-                                        <p:cTn id="53" dur="1" fill="hold">
+                                        <p:cTn id="48" dur="1" fill="hold">
                                           <p:stCondLst>
                                             <p:cond delay="0"/>
                                           </p:stCondLst>
@@ -13937,7 +13967,7 @@
                                     </p:set>
                                     <p:anim calcmode="lin" valueType="num">
                                       <p:cBhvr>
-                                        <p:cTn id="54" dur="500" fill="hold"/>
+                                        <p:cTn id="49" dur="500" fill="hold"/>
                                         <p:tgtEl>
                                           <p:spTgt spid="24"/>
                                         </p:tgtEl>
@@ -13960,7 +13990,7 @@
                                     </p:anim>
                                     <p:anim calcmode="lin" valueType="num">
                                       <p:cBhvr>
-                                        <p:cTn id="55" dur="500" fill="hold"/>
+                                        <p:cTn id="50" dur="500" fill="hold"/>
                                         <p:tgtEl>
                                           <p:spTgt spid="24"/>
                                         </p:tgtEl>
@@ -13983,7 +14013,7 @@
                                     </p:anim>
                                     <p:animEffect transition="in" filter="fade">
                                       <p:cBhvr>
-                                        <p:cTn id="56" dur="500"/>
+                                        <p:cTn id="51" dur="500"/>
                                         <p:tgtEl>
                                           <p:spTgt spid="24"/>
                                         </p:tgtEl>
@@ -13992,24 +14022,15 @@
                                   </p:childTnLst>
                                 </p:cTn>
                               </p:par>
-                            </p:childTnLst>
-                          </p:cTn>
-                        </p:par>
-                        <p:par>
-                          <p:cTn id="57" fill="hold">
-                            <p:stCondLst>
-                              <p:cond delay="4500"/>
-                            </p:stCondLst>
-                            <p:childTnLst>
                               <p:par>
-                                <p:cTn id="58" presetID="53" presetClass="entr" presetSubtype="0" fill="hold" nodeType="afterEffect">
+                                <p:cTn id="52" presetID="53" presetClass="entr" presetSubtype="0" fill="hold" nodeType="withEffect">
                                   <p:stCondLst>
                                     <p:cond delay="0"/>
                                   </p:stCondLst>
                                   <p:childTnLst>
                                     <p:set>
                                       <p:cBhvr>
-                                        <p:cTn id="59" dur="1" fill="hold">
+                                        <p:cTn id="53" dur="1" fill="hold">
                                           <p:stCondLst>
                                             <p:cond delay="0"/>
                                           </p:stCondLst>
@@ -14027,7 +14048,7 @@
                                     </p:set>
                                     <p:anim calcmode="lin" valueType="num">
                                       <p:cBhvr>
-                                        <p:cTn id="60" dur="500" fill="hold"/>
+                                        <p:cTn id="54" dur="500" fill="hold"/>
                                         <p:tgtEl>
                                           <p:spTgt spid="16"/>
                                         </p:tgtEl>
@@ -14050,7 +14071,7 @@
                                     </p:anim>
                                     <p:anim calcmode="lin" valueType="num">
                                       <p:cBhvr>
-                                        <p:cTn id="61" dur="500" fill="hold"/>
+                                        <p:cTn id="55" dur="500" fill="hold"/>
                                         <p:tgtEl>
                                           <p:spTgt spid="16"/>
                                         </p:tgtEl>
@@ -14073,7 +14094,7 @@
                                     </p:anim>
                                     <p:animEffect transition="in" filter="fade">
                                       <p:cBhvr>
-                                        <p:cTn id="62" dur="500"/>
+                                        <p:cTn id="56" dur="500"/>
                                         <p:tgtEl>
                                           <p:spTgt spid="16"/>
                                         </p:tgtEl>
@@ -14082,24 +14103,15 @@
                                   </p:childTnLst>
                                 </p:cTn>
                               </p:par>
-                            </p:childTnLst>
-                          </p:cTn>
-                        </p:par>
-                        <p:par>
-                          <p:cTn id="63" fill="hold">
-                            <p:stCondLst>
-                              <p:cond delay="5000"/>
-                            </p:stCondLst>
-                            <p:childTnLst>
                               <p:par>
-                                <p:cTn id="64" presetID="12" presetClass="entr" presetSubtype="4" fill="hold" nodeType="afterEffect">
+                                <p:cTn id="57" presetID="12" presetClass="entr" presetSubtype="4" fill="hold" nodeType="withEffect">
                                   <p:stCondLst>
                                     <p:cond delay="0"/>
                                   </p:stCondLst>
                                   <p:childTnLst>
                                     <p:set>
                                       <p:cBhvr>
-                                        <p:cTn id="65" dur="1" fill="hold">
+                                        <p:cTn id="58" dur="1" fill="hold">
                                           <p:stCondLst>
                                             <p:cond delay="0"/>
                                           </p:stCondLst>
@@ -14117,7 +14129,7 @@
                                     </p:set>
                                     <p:animEffect transition="in" filter="slide(fromBottom)">
                                       <p:cBhvr>
-                                        <p:cTn id="66" dur="500"/>
+                                        <p:cTn id="59" dur="500"/>
                                         <p:tgtEl>
                                           <p:spTgt spid="20"/>
                                         </p:tgtEl>
@@ -14675,121 +14687,6 @@
       </p:grpSp>
       <p:grpSp>
         <p:nvGrpSpPr>
-          <p:cNvPr id="24" name="Skupina 23"/>
-          <p:cNvGrpSpPr/>
-          <p:nvPr/>
-        </p:nvGrpSpPr>
-        <p:grpSpPr>
-          <a:xfrm>
-            <a:off x="1475656" y="1275606"/>
-            <a:ext cx="6527005" cy="565031"/>
-            <a:chOff x="1475656" y="1275606"/>
-            <a:chExt cx="6503703" cy="565031"/>
-          </a:xfrm>
-        </p:grpSpPr>
-        <p:sp>
-          <p:nvSpPr>
-            <p:cNvPr id="25" name="BlokTextu 24"/>
-            <p:cNvSpPr txBox="1"/>
-            <p:nvPr/>
-          </p:nvSpPr>
-          <p:spPr>
-            <a:xfrm>
-              <a:off x="1475656" y="1275606"/>
-              <a:ext cx="6503703" cy="369332"/>
-            </a:xfrm>
-            <a:prstGeom prst="rect">
-              <a:avLst/>
-            </a:prstGeom>
-            <a:noFill/>
-          </p:spPr>
-          <p:txBody>
-            <a:bodyPr wrap="none" rtlCol="0">
-              <a:spAutoFit/>
-            </a:bodyPr>
-            <a:lstStyle/>
-            <a:p>
-              <a:r>
-                <a:rPr lang="sk-SK" dirty="0" smtClean="0">
-                  <a:solidFill>
-                    <a:srgbClr val="404040"/>
-                  </a:solidFill>
-                  <a:latin typeface="Arial" pitchFamily="34" charset="0"/>
-                  <a:cs typeface="Arial" pitchFamily="34" charset="0"/>
-                </a:rPr>
-                <a:t>Optimalizovať funkcionality pre rýchlejšiu a príjemnejšiu prácu</a:t>
-              </a:r>
-              <a:endParaRPr lang="sk-SK" dirty="0">
-                <a:solidFill>
-                  <a:srgbClr val="404040"/>
-                </a:solidFill>
-                <a:latin typeface="Arial" pitchFamily="34" charset="0"/>
-                <a:cs typeface="Arial" pitchFamily="34" charset="0"/>
-              </a:endParaRPr>
-            </a:p>
-          </p:txBody>
-        </p:sp>
-        <p:sp>
-          <p:nvSpPr>
-            <p:cNvPr id="26" name="BlokTextu 25"/>
-            <p:cNvSpPr txBox="1"/>
-            <p:nvPr/>
-          </p:nvSpPr>
-          <p:spPr>
-            <a:xfrm>
-              <a:off x="1475656" y="1563638"/>
-              <a:ext cx="4520789" cy="276999"/>
-            </a:xfrm>
-            <a:prstGeom prst="rect">
-              <a:avLst/>
-            </a:prstGeom>
-            <a:noFill/>
-          </p:spPr>
-          <p:txBody>
-            <a:bodyPr wrap="none" rtlCol="0">
-              <a:spAutoFit/>
-            </a:bodyPr>
-            <a:lstStyle/>
-            <a:p>
-              <a:r>
-                <a:rPr lang="sk-SK" sz="1200" smtClean="0">
-                  <a:solidFill>
-                    <a:schemeClr val="bg1">
-                      <a:lumMod val="50000"/>
-                    </a:schemeClr>
-                  </a:solidFill>
-                  <a:latin typeface="Arial" pitchFamily="34" charset="0"/>
-                  <a:cs typeface="Arial" pitchFamily="34" charset="0"/>
-                </a:rPr>
-                <a:t>podpora paralelizmu</a:t>
-              </a:r>
-              <a:r>
-                <a:rPr lang="sk-SK" sz="1200" dirty="0" smtClean="0">
-                  <a:solidFill>
-                    <a:schemeClr val="bg1">
-                      <a:lumMod val="50000"/>
-                    </a:schemeClr>
-                  </a:solidFill>
-                  <a:latin typeface="Arial" pitchFamily="34" charset="0"/>
-                  <a:cs typeface="Arial" pitchFamily="34" charset="0"/>
-                </a:rPr>
-                <a:t>, nove UI, zlepšiť analýzu zdrojového kódu</a:t>
-              </a:r>
-              <a:endParaRPr lang="sk-SK" sz="1200" dirty="0">
-                <a:solidFill>
-                  <a:schemeClr val="bg1">
-                    <a:lumMod val="50000"/>
-                  </a:schemeClr>
-                </a:solidFill>
-                <a:latin typeface="Arial" pitchFamily="34" charset="0"/>
-                <a:cs typeface="Arial" pitchFamily="34" charset="0"/>
-              </a:endParaRPr>
-            </a:p>
-          </p:txBody>
-        </p:sp>
-      </p:grpSp>
-      <p:grpSp>
-        <p:nvGrpSpPr>
           <p:cNvPr id="27" name="Skupina 26"/>
           <p:cNvGrpSpPr/>
           <p:nvPr/>
@@ -15062,937 +14959,133 @@
           </a:fontRef>
         </p:style>
       </p:cxnSp>
+      <p:grpSp>
+        <p:nvGrpSpPr>
+          <p:cNvPr id="37" name="Skupina 36"/>
+          <p:cNvGrpSpPr/>
+          <p:nvPr/>
+        </p:nvGrpSpPr>
+        <p:grpSpPr>
+          <a:xfrm>
+            <a:off x="1498958" y="1275606"/>
+            <a:ext cx="6503703" cy="565031"/>
+            <a:chOff x="1475656" y="1275606"/>
+            <a:chExt cx="6503703" cy="565031"/>
+          </a:xfrm>
+        </p:grpSpPr>
+        <p:sp>
+          <p:nvSpPr>
+            <p:cNvPr id="38" name="BlokTextu 37"/>
+            <p:cNvSpPr txBox="1"/>
+            <p:nvPr/>
+          </p:nvSpPr>
+          <p:spPr>
+            <a:xfrm>
+              <a:off x="1475656" y="1275606"/>
+              <a:ext cx="6503703" cy="369332"/>
+            </a:xfrm>
+            <a:prstGeom prst="rect">
+              <a:avLst/>
+            </a:prstGeom>
+            <a:noFill/>
+          </p:spPr>
+          <p:txBody>
+            <a:bodyPr wrap="none" rtlCol="0">
+              <a:spAutoFit/>
+            </a:bodyPr>
+            <a:lstStyle/>
+            <a:p>
+              <a:r>
+                <a:rPr lang="sk-SK" dirty="0" smtClean="0">
+                  <a:solidFill>
+                    <a:srgbClr val="404040"/>
+                  </a:solidFill>
+                  <a:latin typeface="Arial" pitchFamily="34" charset="0"/>
+                  <a:cs typeface="Arial" pitchFamily="34" charset="0"/>
+                </a:rPr>
+                <a:t>Optimalizovať funkcionality pre rýchlejšiu a príjemnejšiu prácu</a:t>
+              </a:r>
+              <a:endParaRPr lang="sk-SK" dirty="0">
+                <a:solidFill>
+                  <a:srgbClr val="404040"/>
+                </a:solidFill>
+                <a:latin typeface="Arial" pitchFamily="34" charset="0"/>
+                <a:cs typeface="Arial" pitchFamily="34" charset="0"/>
+              </a:endParaRPr>
+            </a:p>
+          </p:txBody>
+        </p:sp>
+        <p:sp>
+          <p:nvSpPr>
+            <p:cNvPr id="39" name="BlokTextu 38"/>
+            <p:cNvSpPr txBox="1"/>
+            <p:nvPr/>
+          </p:nvSpPr>
+          <p:spPr>
+            <a:xfrm>
+              <a:off x="1475656" y="1563638"/>
+              <a:ext cx="4693914" cy="276999"/>
+            </a:xfrm>
+            <a:prstGeom prst="rect">
+              <a:avLst/>
+            </a:prstGeom>
+            <a:noFill/>
+          </p:spPr>
+          <p:txBody>
+            <a:bodyPr wrap="none" rtlCol="0">
+              <a:spAutoFit/>
+            </a:bodyPr>
+            <a:lstStyle/>
+            <a:p>
+              <a:r>
+                <a:rPr lang="sk-SK" sz="1200" smtClean="0">
+                  <a:solidFill>
+                    <a:schemeClr val="bg1">
+                      <a:lumMod val="50000"/>
+                    </a:schemeClr>
+                  </a:solidFill>
+                  <a:latin typeface="Arial" pitchFamily="34" charset="0"/>
+                  <a:cs typeface="Arial" pitchFamily="34" charset="0"/>
+                </a:rPr>
+                <a:t>podpora paralelizmu, nové </a:t>
+              </a:r>
+              <a:r>
+                <a:rPr lang="sk-SK" sz="1200" dirty="0" smtClean="0">
+                  <a:solidFill>
+                    <a:schemeClr val="bg1">
+                      <a:lumMod val="50000"/>
+                    </a:schemeClr>
+                  </a:solidFill>
+                  <a:latin typeface="Arial" pitchFamily="34" charset="0"/>
+                  <a:cs typeface="Arial" pitchFamily="34" charset="0"/>
+                </a:rPr>
+                <a:t>UI, zlepšiť analýzu zdrojového kódu ...</a:t>
+              </a:r>
+              <a:endParaRPr lang="sk-SK" sz="1200" dirty="0">
+                <a:solidFill>
+                  <a:schemeClr val="bg1">
+                    <a:lumMod val="50000"/>
+                  </a:schemeClr>
+                </a:solidFill>
+                <a:latin typeface="Arial" pitchFamily="34" charset="0"/>
+                <a:cs typeface="Arial" pitchFamily="34" charset="0"/>
+              </a:endParaRPr>
+            </a:p>
+          </p:txBody>
+        </p:sp>
+      </p:grpSp>
     </p:spTree>
   </p:cSld>
   <p:clrMapOvr>
     <a:masterClrMapping/>
   </p:clrMapOvr>
   <p:transition>
-    <p:push/>
+    <p:cover dir="u"/>
   </p:transition>
   <p:timing>
     <p:tnLst>
       <p:par>
-        <p:cTn id="1" dur="indefinite" restart="never" nodeType="tmRoot">
-          <p:childTnLst>
-            <p:seq concurrent="1" nextAc="seek">
-              <p:cTn id="2" dur="indefinite" nodeType="mainSeq">
-                <p:childTnLst>
-                  <p:par>
-                    <p:cTn id="3" fill="hold">
-                      <p:stCondLst>
-                        <p:cond delay="indefinite"/>
-                      </p:stCondLst>
-                      <p:childTnLst>
-                        <p:par>
-                          <p:cTn id="4" fill="hold">
-                            <p:stCondLst>
-                              <p:cond delay="0"/>
-                            </p:stCondLst>
-                            <p:childTnLst>
-                              <p:par>
-                                <p:cTn id="5" presetID="53" presetClass="entr" presetSubtype="0" fill="hold" nodeType="clickEffect">
-                                  <p:stCondLst>
-                                    <p:cond delay="0"/>
-                                  </p:stCondLst>
-                                  <p:childTnLst>
-                                    <p:set>
-                                      <p:cBhvr>
-                                        <p:cTn id="6" dur="1" fill="hold">
-                                          <p:stCondLst>
-                                            <p:cond delay="0"/>
-                                          </p:stCondLst>
-                                        </p:cTn>
-                                        <p:tgtEl>
-                                          <p:spTgt spid="10"/>
-                                        </p:tgtEl>
-                                        <p:attrNameLst>
-                                          <p:attrName>style.visibility</p:attrName>
-                                        </p:attrNameLst>
-                                      </p:cBhvr>
-                                      <p:to>
-                                        <p:strVal val="visible"/>
-                                      </p:to>
-                                    </p:set>
-                                    <p:anim calcmode="lin" valueType="num">
-                                      <p:cBhvr>
-                                        <p:cTn id="7" dur="500" fill="hold"/>
-                                        <p:tgtEl>
-                                          <p:spTgt spid="10"/>
-                                        </p:tgtEl>
-                                        <p:attrNameLst>
-                                          <p:attrName>ppt_w</p:attrName>
-                                        </p:attrNameLst>
-                                      </p:cBhvr>
-                                      <p:tavLst>
-                                        <p:tav tm="0">
-                                          <p:val>
-                                            <p:fltVal val="0"/>
-                                          </p:val>
-                                        </p:tav>
-                                        <p:tav tm="100000">
-                                          <p:val>
-                                            <p:strVal val="#ppt_w"/>
-                                          </p:val>
-                                        </p:tav>
-                                      </p:tavLst>
-                                    </p:anim>
-                                    <p:anim calcmode="lin" valueType="num">
-                                      <p:cBhvr>
-                                        <p:cTn id="8" dur="500" fill="hold"/>
-                                        <p:tgtEl>
-                                          <p:spTgt spid="10"/>
-                                        </p:tgtEl>
-                                        <p:attrNameLst>
-                                          <p:attrName>ppt_h</p:attrName>
-                                        </p:attrNameLst>
-                                      </p:cBhvr>
-                                      <p:tavLst>
-                                        <p:tav tm="0">
-                                          <p:val>
-                                            <p:fltVal val="0"/>
-                                          </p:val>
-                                        </p:tav>
-                                        <p:tav tm="100000">
-                                          <p:val>
-                                            <p:strVal val="#ppt_h"/>
-                                          </p:val>
-                                        </p:tav>
-                                      </p:tavLst>
-                                    </p:anim>
-                                    <p:animEffect transition="in" filter="fade">
-                                      <p:cBhvr>
-                                        <p:cTn id="9" dur="500"/>
-                                        <p:tgtEl>
-                                          <p:spTgt spid="10"/>
-                                        </p:tgtEl>
-                                      </p:cBhvr>
-                                    </p:animEffect>
-                                  </p:childTnLst>
-                                </p:cTn>
-                              </p:par>
-                              <p:par>
-                                <p:cTn id="10" presetID="53" presetClass="entr" presetSubtype="0" fill="hold" nodeType="withEffect">
-                                  <p:stCondLst>
-                                    <p:cond delay="0"/>
-                                  </p:stCondLst>
-                                  <p:childTnLst>
-                                    <p:set>
-                                      <p:cBhvr>
-                                        <p:cTn id="11" dur="1" fill="hold">
-                                          <p:stCondLst>
-                                            <p:cond delay="0"/>
-                                          </p:stCondLst>
-                                        </p:cTn>
-                                        <p:tgtEl>
-                                          <p:spTgt spid="14"/>
-                                        </p:tgtEl>
-                                        <p:attrNameLst>
-                                          <p:attrName>style.visibility</p:attrName>
-                                        </p:attrNameLst>
-                                      </p:cBhvr>
-                                      <p:to>
-                                        <p:strVal val="visible"/>
-                                      </p:to>
-                                    </p:set>
-                                    <p:anim calcmode="lin" valueType="num">
-                                      <p:cBhvr>
-                                        <p:cTn id="12" dur="500" fill="hold"/>
-                                        <p:tgtEl>
-                                          <p:spTgt spid="14"/>
-                                        </p:tgtEl>
-                                        <p:attrNameLst>
-                                          <p:attrName>ppt_w</p:attrName>
-                                        </p:attrNameLst>
-                                      </p:cBhvr>
-                                      <p:tavLst>
-                                        <p:tav tm="0">
-                                          <p:val>
-                                            <p:fltVal val="0"/>
-                                          </p:val>
-                                        </p:tav>
-                                        <p:tav tm="100000">
-                                          <p:val>
-                                            <p:strVal val="#ppt_w"/>
-                                          </p:val>
-                                        </p:tav>
-                                      </p:tavLst>
-                                    </p:anim>
-                                    <p:anim calcmode="lin" valueType="num">
-                                      <p:cBhvr>
-                                        <p:cTn id="13" dur="500" fill="hold"/>
-                                        <p:tgtEl>
-                                          <p:spTgt spid="14"/>
-                                        </p:tgtEl>
-                                        <p:attrNameLst>
-                                          <p:attrName>ppt_h</p:attrName>
-                                        </p:attrNameLst>
-                                      </p:cBhvr>
-                                      <p:tavLst>
-                                        <p:tav tm="0">
-                                          <p:val>
-                                            <p:fltVal val="0"/>
-                                          </p:val>
-                                        </p:tav>
-                                        <p:tav tm="100000">
-                                          <p:val>
-                                            <p:strVal val="#ppt_h"/>
-                                          </p:val>
-                                        </p:tav>
-                                      </p:tavLst>
-                                    </p:anim>
-                                    <p:animEffect transition="in" filter="fade">
-                                      <p:cBhvr>
-                                        <p:cTn id="14" dur="500"/>
-                                        <p:tgtEl>
-                                          <p:spTgt spid="14"/>
-                                        </p:tgtEl>
-                                      </p:cBhvr>
-                                    </p:animEffect>
-                                  </p:childTnLst>
-                                </p:cTn>
-                              </p:par>
-                            </p:childTnLst>
-                          </p:cTn>
-                        </p:par>
-                        <p:par>
-                          <p:cTn id="15" fill="hold">
-                            <p:stCondLst>
-                              <p:cond delay="500"/>
-                            </p:stCondLst>
-                            <p:childTnLst>
-                              <p:par>
-                                <p:cTn id="16" presetID="12" presetClass="entr" presetSubtype="4" fill="hold" nodeType="afterEffect">
-                                  <p:stCondLst>
-                                    <p:cond delay="0"/>
-                                  </p:stCondLst>
-                                  <p:childTnLst>
-                                    <p:set>
-                                      <p:cBhvr>
-                                        <p:cTn id="17" dur="1" fill="hold">
-                                          <p:stCondLst>
-                                            <p:cond delay="0"/>
-                                          </p:stCondLst>
-                                        </p:cTn>
-                                        <p:tgtEl>
-                                          <p:spTgt spid="24"/>
-                                        </p:tgtEl>
-                                        <p:attrNameLst>
-                                          <p:attrName>style.visibility</p:attrName>
-                                        </p:attrNameLst>
-                                      </p:cBhvr>
-                                      <p:to>
-                                        <p:strVal val="visible"/>
-                                      </p:to>
-                                    </p:set>
-                                    <p:animEffect transition="in" filter="slide(fromBottom)">
-                                      <p:cBhvr>
-                                        <p:cTn id="18" dur="500"/>
-                                        <p:tgtEl>
-                                          <p:spTgt spid="24"/>
-                                        </p:tgtEl>
-                                      </p:cBhvr>
-                                    </p:animEffect>
-                                  </p:childTnLst>
-                                </p:cTn>
-                              </p:par>
-                            </p:childTnLst>
-                          </p:cTn>
-                        </p:par>
-                        <p:par>
-                          <p:cTn id="19" fill="hold">
-                            <p:stCondLst>
-                              <p:cond delay="1000"/>
-                            </p:stCondLst>
-                            <p:childTnLst>
-                              <p:par>
-                                <p:cTn id="20" presetID="53" presetClass="entr" presetSubtype="0" fill="hold" nodeType="afterEffect">
-                                  <p:stCondLst>
-                                    <p:cond delay="0"/>
-                                  </p:stCondLst>
-                                  <p:childTnLst>
-                                    <p:set>
-                                      <p:cBhvr>
-                                        <p:cTn id="21" dur="1" fill="hold">
-                                          <p:stCondLst>
-                                            <p:cond delay="0"/>
-                                          </p:stCondLst>
-                                        </p:cTn>
-                                        <p:tgtEl>
-                                          <p:spTgt spid="11"/>
-                                        </p:tgtEl>
-                                        <p:attrNameLst>
-                                          <p:attrName>style.visibility</p:attrName>
-                                        </p:attrNameLst>
-                                      </p:cBhvr>
-                                      <p:to>
-                                        <p:strVal val="visible"/>
-                                      </p:to>
-                                    </p:set>
-                                    <p:anim calcmode="lin" valueType="num">
-                                      <p:cBhvr>
-                                        <p:cTn id="22" dur="500" fill="hold"/>
-                                        <p:tgtEl>
-                                          <p:spTgt spid="11"/>
-                                        </p:tgtEl>
-                                        <p:attrNameLst>
-                                          <p:attrName>ppt_w</p:attrName>
-                                        </p:attrNameLst>
-                                      </p:cBhvr>
-                                      <p:tavLst>
-                                        <p:tav tm="0">
-                                          <p:val>
-                                            <p:fltVal val="0"/>
-                                          </p:val>
-                                        </p:tav>
-                                        <p:tav tm="100000">
-                                          <p:val>
-                                            <p:strVal val="#ppt_w"/>
-                                          </p:val>
-                                        </p:tav>
-                                      </p:tavLst>
-                                    </p:anim>
-                                    <p:anim calcmode="lin" valueType="num">
-                                      <p:cBhvr>
-                                        <p:cTn id="23" dur="500" fill="hold"/>
-                                        <p:tgtEl>
-                                          <p:spTgt spid="11"/>
-                                        </p:tgtEl>
-                                        <p:attrNameLst>
-                                          <p:attrName>ppt_h</p:attrName>
-                                        </p:attrNameLst>
-                                      </p:cBhvr>
-                                      <p:tavLst>
-                                        <p:tav tm="0">
-                                          <p:val>
-                                            <p:fltVal val="0"/>
-                                          </p:val>
-                                        </p:tav>
-                                        <p:tav tm="100000">
-                                          <p:val>
-                                            <p:strVal val="#ppt_h"/>
-                                          </p:val>
-                                        </p:tav>
-                                      </p:tavLst>
-                                    </p:anim>
-                                    <p:animEffect transition="in" filter="fade">
-                                      <p:cBhvr>
-                                        <p:cTn id="24" dur="500"/>
-                                        <p:tgtEl>
-                                          <p:spTgt spid="11"/>
-                                        </p:tgtEl>
-                                      </p:cBhvr>
-                                    </p:animEffect>
-                                  </p:childTnLst>
-                                </p:cTn>
-                              </p:par>
-                            </p:childTnLst>
-                          </p:cTn>
-                        </p:par>
-                        <p:par>
-                          <p:cTn id="25" fill="hold">
-                            <p:stCondLst>
-                              <p:cond delay="1500"/>
-                            </p:stCondLst>
-                            <p:childTnLst>
-                              <p:par>
-                                <p:cTn id="26" presetID="53" presetClass="entr" presetSubtype="0" fill="hold" nodeType="afterEffect">
-                                  <p:stCondLst>
-                                    <p:cond delay="0"/>
-                                  </p:stCondLst>
-                                  <p:childTnLst>
-                                    <p:set>
-                                      <p:cBhvr>
-                                        <p:cTn id="27" dur="1" fill="hold">
-                                          <p:stCondLst>
-                                            <p:cond delay="0"/>
-                                          </p:stCondLst>
-                                        </p:cTn>
-                                        <p:tgtEl>
-                                          <p:spTgt spid="18"/>
-                                        </p:tgtEl>
-                                        <p:attrNameLst>
-                                          <p:attrName>style.visibility</p:attrName>
-                                        </p:attrNameLst>
-                                      </p:cBhvr>
-                                      <p:to>
-                                        <p:strVal val="visible"/>
-                                      </p:to>
-                                    </p:set>
-                                    <p:anim calcmode="lin" valueType="num">
-                                      <p:cBhvr>
-                                        <p:cTn id="28" dur="500" fill="hold"/>
-                                        <p:tgtEl>
-                                          <p:spTgt spid="18"/>
-                                        </p:tgtEl>
-                                        <p:attrNameLst>
-                                          <p:attrName>ppt_w</p:attrName>
-                                        </p:attrNameLst>
-                                      </p:cBhvr>
-                                      <p:tavLst>
-                                        <p:tav tm="0">
-                                          <p:val>
-                                            <p:fltVal val="0"/>
-                                          </p:val>
-                                        </p:tav>
-                                        <p:tav tm="100000">
-                                          <p:val>
-                                            <p:strVal val="#ppt_w"/>
-                                          </p:val>
-                                        </p:tav>
-                                      </p:tavLst>
-                                    </p:anim>
-                                    <p:anim calcmode="lin" valueType="num">
-                                      <p:cBhvr>
-                                        <p:cTn id="29" dur="500" fill="hold"/>
-                                        <p:tgtEl>
-                                          <p:spTgt spid="18"/>
-                                        </p:tgtEl>
-                                        <p:attrNameLst>
-                                          <p:attrName>ppt_h</p:attrName>
-                                        </p:attrNameLst>
-                                      </p:cBhvr>
-                                      <p:tavLst>
-                                        <p:tav tm="0">
-                                          <p:val>
-                                            <p:fltVal val="0"/>
-                                          </p:val>
-                                        </p:tav>
-                                        <p:tav tm="100000">
-                                          <p:val>
-                                            <p:strVal val="#ppt_h"/>
-                                          </p:val>
-                                        </p:tav>
-                                      </p:tavLst>
-                                    </p:anim>
-                                    <p:animEffect transition="in" filter="fade">
-                                      <p:cBhvr>
-                                        <p:cTn id="30" dur="500"/>
-                                        <p:tgtEl>
-                                          <p:spTgt spid="18"/>
-                                        </p:tgtEl>
-                                      </p:cBhvr>
-                                    </p:animEffect>
-                                  </p:childTnLst>
-                                </p:cTn>
-                              </p:par>
-                            </p:childTnLst>
-                          </p:cTn>
-                        </p:par>
-                        <p:par>
-                          <p:cTn id="31" fill="hold">
-                            <p:stCondLst>
-                              <p:cond delay="2000"/>
-                            </p:stCondLst>
-                            <p:childTnLst>
-                              <p:par>
-                                <p:cTn id="32" presetID="12" presetClass="entr" presetSubtype="4" fill="hold" nodeType="afterEffect">
-                                  <p:stCondLst>
-                                    <p:cond delay="0"/>
-                                  </p:stCondLst>
-                                  <p:childTnLst>
-                                    <p:set>
-                                      <p:cBhvr>
-                                        <p:cTn id="33" dur="1" fill="hold">
-                                          <p:stCondLst>
-                                            <p:cond delay="0"/>
-                                          </p:stCondLst>
-                                        </p:cTn>
-                                        <p:tgtEl>
-                                          <p:spTgt spid="27"/>
-                                        </p:tgtEl>
-                                        <p:attrNameLst>
-                                          <p:attrName>style.visibility</p:attrName>
-                                        </p:attrNameLst>
-                                      </p:cBhvr>
-                                      <p:to>
-                                        <p:strVal val="visible"/>
-                                      </p:to>
-                                    </p:set>
-                                    <p:animEffect transition="in" filter="slide(fromBottom)">
-                                      <p:cBhvr>
-                                        <p:cTn id="34" dur="500"/>
-                                        <p:tgtEl>
-                                          <p:spTgt spid="27"/>
-                                        </p:tgtEl>
-                                      </p:cBhvr>
-                                    </p:animEffect>
-                                  </p:childTnLst>
-                                </p:cTn>
-                              </p:par>
-                            </p:childTnLst>
-                          </p:cTn>
-                        </p:par>
-                        <p:par>
-                          <p:cTn id="35" fill="hold">
-                            <p:stCondLst>
-                              <p:cond delay="2500"/>
-                            </p:stCondLst>
-                            <p:childTnLst>
-                              <p:par>
-                                <p:cTn id="36" presetID="53" presetClass="entr" presetSubtype="0" fill="hold" nodeType="afterEffect">
-                                  <p:stCondLst>
-                                    <p:cond delay="0"/>
-                                  </p:stCondLst>
-                                  <p:childTnLst>
-                                    <p:set>
-                                      <p:cBhvr>
-                                        <p:cTn id="37" dur="1" fill="hold">
-                                          <p:stCondLst>
-                                            <p:cond delay="0"/>
-                                          </p:stCondLst>
-                                        </p:cTn>
-                                        <p:tgtEl>
-                                          <p:spTgt spid="30"/>
-                                        </p:tgtEl>
-                                        <p:attrNameLst>
-                                          <p:attrName>style.visibility</p:attrName>
-                                        </p:attrNameLst>
-                                      </p:cBhvr>
-                                      <p:to>
-                                        <p:strVal val="visible"/>
-                                      </p:to>
-                                    </p:set>
-                                    <p:anim calcmode="lin" valueType="num">
-                                      <p:cBhvr>
-                                        <p:cTn id="38" dur="500" fill="hold"/>
-                                        <p:tgtEl>
-                                          <p:spTgt spid="30"/>
-                                        </p:tgtEl>
-                                        <p:attrNameLst>
-                                          <p:attrName>ppt_w</p:attrName>
-                                        </p:attrNameLst>
-                                      </p:cBhvr>
-                                      <p:tavLst>
-                                        <p:tav tm="0">
-                                          <p:val>
-                                            <p:fltVal val="0"/>
-                                          </p:val>
-                                        </p:tav>
-                                        <p:tav tm="100000">
-                                          <p:val>
-                                            <p:strVal val="#ppt_w"/>
-                                          </p:val>
-                                        </p:tav>
-                                      </p:tavLst>
-                                    </p:anim>
-                                    <p:anim calcmode="lin" valueType="num">
-                                      <p:cBhvr>
-                                        <p:cTn id="39" dur="500" fill="hold"/>
-                                        <p:tgtEl>
-                                          <p:spTgt spid="30"/>
-                                        </p:tgtEl>
-                                        <p:attrNameLst>
-                                          <p:attrName>ppt_h</p:attrName>
-                                        </p:attrNameLst>
-                                      </p:cBhvr>
-                                      <p:tavLst>
-                                        <p:tav tm="0">
-                                          <p:val>
-                                            <p:fltVal val="0"/>
-                                          </p:val>
-                                        </p:tav>
-                                        <p:tav tm="100000">
-                                          <p:val>
-                                            <p:strVal val="#ppt_h"/>
-                                          </p:val>
-                                        </p:tav>
-                                      </p:tavLst>
-                                    </p:anim>
-                                    <p:animEffect transition="in" filter="fade">
-                                      <p:cBhvr>
-                                        <p:cTn id="40" dur="500"/>
-                                        <p:tgtEl>
-                                          <p:spTgt spid="30"/>
-                                        </p:tgtEl>
-                                      </p:cBhvr>
-                                    </p:animEffect>
-                                  </p:childTnLst>
-                                </p:cTn>
-                              </p:par>
-                            </p:childTnLst>
-                          </p:cTn>
-                        </p:par>
-                        <p:par>
-                          <p:cTn id="41" fill="hold">
-                            <p:stCondLst>
-                              <p:cond delay="3000"/>
-                            </p:stCondLst>
-                            <p:childTnLst>
-                              <p:par>
-                                <p:cTn id="42" presetID="53" presetClass="entr" presetSubtype="0" fill="hold" nodeType="afterEffect">
-                                  <p:stCondLst>
-                                    <p:cond delay="0"/>
-                                  </p:stCondLst>
-                                  <p:childTnLst>
-                                    <p:set>
-                                      <p:cBhvr>
-                                        <p:cTn id="43" dur="1" fill="hold">
-                                          <p:stCondLst>
-                                            <p:cond delay="0"/>
-                                          </p:stCondLst>
-                                        </p:cTn>
-                                        <p:tgtEl>
-                                          <p:spTgt spid="19"/>
-                                        </p:tgtEl>
-                                        <p:attrNameLst>
-                                          <p:attrName>style.visibility</p:attrName>
-                                        </p:attrNameLst>
-                                      </p:cBhvr>
-                                      <p:to>
-                                        <p:strVal val="visible"/>
-                                      </p:to>
-                                    </p:set>
-                                    <p:anim calcmode="lin" valueType="num">
-                                      <p:cBhvr>
-                                        <p:cTn id="44" dur="500" fill="hold"/>
-                                        <p:tgtEl>
-                                          <p:spTgt spid="19"/>
-                                        </p:tgtEl>
-                                        <p:attrNameLst>
-                                          <p:attrName>ppt_w</p:attrName>
-                                        </p:attrNameLst>
-                                      </p:cBhvr>
-                                      <p:tavLst>
-                                        <p:tav tm="0">
-                                          <p:val>
-                                            <p:fltVal val="0"/>
-                                          </p:val>
-                                        </p:tav>
-                                        <p:tav tm="100000">
-                                          <p:val>
-                                            <p:strVal val="#ppt_w"/>
-                                          </p:val>
-                                        </p:tav>
-                                      </p:tavLst>
-                                    </p:anim>
-                                    <p:anim calcmode="lin" valueType="num">
-                                      <p:cBhvr>
-                                        <p:cTn id="45" dur="500" fill="hold"/>
-                                        <p:tgtEl>
-                                          <p:spTgt spid="19"/>
-                                        </p:tgtEl>
-                                        <p:attrNameLst>
-                                          <p:attrName>ppt_h</p:attrName>
-                                        </p:attrNameLst>
-                                      </p:cBhvr>
-                                      <p:tavLst>
-                                        <p:tav tm="0">
-                                          <p:val>
-                                            <p:fltVal val="0"/>
-                                          </p:val>
-                                        </p:tav>
-                                        <p:tav tm="100000">
-                                          <p:val>
-                                            <p:strVal val="#ppt_h"/>
-                                          </p:val>
-                                        </p:tav>
-                                      </p:tavLst>
-                                    </p:anim>
-                                    <p:animEffect transition="in" filter="fade">
-                                      <p:cBhvr>
-                                        <p:cTn id="46" dur="500"/>
-                                        <p:tgtEl>
-                                          <p:spTgt spid="19"/>
-                                        </p:tgtEl>
-                                      </p:cBhvr>
-                                    </p:animEffect>
-                                  </p:childTnLst>
-                                </p:cTn>
-                              </p:par>
-                            </p:childTnLst>
-                          </p:cTn>
-                        </p:par>
-                        <p:par>
-                          <p:cTn id="47" fill="hold">
-                            <p:stCondLst>
-                              <p:cond delay="3500"/>
-                            </p:stCondLst>
-                            <p:childTnLst>
-                              <p:par>
-                                <p:cTn id="48" presetID="12" presetClass="entr" presetSubtype="4" fill="hold" nodeType="afterEffect">
-                                  <p:stCondLst>
-                                    <p:cond delay="0"/>
-                                  </p:stCondLst>
-                                  <p:childTnLst>
-                                    <p:set>
-                                      <p:cBhvr>
-                                        <p:cTn id="49" dur="1" fill="hold">
-                                          <p:stCondLst>
-                                            <p:cond delay="0"/>
-                                          </p:stCondLst>
-                                        </p:cTn>
-                                        <p:tgtEl>
-                                          <p:spTgt spid="21"/>
-                                        </p:tgtEl>
-                                        <p:attrNameLst>
-                                          <p:attrName>style.visibility</p:attrName>
-                                        </p:attrNameLst>
-                                      </p:cBhvr>
-                                      <p:to>
-                                        <p:strVal val="visible"/>
-                                      </p:to>
-                                    </p:set>
-                                    <p:animEffect transition="in" filter="slide(fromBottom)">
-                                      <p:cBhvr>
-                                        <p:cTn id="50" dur="500"/>
-                                        <p:tgtEl>
-                                          <p:spTgt spid="21"/>
-                                        </p:tgtEl>
-                                      </p:cBhvr>
-                                    </p:animEffect>
-                                  </p:childTnLst>
-                                </p:cTn>
-                              </p:par>
-                            </p:childTnLst>
-                          </p:cTn>
-                        </p:par>
-                        <p:par>
-                          <p:cTn id="51" fill="hold">
-                            <p:stCondLst>
-                              <p:cond delay="4000"/>
-                            </p:stCondLst>
-                            <p:childTnLst>
-                              <p:par>
-                                <p:cTn id="52" presetID="53" presetClass="entr" presetSubtype="0" fill="hold" nodeType="afterEffect">
-                                  <p:stCondLst>
-                                    <p:cond delay="0"/>
-                                  </p:stCondLst>
-                                  <p:childTnLst>
-                                    <p:set>
-                                      <p:cBhvr>
-                                        <p:cTn id="53" dur="1" fill="hold">
-                                          <p:stCondLst>
-                                            <p:cond delay="0"/>
-                                          </p:stCondLst>
-                                        </p:cTn>
-                                        <p:tgtEl>
-                                          <p:spTgt spid="31"/>
-                                        </p:tgtEl>
-                                        <p:attrNameLst>
-                                          <p:attrName>style.visibility</p:attrName>
-                                        </p:attrNameLst>
-                                      </p:cBhvr>
-                                      <p:to>
-                                        <p:strVal val="visible"/>
-                                      </p:to>
-                                    </p:set>
-                                    <p:anim calcmode="lin" valueType="num">
-                                      <p:cBhvr>
-                                        <p:cTn id="54" dur="500" fill="hold"/>
-                                        <p:tgtEl>
-                                          <p:spTgt spid="31"/>
-                                        </p:tgtEl>
-                                        <p:attrNameLst>
-                                          <p:attrName>ppt_w</p:attrName>
-                                        </p:attrNameLst>
-                                      </p:cBhvr>
-                                      <p:tavLst>
-                                        <p:tav tm="0">
-                                          <p:val>
-                                            <p:fltVal val="0"/>
-                                          </p:val>
-                                        </p:tav>
-                                        <p:tav tm="100000">
-                                          <p:val>
-                                            <p:strVal val="#ppt_w"/>
-                                          </p:val>
-                                        </p:tav>
-                                      </p:tavLst>
-                                    </p:anim>
-                                    <p:anim calcmode="lin" valueType="num">
-                                      <p:cBhvr>
-                                        <p:cTn id="55" dur="500" fill="hold"/>
-                                        <p:tgtEl>
-                                          <p:spTgt spid="31"/>
-                                        </p:tgtEl>
-                                        <p:attrNameLst>
-                                          <p:attrName>ppt_h</p:attrName>
-                                        </p:attrNameLst>
-                                      </p:cBhvr>
-                                      <p:tavLst>
-                                        <p:tav tm="0">
-                                          <p:val>
-                                            <p:fltVal val="0"/>
-                                          </p:val>
-                                        </p:tav>
-                                        <p:tav tm="100000">
-                                          <p:val>
-                                            <p:strVal val="#ppt_h"/>
-                                          </p:val>
-                                        </p:tav>
-                                      </p:tavLst>
-                                    </p:anim>
-                                    <p:animEffect transition="in" filter="fade">
-                                      <p:cBhvr>
-                                        <p:cTn id="56" dur="500"/>
-                                        <p:tgtEl>
-                                          <p:spTgt spid="31"/>
-                                        </p:tgtEl>
-                                      </p:cBhvr>
-                                    </p:animEffect>
-                                  </p:childTnLst>
-                                </p:cTn>
-                              </p:par>
-                            </p:childTnLst>
-                          </p:cTn>
-                        </p:par>
-                        <p:par>
-                          <p:cTn id="57" fill="hold">
-                            <p:stCondLst>
-                              <p:cond delay="4500"/>
-                            </p:stCondLst>
-                            <p:childTnLst>
-                              <p:par>
-                                <p:cTn id="58" presetID="53" presetClass="entr" presetSubtype="0" fill="hold" nodeType="afterEffect">
-                                  <p:stCondLst>
-                                    <p:cond delay="0"/>
-                                  </p:stCondLst>
-                                  <p:childTnLst>
-                                    <p:set>
-                                      <p:cBhvr>
-                                        <p:cTn id="59" dur="1" fill="hold">
-                                          <p:stCondLst>
-                                            <p:cond delay="0"/>
-                                          </p:stCondLst>
-                                        </p:cTn>
-                                        <p:tgtEl>
-                                          <p:spTgt spid="20"/>
-                                        </p:tgtEl>
-                                        <p:attrNameLst>
-                                          <p:attrName>style.visibility</p:attrName>
-                                        </p:attrNameLst>
-                                      </p:cBhvr>
-                                      <p:to>
-                                        <p:strVal val="visible"/>
-                                      </p:to>
-                                    </p:set>
-                                    <p:anim calcmode="lin" valueType="num">
-                                      <p:cBhvr>
-                                        <p:cTn id="60" dur="500" fill="hold"/>
-                                        <p:tgtEl>
-                                          <p:spTgt spid="20"/>
-                                        </p:tgtEl>
-                                        <p:attrNameLst>
-                                          <p:attrName>ppt_w</p:attrName>
-                                        </p:attrNameLst>
-                                      </p:cBhvr>
-                                      <p:tavLst>
-                                        <p:tav tm="0">
-                                          <p:val>
-                                            <p:fltVal val="0"/>
-                                          </p:val>
-                                        </p:tav>
-                                        <p:tav tm="100000">
-                                          <p:val>
-                                            <p:strVal val="#ppt_w"/>
-                                          </p:val>
-                                        </p:tav>
-                                      </p:tavLst>
-                                    </p:anim>
-                                    <p:anim calcmode="lin" valueType="num">
-                                      <p:cBhvr>
-                                        <p:cTn id="61" dur="500" fill="hold"/>
-                                        <p:tgtEl>
-                                          <p:spTgt spid="20"/>
-                                        </p:tgtEl>
-                                        <p:attrNameLst>
-                                          <p:attrName>ppt_h</p:attrName>
-                                        </p:attrNameLst>
-                                      </p:cBhvr>
-                                      <p:tavLst>
-                                        <p:tav tm="0">
-                                          <p:val>
-                                            <p:fltVal val="0"/>
-                                          </p:val>
-                                        </p:tav>
-                                        <p:tav tm="100000">
-                                          <p:val>
-                                            <p:strVal val="#ppt_h"/>
-                                          </p:val>
-                                        </p:tav>
-                                      </p:tavLst>
-                                    </p:anim>
-                                    <p:animEffect transition="in" filter="fade">
-                                      <p:cBhvr>
-                                        <p:cTn id="62" dur="500"/>
-                                        <p:tgtEl>
-                                          <p:spTgt spid="20"/>
-                                        </p:tgtEl>
-                                      </p:cBhvr>
-                                    </p:animEffect>
-                                  </p:childTnLst>
-                                </p:cTn>
-                              </p:par>
-                            </p:childTnLst>
-                          </p:cTn>
-                        </p:par>
-                        <p:par>
-                          <p:cTn id="63" fill="hold">
-                            <p:stCondLst>
-                              <p:cond delay="5000"/>
-                            </p:stCondLst>
-                            <p:childTnLst>
-                              <p:par>
-                                <p:cTn id="64" presetID="12" presetClass="entr" presetSubtype="4" fill="hold" nodeType="afterEffect">
-                                  <p:stCondLst>
-                                    <p:cond delay="0"/>
-                                  </p:stCondLst>
-                                  <p:childTnLst>
-                                    <p:set>
-                                      <p:cBhvr>
-                                        <p:cTn id="65" dur="1" fill="hold">
-                                          <p:stCondLst>
-                                            <p:cond delay="0"/>
-                                          </p:stCondLst>
-                                        </p:cTn>
-                                        <p:tgtEl>
-                                          <p:spTgt spid="15"/>
-                                        </p:tgtEl>
-                                        <p:attrNameLst>
-                                          <p:attrName>style.visibility</p:attrName>
-                                        </p:attrNameLst>
-                                      </p:cBhvr>
-                                      <p:to>
-                                        <p:strVal val="visible"/>
-                                      </p:to>
-                                    </p:set>
-                                    <p:animEffect transition="in" filter="slide(fromBottom)">
-                                      <p:cBhvr>
-                                        <p:cTn id="66" dur="500"/>
-                                        <p:tgtEl>
-                                          <p:spTgt spid="15"/>
-                                        </p:tgtEl>
-                                      </p:cBhvr>
-                                    </p:animEffect>
-                                  </p:childTnLst>
-                                </p:cTn>
-                              </p:par>
-                            </p:childTnLst>
-                          </p:cTn>
-                        </p:par>
-                      </p:childTnLst>
-                    </p:cTn>
-                  </p:par>
-                </p:childTnLst>
-              </p:cTn>
-              <p:prevCondLst>
-                <p:cond evt="onPrev" delay="0">
-                  <p:tgtEl>
-                    <p:sldTgt/>
-                  </p:tgtEl>
-                </p:cond>
-              </p:prevCondLst>
-              <p:nextCondLst>
-                <p:cond evt="onNext" delay="0">
-                  <p:tgtEl>
-                    <p:sldTgt/>
-                  </p:tgtEl>
-                </p:cond>
-              </p:nextCondLst>
-            </p:seq>
-          </p:childTnLst>
-        </p:cTn>
+        <p:cTn id="1" dur="indefinite" restart="never" nodeType="tmRoot"/>
       </p:par>
     </p:tnLst>
   </p:timing>
@@ -16392,7 +15485,7 @@
     <a:masterClrMapping/>
   </p:clrMapOvr>
   <p:transition>
-    <p:push/>
+    <p:cover dir="u"/>
   </p:transition>
   <p:timing>
     <p:tnLst>
@@ -16785,7 +15878,7 @@
     <a:masterClrMapping/>
   </p:clrMapOvr>
   <p:transition>
-    <p:push/>
+    <p:cover dir="u"/>
   </p:transition>
   <p:timing>
     <p:tnLst>
@@ -16956,8 +16049,8 @@
   <p:clrMapOvr>
     <a:masterClrMapping/>
   </p:clrMapOvr>
-  <p:transition spd="med">
-    <p:push/>
+  <p:transition>
+    <p:cover dir="u"/>
   </p:transition>
   <p:timing>
     <p:tnLst>
@@ -17757,7 +16850,7 @@
     <a:masterClrMapping/>
   </p:clrMapOvr>
   <p:transition>
-    <p:push/>
+    <p:cover dir="u"/>
   </p:transition>
   <p:timing>
     <p:tnLst>
@@ -19237,7 +18330,7 @@
     <a:masterClrMapping/>
   </p:clrMapOvr>
   <p:transition>
-    <p:push/>
+    <p:cover dir="u"/>
   </p:transition>
   <p:timing>
     <p:tnLst>
@@ -19266,6 +18359,111 @@
           <a:chExt cx="0" cy="0"/>
         </a:xfrm>
       </p:grpSpPr>
+      <p:grpSp>
+        <p:nvGrpSpPr>
+          <p:cNvPr id="72" name="Skupina 71"/>
+          <p:cNvGrpSpPr/>
+          <p:nvPr/>
+        </p:nvGrpSpPr>
+        <p:grpSpPr>
+          <a:xfrm>
+            <a:off x="6804248" y="1419622"/>
+            <a:ext cx="2088232" cy="648072"/>
+            <a:chOff x="6804248" y="1851670"/>
+            <a:chExt cx="2088232" cy="648072"/>
+          </a:xfrm>
+        </p:grpSpPr>
+        <p:sp>
+          <p:nvSpPr>
+            <p:cNvPr id="73" name="Obdĺžnik s rovnostranným zaobleným rohom 72"/>
+            <p:cNvSpPr/>
+            <p:nvPr/>
+          </p:nvSpPr>
+          <p:spPr>
+            <a:xfrm rot="5400000">
+              <a:off x="7524328" y="1131590"/>
+              <a:ext cx="648072" cy="2088232"/>
+            </a:xfrm>
+            <a:prstGeom prst="round2SameRect">
+              <a:avLst/>
+            </a:prstGeom>
+            <a:solidFill>
+              <a:schemeClr val="bg1">
+                <a:lumMod val="50000"/>
+              </a:schemeClr>
+            </a:solidFill>
+            <a:ln>
+              <a:noFill/>
+            </a:ln>
+          </p:spPr>
+          <p:style>
+            <a:lnRef idx="2">
+              <a:schemeClr val="accent1">
+                <a:shade val="50000"/>
+              </a:schemeClr>
+            </a:lnRef>
+            <a:fillRef idx="1">
+              <a:schemeClr val="accent1"/>
+            </a:fillRef>
+            <a:effectRef idx="0">
+              <a:schemeClr val="accent1"/>
+            </a:effectRef>
+            <a:fontRef idx="minor">
+              <a:schemeClr val="lt1"/>
+            </a:fontRef>
+          </p:style>
+          <p:txBody>
+            <a:bodyPr rtlCol="0" anchor="ctr"/>
+            <a:lstStyle/>
+            <a:p>
+              <a:pPr algn="ctr"/>
+              <a:endParaRPr lang="sk-SK"/>
+            </a:p>
+          </p:txBody>
+        </p:sp>
+        <p:sp>
+          <p:nvSpPr>
+            <p:cNvPr id="74" name="BlokTextu 73"/>
+            <p:cNvSpPr txBox="1"/>
+            <p:nvPr/>
+          </p:nvSpPr>
+          <p:spPr>
+            <a:xfrm>
+              <a:off x="7092280" y="1851670"/>
+              <a:ext cx="1728192" cy="648072"/>
+            </a:xfrm>
+            <a:prstGeom prst="rect">
+              <a:avLst/>
+            </a:prstGeom>
+            <a:noFill/>
+          </p:spPr>
+          <p:txBody>
+            <a:bodyPr wrap="square" rtlCol="0">
+              <a:spAutoFit/>
+            </a:bodyPr>
+            <a:lstStyle/>
+            <a:p>
+              <a:r>
+                <a:rPr lang="sk-SK" sz="1200" dirty="0" smtClean="0">
+                  <a:solidFill>
+                    <a:schemeClr val="bg1"/>
+                  </a:solidFill>
+                  <a:latin typeface="Arial" pitchFamily="34" charset="0"/>
+                  <a:cs typeface="Arial" pitchFamily="34" charset="0"/>
+                </a:rPr>
+                <a:t>Možnosť priamo písať a generovať dokumentáciu</a:t>
+              </a:r>
+              <a:endParaRPr lang="sk-SK" sz="1200" dirty="0">
+                <a:solidFill>
+                  <a:schemeClr val="bg1"/>
+                </a:solidFill>
+                <a:latin typeface="Arial" pitchFamily="34" charset="0"/>
+                <a:cs typeface="Arial" pitchFamily="34" charset="0"/>
+              </a:endParaRPr>
+            </a:p>
+          </p:txBody>
+        </p:sp>
+      </p:grpSp>
       <p:grpSp>
         <p:nvGrpSpPr>
           <p:cNvPr id="82" name="Skupina 81"/>
@@ -19359,111 +18557,6 @@
                   <a:cs typeface="Arial" pitchFamily="34" charset="0"/>
                 </a:rPr>
                 <a:t>Intuitívna práca s blokmi kódu (presun metódy z jednej triedy do inej triedy ...)</a:t>
-              </a:r>
-              <a:endParaRPr lang="sk-SK" sz="1200" dirty="0">
-                <a:solidFill>
-                  <a:schemeClr val="bg1"/>
-                </a:solidFill>
-                <a:latin typeface="Arial" pitchFamily="34" charset="0"/>
-                <a:cs typeface="Arial" pitchFamily="34" charset="0"/>
-              </a:endParaRPr>
-            </a:p>
-          </p:txBody>
-        </p:sp>
-      </p:grpSp>
-      <p:grpSp>
-        <p:nvGrpSpPr>
-          <p:cNvPr id="72" name="Skupina 71"/>
-          <p:cNvGrpSpPr/>
-          <p:nvPr/>
-        </p:nvGrpSpPr>
-        <p:grpSpPr>
-          <a:xfrm>
-            <a:off x="6804248" y="1419622"/>
-            <a:ext cx="2088232" cy="648072"/>
-            <a:chOff x="6804248" y="1851670"/>
-            <a:chExt cx="2088232" cy="648072"/>
-          </a:xfrm>
-        </p:grpSpPr>
-        <p:sp>
-          <p:nvSpPr>
-            <p:cNvPr id="73" name="Obdĺžnik s rovnostranným zaobleným rohom 72"/>
-            <p:cNvSpPr/>
-            <p:nvPr/>
-          </p:nvSpPr>
-          <p:spPr>
-            <a:xfrm rot="5400000">
-              <a:off x="7524328" y="1131590"/>
-              <a:ext cx="648072" cy="2088232"/>
-            </a:xfrm>
-            <a:prstGeom prst="round2SameRect">
-              <a:avLst/>
-            </a:prstGeom>
-            <a:solidFill>
-              <a:schemeClr val="bg1">
-                <a:lumMod val="50000"/>
-              </a:schemeClr>
-            </a:solidFill>
-            <a:ln>
-              <a:noFill/>
-            </a:ln>
-          </p:spPr>
-          <p:style>
-            <a:lnRef idx="2">
-              <a:schemeClr val="accent1">
-                <a:shade val="50000"/>
-              </a:schemeClr>
-            </a:lnRef>
-            <a:fillRef idx="1">
-              <a:schemeClr val="accent1"/>
-            </a:fillRef>
-            <a:effectRef idx="0">
-              <a:schemeClr val="accent1"/>
-            </a:effectRef>
-            <a:fontRef idx="minor">
-              <a:schemeClr val="lt1"/>
-            </a:fontRef>
-          </p:style>
-          <p:txBody>
-            <a:bodyPr rtlCol="0" anchor="ctr"/>
-            <a:lstStyle/>
-            <a:p>
-              <a:pPr algn="ctr"/>
-              <a:endParaRPr lang="sk-SK"/>
-            </a:p>
-          </p:txBody>
-        </p:sp>
-        <p:sp>
-          <p:nvSpPr>
-            <p:cNvPr id="74" name="BlokTextu 73"/>
-            <p:cNvSpPr txBox="1"/>
-            <p:nvPr/>
-          </p:nvSpPr>
-          <p:spPr>
-            <a:xfrm>
-              <a:off x="7092280" y="1851670"/>
-              <a:ext cx="1728192" cy="648072"/>
-            </a:xfrm>
-            <a:prstGeom prst="rect">
-              <a:avLst/>
-            </a:prstGeom>
-            <a:noFill/>
-          </p:spPr>
-          <p:txBody>
-            <a:bodyPr wrap="square" rtlCol="0">
-              <a:spAutoFit/>
-            </a:bodyPr>
-            <a:lstStyle/>
-            <a:p>
-              <a:r>
-                <a:rPr lang="sk-SK" sz="1200" dirty="0" smtClean="0">
-                  <a:solidFill>
-                    <a:schemeClr val="bg1"/>
-                  </a:solidFill>
-                  <a:latin typeface="Arial" pitchFamily="34" charset="0"/>
-                  <a:cs typeface="Arial" pitchFamily="34" charset="0"/>
-                </a:rPr>
-                <a:t>Možnosť priamo písať a generovať dokumentáciu</a:t>
               </a:r>
               <a:endParaRPr lang="sk-SK" sz="1200" dirty="0">
                 <a:solidFill>
@@ -20045,30 +19138,6 @@
           </a:fontRef>
         </p:style>
       </p:cxnSp>
-      <p:pic>
-        <p:nvPicPr>
-          <p:cNvPr id="29" name="Obrázok 28" descr="doc.png"/>
-          <p:cNvPicPr>
-            <a:picLocks noChangeAspect="1"/>
-          </p:cNvPicPr>
-          <p:nvPr/>
-        </p:nvPicPr>
-        <p:blipFill>
-          <a:blip r:embed="rId7" cstate="print"/>
-          <a:stretch>
-            <a:fillRect/>
-          </a:stretch>
-        </p:blipFill>
-        <p:spPr>
-          <a:xfrm>
-            <a:off x="5940152" y="1203598"/>
-            <a:ext cx="1047496" cy="1008000"/>
-          </a:xfrm>
-          <a:prstGeom prst="rect">
-            <a:avLst/>
-          </a:prstGeom>
-        </p:spPr>
-      </p:pic>
       <p:sp>
         <p:nvSpPr>
           <p:cNvPr id="34" name="AutoShape 7"/>
@@ -20173,7 +19242,7 @@
           <p:nvPr/>
         </p:nvPicPr>
         <p:blipFill>
-          <a:blip r:embed="rId8" cstate="print"/>
+          <a:blip r:embed="rId7" cstate="print"/>
           <a:stretch>
             <a:fillRect/>
           </a:stretch>
@@ -20340,7 +19409,7 @@
           <p:nvPr/>
         </p:nvPicPr>
         <p:blipFill>
-          <a:blip r:embed="rId9" cstate="print"/>
+          <a:blip r:embed="rId8" cstate="print"/>
           <a:stretch>
             <a:fillRect/>
           </a:stretch>
@@ -20469,7 +19538,7 @@
           <p:nvPr/>
         </p:nvPicPr>
         <p:blipFill>
-          <a:blip r:embed="rId10" cstate="print"/>
+          <a:blip r:embed="rId9" cstate="print"/>
           <a:stretch>
             <a:fillRect/>
           </a:stretch>
@@ -20484,13 +19553,37 @@
           </a:prstGeom>
         </p:spPr>
       </p:pic>
+      <p:pic>
+        <p:nvPicPr>
+          <p:cNvPr id="29" name="Obrázok 28" descr="doc.png"/>
+          <p:cNvPicPr>
+            <a:picLocks noChangeAspect="1"/>
+          </p:cNvPicPr>
+          <p:nvPr/>
+        </p:nvPicPr>
+        <p:blipFill>
+          <a:blip r:embed="rId10" cstate="print"/>
+          <a:stretch>
+            <a:fillRect/>
+          </a:stretch>
+        </p:blipFill>
+        <p:spPr>
+          <a:xfrm>
+            <a:off x="5940152" y="1203598"/>
+            <a:ext cx="1047496" cy="1008000"/>
+          </a:xfrm>
+          <a:prstGeom prst="rect">
+            <a:avLst/>
+          </a:prstGeom>
+        </p:spPr>
+      </p:pic>
     </p:spTree>
   </p:cSld>
   <p:clrMapOvr>
     <a:masterClrMapping/>
   </p:clrMapOvr>
   <p:transition>
-    <p:push/>
+    <p:cover dir="u"/>
   </p:transition>
   <p:timing>
     <p:tnLst>
@@ -21422,24 +20515,15 @@
                                   </p:childTnLst>
                                 </p:cTn>
                               </p:par>
-                            </p:childTnLst>
-                          </p:cTn>
-                        </p:par>
-                        <p:par>
-                          <p:cTn id="71" fill="hold">
-                            <p:stCondLst>
-                              <p:cond delay="4000"/>
-                            </p:stCondLst>
-                            <p:childTnLst>
                               <p:par>
-                                <p:cTn id="72" presetID="12" presetClass="entr" presetSubtype="2" fill="hold" nodeType="afterEffect">
+                                <p:cTn id="71" presetID="12" presetClass="entr" presetSubtype="2" fill="hold" nodeType="withEffect">
                                   <p:stCondLst>
                                     <p:cond delay="0"/>
                                   </p:stCondLst>
                                   <p:childTnLst>
                                     <p:set>
                                       <p:cBhvr>
-                                        <p:cTn id="73" dur="1" fill="hold">
+                                        <p:cTn id="72" dur="1" fill="hold">
                                           <p:stCondLst>
                                             <p:cond delay="0"/>
                                           </p:stCondLst>
@@ -21457,7 +20541,7 @@
                                     </p:set>
                                     <p:animEffect transition="in" filter="slide(fromRight)">
                                       <p:cBhvr>
-                                        <p:cTn id="74" dur="500"/>
+                                        <p:cTn id="73" dur="500"/>
                                         <p:tgtEl>
                                           <p:spTgt spid="82"/>
                                         </p:tgtEl>
@@ -21466,24 +20550,15 @@
                                   </p:childTnLst>
                                 </p:cTn>
                               </p:par>
-                            </p:childTnLst>
-                          </p:cTn>
-                        </p:par>
-                        <p:par>
-                          <p:cTn id="75" fill="hold">
-                            <p:stCondLst>
-                              <p:cond delay="4500"/>
-                            </p:stCondLst>
-                            <p:childTnLst>
                               <p:par>
-                                <p:cTn id="76" presetID="12" presetClass="entr" presetSubtype="2" fill="hold" nodeType="afterEffect">
+                                <p:cTn id="74" presetID="12" presetClass="entr" presetSubtype="2" fill="hold" nodeType="withEffect">
                                   <p:stCondLst>
                                     <p:cond delay="0"/>
                                   </p:stCondLst>
                                   <p:childTnLst>
                                     <p:set>
                                       <p:cBhvr>
-                                        <p:cTn id="77" dur="1" fill="hold">
+                                        <p:cTn id="75" dur="1" fill="hold">
                                           <p:stCondLst>
                                             <p:cond delay="0"/>
                                           </p:stCondLst>
@@ -21501,7 +20576,7 @@
                                     </p:set>
                                     <p:animEffect transition="in" filter="slide(fromRight)">
                                       <p:cBhvr>
-                                        <p:cTn id="78" dur="500"/>
+                                        <p:cTn id="76" dur="500"/>
                                         <p:tgtEl>
                                           <p:spTgt spid="85"/>
                                         </p:tgtEl>
@@ -21510,24 +20585,15 @@
                                   </p:childTnLst>
                                 </p:cTn>
                               </p:par>
-                            </p:childTnLst>
-                          </p:cTn>
-                        </p:par>
-                        <p:par>
-                          <p:cTn id="79" fill="hold">
-                            <p:stCondLst>
-                              <p:cond delay="5000"/>
-                            </p:stCondLst>
-                            <p:childTnLst>
                               <p:par>
-                                <p:cTn id="80" presetID="12" presetClass="entr" presetSubtype="8" fill="hold" nodeType="afterEffect">
+                                <p:cTn id="77" presetID="12" presetClass="entr" presetSubtype="8" fill="hold" nodeType="withEffect">
                                   <p:stCondLst>
                                     <p:cond delay="0"/>
                                   </p:stCondLst>
                                   <p:childTnLst>
                                     <p:set>
                                       <p:cBhvr>
-                                        <p:cTn id="81" dur="1" fill="hold">
+                                        <p:cTn id="78" dur="1" fill="hold">
                                           <p:stCondLst>
                                             <p:cond delay="0"/>
                                           </p:stCondLst>
@@ -21545,7 +20611,7 @@
                                     </p:set>
                                     <p:animEffect transition="in" filter="slide(fromLeft)">
                                       <p:cBhvr>
-                                        <p:cTn id="82" dur="500"/>
+                                        <p:cTn id="79" dur="500"/>
                                         <p:tgtEl>
                                           <p:spTgt spid="88"/>
                                         </p:tgtEl>
@@ -21554,24 +20620,15 @@
                                   </p:childTnLst>
                                 </p:cTn>
                               </p:par>
-                            </p:childTnLst>
-                          </p:cTn>
-                        </p:par>
-                        <p:par>
-                          <p:cTn id="83" fill="hold">
-                            <p:stCondLst>
-                              <p:cond delay="5500"/>
-                            </p:stCondLst>
-                            <p:childTnLst>
                               <p:par>
-                                <p:cTn id="84" presetID="12" presetClass="entr" presetSubtype="8" fill="hold" nodeType="afterEffect">
+                                <p:cTn id="80" presetID="12" presetClass="entr" presetSubtype="8" fill="hold" nodeType="withEffect">
                                   <p:stCondLst>
                                     <p:cond delay="0"/>
                                   </p:stCondLst>
                                   <p:childTnLst>
                                     <p:set>
                                       <p:cBhvr>
-                                        <p:cTn id="85" dur="1" fill="hold">
+                                        <p:cTn id="81" dur="1" fill="hold">
                                           <p:stCondLst>
                                             <p:cond delay="0"/>
                                           </p:stCondLst>
@@ -21589,7 +20646,7 @@
                                     </p:set>
                                     <p:animEffect transition="in" filter="slide(fromLeft)">
                                       <p:cBhvr>
-                                        <p:cTn id="86" dur="500"/>
+                                        <p:cTn id="82" dur="500"/>
                                         <p:tgtEl>
                                           <p:spTgt spid="69"/>
                                         </p:tgtEl>
@@ -21598,24 +20655,15 @@
                                   </p:childTnLst>
                                 </p:cTn>
                               </p:par>
-                            </p:childTnLst>
-                          </p:cTn>
-                        </p:par>
-                        <p:par>
-                          <p:cTn id="87" fill="hold">
-                            <p:stCondLst>
-                              <p:cond delay="6000"/>
-                            </p:stCondLst>
-                            <p:childTnLst>
                               <p:par>
-                                <p:cTn id="88" presetID="12" presetClass="entr" presetSubtype="8" fill="hold" nodeType="afterEffect">
+                                <p:cTn id="83" presetID="12" presetClass="entr" presetSubtype="8" fill="hold" nodeType="withEffect">
                                   <p:stCondLst>
                                     <p:cond delay="0"/>
                                   </p:stCondLst>
                                   <p:childTnLst>
                                     <p:set>
                                       <p:cBhvr>
-                                        <p:cTn id="89" dur="1" fill="hold">
+                                        <p:cTn id="84" dur="1" fill="hold">
                                           <p:stCondLst>
                                             <p:cond delay="0"/>
                                           </p:stCondLst>
@@ -21633,7 +20681,7 @@
                                     </p:set>
                                     <p:animEffect transition="in" filter="slide(fromLeft)">
                                       <p:cBhvr>
-                                        <p:cTn id="90" dur="500"/>
+                                        <p:cTn id="85" dur="500"/>
                                         <p:tgtEl>
                                           <p:spTgt spid="72"/>
                                         </p:tgtEl>
@@ -22085,7 +21133,7 @@
     <a:masterClrMapping/>
   </p:clrMapOvr>
   <p:transition>
-    <p:push/>
+    <p:cover dir="u"/>
   </p:transition>
   <p:timing>
     <p:tnLst>
@@ -22099,6 +21147,9 @@
                     <p:cTn id="3" fill="hold">
                       <p:stCondLst>
                         <p:cond delay="indefinite"/>
+                        <p:cond evt="onBegin" delay="0">
+                          <p:tn val="2"/>
+                        </p:cond>
                       </p:stCondLst>
                       <p:childTnLst>
                         <p:par>
@@ -22108,7 +21159,7 @@
                             </p:stCondLst>
                             <p:childTnLst>
                               <p:par>
-                                <p:cTn id="5" presetID="12" presetClass="entr" presetSubtype="4" fill="hold" grpId="0" nodeType="clickEffect">
+                                <p:cTn id="5" presetID="12" presetClass="entr" presetSubtype="4" fill="hold" grpId="0" nodeType="afterEffect">
                                   <p:stCondLst>
                                     <p:cond delay="0"/>
                                   </p:stCondLst>
@@ -22145,30 +21196,21 @@
                             </p:childTnLst>
                           </p:cTn>
                         </p:par>
-                      </p:childTnLst>
-                    </p:cTn>
-                  </p:par>
-                  <p:par>
-                    <p:cTn id="8" fill="hold">
-                      <p:stCondLst>
-                        <p:cond delay="indefinite"/>
-                      </p:stCondLst>
-                      <p:childTnLst>
                         <p:par>
-                          <p:cTn id="9" fill="hold">
+                          <p:cTn id="8" fill="hold">
                             <p:stCondLst>
-                              <p:cond delay="0"/>
+                              <p:cond delay="500"/>
                             </p:stCondLst>
                             <p:childTnLst>
                               <p:par>
-                                <p:cTn id="10" presetID="53" presetClass="entr" presetSubtype="0" fill="hold" nodeType="clickEffect">
+                                <p:cTn id="9" presetID="53" presetClass="entr" presetSubtype="0" fill="hold" nodeType="afterEffect">
                                   <p:stCondLst>
                                     <p:cond delay="0"/>
                                   </p:stCondLst>
                                   <p:childTnLst>
                                     <p:set>
                                       <p:cBhvr>
-                                        <p:cTn id="11" dur="1" fill="hold">
+                                        <p:cTn id="10" dur="1" fill="hold">
                                           <p:stCondLst>
                                             <p:cond delay="0"/>
                                           </p:stCondLst>
@@ -22186,7 +21228,7 @@
                                     </p:set>
                                     <p:anim calcmode="lin" valueType="num">
                                       <p:cBhvr>
-                                        <p:cTn id="12" dur="500" fill="hold"/>
+                                        <p:cTn id="11" dur="500" fill="hold"/>
                                         <p:tgtEl>
                                           <p:spTgt spid="34"/>
                                         </p:tgtEl>
@@ -22209,7 +21251,7 @@
                                     </p:anim>
                                     <p:anim calcmode="lin" valueType="num">
                                       <p:cBhvr>
-                                        <p:cTn id="13" dur="500" fill="hold"/>
+                                        <p:cTn id="12" dur="500" fill="hold"/>
                                         <p:tgtEl>
                                           <p:spTgt spid="34"/>
                                         </p:tgtEl>
@@ -22232,9 +21274,90 @@
                                     </p:anim>
                                     <p:animEffect transition="in" filter="fade">
                                       <p:cBhvr>
-                                        <p:cTn id="14" dur="500"/>
+                                        <p:cTn id="13" dur="500"/>
                                         <p:tgtEl>
                                           <p:spTgt spid="34"/>
+                                        </p:tgtEl>
+                                      </p:cBhvr>
+                                    </p:animEffect>
+                                  </p:childTnLst>
+                                </p:cTn>
+                              </p:par>
+                              <p:par>
+                                <p:cTn id="14" presetID="53" presetClass="entr" presetSubtype="0" fill="hold" nodeType="withEffect">
+                                  <p:stCondLst>
+                                    <p:cond delay="0"/>
+                                  </p:stCondLst>
+                                  <p:childTnLst>
+                                    <p:set>
+                                      <p:cBhvr>
+                                        <p:cTn id="15" dur="1" fill="hold">
+                                          <p:stCondLst>
+                                            <p:cond delay="0"/>
+                                          </p:stCondLst>
+                                        </p:cTn>
+                                        <p:tgtEl>
+                                          <p:spTgt spid="45"/>
+                                        </p:tgtEl>
+                                        <p:attrNameLst>
+                                          <p:attrName>style.visibility</p:attrName>
+                                        </p:attrNameLst>
+                                      </p:cBhvr>
+                                      <p:to>
+                                        <p:strVal val="visible"/>
+                                      </p:to>
+                                    </p:set>
+                                    <p:anim calcmode="lin" valueType="num">
+                                      <p:cBhvr>
+                                        <p:cTn id="16" dur="500" fill="hold"/>
+                                        <p:tgtEl>
+                                          <p:spTgt spid="45"/>
+                                        </p:tgtEl>
+                                        <p:attrNameLst>
+                                          <p:attrName>ppt_w</p:attrName>
+                                        </p:attrNameLst>
+                                      </p:cBhvr>
+                                      <p:tavLst>
+                                        <p:tav tm="0">
+                                          <p:val>
+                                            <p:fltVal val="0"/>
+                                          </p:val>
+                                        </p:tav>
+                                        <p:tav tm="100000">
+                                          <p:val>
+                                            <p:strVal val="#ppt_w"/>
+                                          </p:val>
+                                        </p:tav>
+                                      </p:tavLst>
+                                    </p:anim>
+                                    <p:anim calcmode="lin" valueType="num">
+                                      <p:cBhvr>
+                                        <p:cTn id="17" dur="500" fill="hold"/>
+                                        <p:tgtEl>
+                                          <p:spTgt spid="45"/>
+                                        </p:tgtEl>
+                                        <p:attrNameLst>
+                                          <p:attrName>ppt_h</p:attrName>
+                                        </p:attrNameLst>
+                                      </p:cBhvr>
+                                      <p:tavLst>
+                                        <p:tav tm="0">
+                                          <p:val>
+                                            <p:fltVal val="0"/>
+                                          </p:val>
+                                        </p:tav>
+                                        <p:tav tm="100000">
+                                          <p:val>
+                                            <p:strVal val="#ppt_h"/>
+                                          </p:val>
+                                        </p:tav>
+                                      </p:tavLst>
+                                    </p:anim>
+                                    <p:animEffect transition="in" filter="fade">
+                                      <p:cBhvr>
+                                        <p:cTn id="18" dur="500"/>
+                                        <p:tgtEl>
+                                          <p:spTgt spid="45"/>
                                         </p:tgtEl>
                                       </p:cBhvr>
                                     </p:animEffect>
@@ -22248,26 +21371,26 @@
                     </p:cTn>
                   </p:par>
                   <p:par>
-                    <p:cTn id="15" fill="hold">
+                    <p:cTn id="19" fill="hold">
                       <p:stCondLst>
                         <p:cond delay="indefinite"/>
                       </p:stCondLst>
                       <p:childTnLst>
                         <p:par>
-                          <p:cTn id="16" fill="hold">
+                          <p:cTn id="20" fill="hold">
                             <p:stCondLst>
                               <p:cond delay="0"/>
                             </p:stCondLst>
                             <p:childTnLst>
                               <p:par>
-                                <p:cTn id="17" presetID="12" presetClass="entr" presetSubtype="8" fill="hold" grpId="0" nodeType="clickEffect">
+                                <p:cTn id="21" presetID="12" presetClass="entr" presetSubtype="8" fill="hold" grpId="0" nodeType="clickEffect">
                                   <p:stCondLst>
                                     <p:cond delay="0"/>
                                   </p:stCondLst>
                                   <p:childTnLst>
                                     <p:set>
                                       <p:cBhvr>
-                                        <p:cTn id="18" dur="1" fill="hold">
+                                        <p:cTn id="22" dur="1" fill="hold">
                                           <p:stCondLst>
                                             <p:cond delay="0"/>
                                           </p:stCondLst>
@@ -22285,7 +21408,7 @@
                                     </p:set>
                                     <p:animEffect transition="in" filter="slide(fromLeft)">
                                       <p:cBhvr>
-                                        <p:cTn id="19" dur="500"/>
+                                        <p:cTn id="23" dur="500"/>
                                         <p:tgtEl>
                                           <p:spTgt spid="35"/>
                                         </p:tgtEl>
@@ -22294,24 +21417,15 @@
                                   </p:childTnLst>
                                 </p:cTn>
                               </p:par>
-                            </p:childTnLst>
-                          </p:cTn>
-                        </p:par>
-                        <p:par>
-                          <p:cTn id="20" fill="hold">
-                            <p:stCondLst>
-                              <p:cond delay="500"/>
-                            </p:stCondLst>
-                            <p:childTnLst>
                               <p:par>
-                                <p:cTn id="21" presetID="53" presetClass="entr" presetSubtype="0" fill="hold" nodeType="afterEffect">
+                                <p:cTn id="24" presetID="53" presetClass="entr" presetSubtype="0" fill="hold" nodeType="withEffect">
                                   <p:stCondLst>
                                     <p:cond delay="0"/>
                                   </p:stCondLst>
                                   <p:childTnLst>
                                     <p:set>
                                       <p:cBhvr>
-                                        <p:cTn id="22" dur="1" fill="hold">
+                                        <p:cTn id="25" dur="1" fill="hold">
                                           <p:stCondLst>
                                             <p:cond delay="0"/>
                                           </p:stCondLst>
@@ -22329,7 +21443,7 @@
                                     </p:set>
                                     <p:anim calcmode="lin" valueType="num">
                                       <p:cBhvr>
-                                        <p:cTn id="23" dur="500" fill="hold"/>
+                                        <p:cTn id="26" dur="500" fill="hold"/>
                                         <p:tgtEl>
                                           <p:spTgt spid="50"/>
                                         </p:tgtEl>
@@ -22352,7 +21466,7 @@
                                     </p:anim>
                                     <p:anim calcmode="lin" valueType="num">
                                       <p:cBhvr>
-                                        <p:cTn id="24" dur="500" fill="hold"/>
+                                        <p:cTn id="27" dur="500" fill="hold"/>
                                         <p:tgtEl>
                                           <p:spTgt spid="50"/>
                                         </p:tgtEl>
@@ -22375,7 +21489,7 @@
                                     </p:anim>
                                     <p:animEffect transition="in" filter="fade">
                                       <p:cBhvr>
-                                        <p:cTn id="25" dur="500"/>
+                                        <p:cTn id="28" dur="500"/>
                                         <p:tgtEl>
                                           <p:spTgt spid="50"/>
                                         </p:tgtEl>
@@ -22384,114 +21498,15 @@
                                   </p:childTnLst>
                                 </p:cTn>
                               </p:par>
-                            </p:childTnLst>
-                          </p:cTn>
-                        </p:par>
-                        <p:par>
-                          <p:cTn id="26" fill="hold">
-                            <p:stCondLst>
-                              <p:cond delay="1000"/>
-                            </p:stCondLst>
-                            <p:childTnLst>
                               <p:par>
-                                <p:cTn id="27" presetID="53" presetClass="entr" presetSubtype="0" fill="hold" nodeType="afterEffect">
+                                <p:cTn id="29" presetID="53" presetClass="entr" presetSubtype="0" fill="hold" nodeType="withEffect">
                                   <p:stCondLst>
                                     <p:cond delay="0"/>
                                   </p:stCondLst>
                                   <p:childTnLst>
                                     <p:set>
                                       <p:cBhvr>
-                                        <p:cTn id="28" dur="1" fill="hold">
-                                          <p:stCondLst>
-                                            <p:cond delay="0"/>
-                                          </p:stCondLst>
-                                        </p:cTn>
-                                        <p:tgtEl>
-                                          <p:spTgt spid="45"/>
-                                        </p:tgtEl>
-                                        <p:attrNameLst>
-                                          <p:attrName>style.visibility</p:attrName>
-                                        </p:attrNameLst>
-                                      </p:cBhvr>
-                                      <p:to>
-                                        <p:strVal val="visible"/>
-                                      </p:to>
-                                    </p:set>
-                                    <p:anim calcmode="lin" valueType="num">
-                                      <p:cBhvr>
-                                        <p:cTn id="29" dur="500" fill="hold"/>
-                                        <p:tgtEl>
-                                          <p:spTgt spid="45"/>
-                                        </p:tgtEl>
-                                        <p:attrNameLst>
-                                          <p:attrName>ppt_w</p:attrName>
-                                        </p:attrNameLst>
-                                      </p:cBhvr>
-                                      <p:tavLst>
-                                        <p:tav tm="0">
-                                          <p:val>
-                                            <p:fltVal val="0"/>
-                                          </p:val>
-                                        </p:tav>
-                                        <p:tav tm="100000">
-                                          <p:val>
-                                            <p:strVal val="#ppt_w"/>
-                                          </p:val>
-                                        </p:tav>
-                                      </p:tavLst>
-                                    </p:anim>
-                                    <p:anim calcmode="lin" valueType="num">
-                                      <p:cBhvr>
-                                        <p:cTn id="30" dur="500" fill="hold"/>
-                                        <p:tgtEl>
-                                          <p:spTgt spid="45"/>
-                                        </p:tgtEl>
-                                        <p:attrNameLst>
-                                          <p:attrName>ppt_h</p:attrName>
-                                        </p:attrNameLst>
-                                      </p:cBhvr>
-                                      <p:tavLst>
-                                        <p:tav tm="0">
-                                          <p:val>
-                                            <p:fltVal val="0"/>
-                                          </p:val>
-                                        </p:tav>
-                                        <p:tav tm="100000">
-                                          <p:val>
-                                            <p:strVal val="#ppt_h"/>
-                                          </p:val>
-                                        </p:tav>
-                                      </p:tavLst>
-                                    </p:anim>
-                                    <p:animEffect transition="in" filter="fade">
-                                      <p:cBhvr>
-                                        <p:cTn id="31" dur="500"/>
-                                        <p:tgtEl>
-                                          <p:spTgt spid="45"/>
-                                        </p:tgtEl>
-                                      </p:cBhvr>
-                                    </p:animEffect>
-                                  </p:childTnLst>
-                                </p:cTn>
-                              </p:par>
-                            </p:childTnLst>
-                          </p:cTn>
-                        </p:par>
-                        <p:par>
-                          <p:cTn id="32" fill="hold">
-                            <p:stCondLst>
-                              <p:cond delay="1500"/>
-                            </p:stCondLst>
-                            <p:childTnLst>
-                              <p:par>
-                                <p:cTn id="33" presetID="53" presetClass="entr" presetSubtype="0" fill="hold" nodeType="afterEffect">
-                                  <p:stCondLst>
-                                    <p:cond delay="0"/>
-                                  </p:stCondLst>
-                                  <p:childTnLst>
-                                    <p:set>
-                                      <p:cBhvr>
-                                        <p:cTn id="34" dur="1" fill="hold">
+                                        <p:cTn id="30" dur="1" fill="hold">
                                           <p:stCondLst>
                                             <p:cond delay="0"/>
                                           </p:stCondLst>
@@ -22509,7 +21524,7 @@
                                     </p:set>
                                     <p:anim calcmode="lin" valueType="num">
                                       <p:cBhvr>
-                                        <p:cTn id="35" dur="500" fill="hold"/>
+                                        <p:cTn id="31" dur="500" fill="hold"/>
                                         <p:tgtEl>
                                           <p:spTgt spid="44"/>
                                         </p:tgtEl>
@@ -22532,7 +21547,7 @@
                                     </p:anim>
                                     <p:anim calcmode="lin" valueType="num">
                                       <p:cBhvr>
-                                        <p:cTn id="36" dur="500" fill="hold"/>
+                                        <p:cTn id="32" dur="500" fill="hold"/>
                                         <p:tgtEl>
                                           <p:spTgt spid="44"/>
                                         </p:tgtEl>
@@ -22555,7 +21570,7 @@
                                     </p:anim>
                                     <p:animEffect transition="in" filter="fade">
                                       <p:cBhvr>
-                                        <p:cTn id="37" dur="500"/>
+                                        <p:cTn id="33" dur="500"/>
                                         <p:tgtEl>
                                           <p:spTgt spid="44"/>
                                         </p:tgtEl>
@@ -23404,7 +22419,7 @@
     <a:masterClrMapping/>
   </p:clrMapOvr>
   <p:transition>
-    <p:push/>
+    <p:cover dir="u"/>
   </p:transition>
   <p:timing>
     <p:tnLst>
@@ -23507,24 +22522,15 @@
                                   </p:childTnLst>
                                 </p:cTn>
                               </p:par>
-                            </p:childTnLst>
-                          </p:cTn>
-                        </p:par>
-                        <p:par>
-                          <p:cTn id="10" fill="hold">
-                            <p:stCondLst>
-                              <p:cond delay="500"/>
-                            </p:stCondLst>
-                            <p:childTnLst>
                               <p:par>
-                                <p:cTn id="11" presetID="53" presetClass="entr" presetSubtype="0" fill="hold" nodeType="afterEffect">
+                                <p:cTn id="10" presetID="53" presetClass="entr" presetSubtype="0" fill="hold" nodeType="withEffect">
                                   <p:stCondLst>
                                     <p:cond delay="0"/>
                                   </p:stCondLst>
                                   <p:childTnLst>
                                     <p:set>
                                       <p:cBhvr>
-                                        <p:cTn id="12" dur="1" fill="hold">
+                                        <p:cTn id="11" dur="1" fill="hold">
                                           <p:stCondLst>
                                             <p:cond delay="0"/>
                                           </p:stCondLst>
@@ -23542,7 +22548,7 @@
                                     </p:set>
                                     <p:anim calcmode="lin" valueType="num">
                                       <p:cBhvr>
-                                        <p:cTn id="13" dur="500" fill="hold"/>
+                                        <p:cTn id="12" dur="500" fill="hold"/>
                                         <p:tgtEl>
                                           <p:spTgt spid="30"/>
                                         </p:tgtEl>
@@ -23565,7 +22571,7 @@
                                     </p:anim>
                                     <p:anim calcmode="lin" valueType="num">
                                       <p:cBhvr>
-                                        <p:cTn id="14" dur="500" fill="hold"/>
+                                        <p:cTn id="13" dur="500" fill="hold"/>
                                         <p:tgtEl>
                                           <p:spTgt spid="30"/>
                                         </p:tgtEl>
@@ -23588,7 +22594,7 @@
                                     </p:anim>
                                     <p:animEffect transition="in" filter="fade">
                                       <p:cBhvr>
-                                        <p:cTn id="15" dur="500"/>
+                                        <p:cTn id="14" dur="500"/>
                                         <p:tgtEl>
                                           <p:spTgt spid="30"/>
                                         </p:tgtEl>
@@ -23597,24 +22603,15 @@
                                   </p:childTnLst>
                                 </p:cTn>
                               </p:par>
-                            </p:childTnLst>
-                          </p:cTn>
-                        </p:par>
-                        <p:par>
-                          <p:cTn id="16" fill="hold">
-                            <p:stCondLst>
-                              <p:cond delay="1000"/>
-                            </p:stCondLst>
-                            <p:childTnLst>
                               <p:par>
-                                <p:cTn id="17" presetID="53" presetClass="entr" presetSubtype="0" fill="hold" nodeType="afterEffect">
+                                <p:cTn id="15" presetID="53" presetClass="entr" presetSubtype="0" fill="hold" nodeType="withEffect">
                                   <p:stCondLst>
                                     <p:cond delay="0"/>
                                   </p:stCondLst>
                                   <p:childTnLst>
                                     <p:set>
                                       <p:cBhvr>
-                                        <p:cTn id="18" dur="1" fill="hold">
+                                        <p:cTn id="16" dur="1" fill="hold">
                                           <p:stCondLst>
                                             <p:cond delay="0"/>
                                           </p:stCondLst>
@@ -23632,7 +22629,7 @@
                                     </p:set>
                                     <p:anim calcmode="lin" valueType="num">
                                       <p:cBhvr>
-                                        <p:cTn id="19" dur="500" fill="hold"/>
+                                        <p:cTn id="17" dur="500" fill="hold"/>
                                         <p:tgtEl>
                                           <p:spTgt spid="25"/>
                                         </p:tgtEl>
@@ -23655,7 +22652,7 @@
                                     </p:anim>
                                     <p:anim calcmode="lin" valueType="num">
                                       <p:cBhvr>
-                                        <p:cTn id="20" dur="500" fill="hold"/>
+                                        <p:cTn id="18" dur="500" fill="hold"/>
                                         <p:tgtEl>
                                           <p:spTgt spid="25"/>
                                         </p:tgtEl>
@@ -23678,7 +22675,7 @@
                                     </p:anim>
                                     <p:animEffect transition="in" filter="fade">
                                       <p:cBhvr>
-                                        <p:cTn id="21" dur="500"/>
+                                        <p:cTn id="19" dur="500"/>
                                         <p:tgtEl>
                                           <p:spTgt spid="25"/>
                                         </p:tgtEl>
@@ -23687,24 +22684,15 @@
                                   </p:childTnLst>
                                 </p:cTn>
                               </p:par>
-                            </p:childTnLst>
-                          </p:cTn>
-                        </p:par>
-                        <p:par>
-                          <p:cTn id="22" fill="hold">
-                            <p:stCondLst>
-                              <p:cond delay="1500"/>
-                            </p:stCondLst>
-                            <p:childTnLst>
                               <p:par>
-                                <p:cTn id="23" presetID="53" presetClass="entr" presetSubtype="0" fill="hold" nodeType="afterEffect">
+                                <p:cTn id="20" presetID="53" presetClass="entr" presetSubtype="0" fill="hold" nodeType="withEffect">
                                   <p:stCondLst>
                                     <p:cond delay="0"/>
                                   </p:stCondLst>
                                   <p:childTnLst>
                                     <p:set>
                                       <p:cBhvr>
-                                        <p:cTn id="24" dur="1" fill="hold">
+                                        <p:cTn id="21" dur="1" fill="hold">
                                           <p:stCondLst>
                                             <p:cond delay="0"/>
                                           </p:stCondLst>
@@ -23722,7 +22710,7 @@
                                     </p:set>
                                     <p:anim calcmode="lin" valueType="num">
                                       <p:cBhvr>
-                                        <p:cTn id="25" dur="500" fill="hold"/>
+                                        <p:cTn id="22" dur="500" fill="hold"/>
                                         <p:tgtEl>
                                           <p:spTgt spid="28"/>
                                         </p:tgtEl>
@@ -23745,7 +22733,7 @@
                                     </p:anim>
                                     <p:anim calcmode="lin" valueType="num">
                                       <p:cBhvr>
-                                        <p:cTn id="26" dur="500" fill="hold"/>
+                                        <p:cTn id="23" dur="500" fill="hold"/>
                                         <p:tgtEl>
                                           <p:spTgt spid="28"/>
                                         </p:tgtEl>
@@ -23768,7 +22756,7 @@
                                     </p:anim>
                                     <p:animEffect transition="in" filter="fade">
                                       <p:cBhvr>
-                                        <p:cTn id="27" dur="500"/>
+                                        <p:cTn id="24" dur="500"/>
                                         <p:tgtEl>
                                           <p:spTgt spid="28"/>
                                         </p:tgtEl>
@@ -23781,20 +22769,20 @@
                           </p:cTn>
                         </p:par>
                         <p:par>
-                          <p:cTn id="28" fill="hold">
+                          <p:cTn id="25" fill="hold">
                             <p:stCondLst>
-                              <p:cond delay="2000"/>
+                              <p:cond delay="500"/>
                             </p:stCondLst>
                             <p:childTnLst>
                               <p:par>
-                                <p:cTn id="29" presetID="8" presetClass="entr" presetSubtype="16" fill="hold" nodeType="afterEffect">
+                                <p:cTn id="26" presetID="8" presetClass="entr" presetSubtype="16" fill="hold" nodeType="afterEffect">
                                   <p:stCondLst>
                                     <p:cond delay="0"/>
                                   </p:stCondLst>
                                   <p:childTnLst>
                                     <p:set>
                                       <p:cBhvr>
-                                        <p:cTn id="30" dur="1" fill="hold">
+                                        <p:cTn id="27" dur="1" fill="hold">
                                           <p:stCondLst>
                                             <p:cond delay="0"/>
                                           </p:stCondLst>
@@ -23812,7 +22800,7 @@
                                     </p:set>
                                     <p:animEffect transition="in" filter="diamond(in)">
                                       <p:cBhvr>
-                                        <p:cTn id="31" dur="500"/>
+                                        <p:cTn id="28" dur="1000"/>
                                         <p:tgtEl>
                                           <p:spTgt spid="73"/>
                                         </p:tgtEl>
@@ -23821,24 +22809,15 @@
                                   </p:childTnLst>
                                 </p:cTn>
                               </p:par>
-                            </p:childTnLst>
-                          </p:cTn>
-                        </p:par>
-                        <p:par>
-                          <p:cTn id="32" fill="hold">
-                            <p:stCondLst>
-                              <p:cond delay="2500"/>
-                            </p:stCondLst>
-                            <p:childTnLst>
                               <p:par>
-                                <p:cTn id="33" presetID="8" presetClass="entr" presetSubtype="16" fill="hold" nodeType="afterEffect">
+                                <p:cTn id="29" presetID="8" presetClass="entr" presetSubtype="16" fill="hold" nodeType="withEffect">
                                   <p:stCondLst>
                                     <p:cond delay="0"/>
                                   </p:stCondLst>
                                   <p:childTnLst>
                                     <p:set>
                                       <p:cBhvr>
-                                        <p:cTn id="34" dur="1" fill="hold">
+                                        <p:cTn id="30" dur="1" fill="hold">
                                           <p:stCondLst>
                                             <p:cond delay="0"/>
                                           </p:stCondLst>
@@ -23856,7 +22835,7 @@
                                     </p:set>
                                     <p:animEffect transition="in" filter="diamond(in)">
                                       <p:cBhvr>
-                                        <p:cTn id="35" dur="500"/>
+                                        <p:cTn id="31" dur="1000"/>
                                         <p:tgtEl>
                                           <p:spTgt spid="57"/>
                                         </p:tgtEl>
@@ -23865,24 +22844,15 @@
                                   </p:childTnLst>
                                 </p:cTn>
                               </p:par>
-                            </p:childTnLst>
-                          </p:cTn>
-                        </p:par>
-                        <p:par>
-                          <p:cTn id="36" fill="hold">
-                            <p:stCondLst>
-                              <p:cond delay="3000"/>
-                            </p:stCondLst>
-                            <p:childTnLst>
                               <p:par>
-                                <p:cTn id="37" presetID="8" presetClass="entr" presetSubtype="16" fill="hold" nodeType="afterEffect">
+                                <p:cTn id="32" presetID="8" presetClass="entr" presetSubtype="16" fill="hold" nodeType="withEffect">
                                   <p:stCondLst>
                                     <p:cond delay="0"/>
                                   </p:stCondLst>
                                   <p:childTnLst>
                                     <p:set>
                                       <p:cBhvr>
-                                        <p:cTn id="38" dur="1" fill="hold">
+                                        <p:cTn id="33" dur="1" fill="hold">
                                           <p:stCondLst>
                                             <p:cond delay="0"/>
                                           </p:stCondLst>
@@ -23900,7 +22870,7 @@
                                     </p:set>
                                     <p:animEffect transition="in" filter="diamond(in)">
                                       <p:cBhvr>
-                                        <p:cTn id="39" dur="500"/>
+                                        <p:cTn id="34" dur="1000"/>
                                         <p:tgtEl>
                                           <p:spTgt spid="59"/>
                                         </p:tgtEl>
@@ -23909,24 +22879,15 @@
                                   </p:childTnLst>
                                 </p:cTn>
                               </p:par>
-                            </p:childTnLst>
-                          </p:cTn>
-                        </p:par>
-                        <p:par>
-                          <p:cTn id="40" fill="hold">
-                            <p:stCondLst>
-                              <p:cond delay="3500"/>
-                            </p:stCondLst>
-                            <p:childTnLst>
                               <p:par>
-                                <p:cTn id="41" presetID="8" presetClass="entr" presetSubtype="16" fill="hold" nodeType="afterEffect">
+                                <p:cTn id="35" presetID="8" presetClass="entr" presetSubtype="16" fill="hold" nodeType="withEffect">
                                   <p:stCondLst>
                                     <p:cond delay="0"/>
                                   </p:stCondLst>
                                   <p:childTnLst>
                                     <p:set>
                                       <p:cBhvr>
-                                        <p:cTn id="42" dur="1" fill="hold">
+                                        <p:cTn id="36" dur="1" fill="hold">
                                           <p:stCondLst>
                                             <p:cond delay="0"/>
                                           </p:stCondLst>
@@ -23944,7 +22905,7 @@
                                     </p:set>
                                     <p:animEffect transition="in" filter="diamond(in)">
                                       <p:cBhvr>
-                                        <p:cTn id="43" dur="500"/>
+                                        <p:cTn id="37" dur="1000"/>
                                         <p:tgtEl>
                                           <p:spTgt spid="55"/>
                                         </p:tgtEl>
@@ -23953,24 +22914,15 @@
                                   </p:childTnLst>
                                 </p:cTn>
                               </p:par>
-                            </p:childTnLst>
-                          </p:cTn>
-                        </p:par>
-                        <p:par>
-                          <p:cTn id="44" fill="hold">
-                            <p:stCondLst>
-                              <p:cond delay="4000"/>
-                            </p:stCondLst>
-                            <p:childTnLst>
                               <p:par>
-                                <p:cTn id="45" presetID="8" presetClass="entr" presetSubtype="16" fill="hold" nodeType="afterEffect">
+                                <p:cTn id="38" presetID="8" presetClass="entr" presetSubtype="16" fill="hold" nodeType="withEffect">
                                   <p:stCondLst>
                                     <p:cond delay="0"/>
                                   </p:stCondLst>
                                   <p:childTnLst>
                                     <p:set>
                                       <p:cBhvr>
-                                        <p:cTn id="46" dur="1" fill="hold">
+                                        <p:cTn id="39" dur="1" fill="hold">
                                           <p:stCondLst>
                                             <p:cond delay="0"/>
                                           </p:stCondLst>
@@ -23988,7 +22940,7 @@
                                     </p:set>
                                     <p:animEffect transition="in" filter="diamond(in)">
                                       <p:cBhvr>
-                                        <p:cTn id="47" dur="500"/>
+                                        <p:cTn id="40" dur="1000"/>
                                         <p:tgtEl>
                                           <p:spTgt spid="61"/>
                                         </p:tgtEl>
@@ -24001,20 +22953,20 @@
                           </p:cTn>
                         </p:par>
                         <p:par>
-                          <p:cTn id="48" fill="hold">
+                          <p:cTn id="41" fill="hold">
                             <p:stCondLst>
-                              <p:cond delay="4500"/>
+                              <p:cond delay="1500"/>
                             </p:stCondLst>
                             <p:childTnLst>
                               <p:par>
-                                <p:cTn id="49" presetID="53" presetClass="entr" presetSubtype="0" fill="hold" nodeType="afterEffect">
+                                <p:cTn id="42" presetID="53" presetClass="entr" presetSubtype="0" fill="hold" nodeType="afterEffect">
                                   <p:stCondLst>
                                     <p:cond delay="0"/>
                                   </p:stCondLst>
                                   <p:childTnLst>
                                     <p:set>
                                       <p:cBhvr>
-                                        <p:cTn id="50" dur="1" fill="hold">
+                                        <p:cTn id="43" dur="1" fill="hold">
                                           <p:stCondLst>
                                             <p:cond delay="0"/>
                                           </p:stCondLst>
@@ -24032,7 +22984,7 @@
                                     </p:set>
                                     <p:anim calcmode="lin" valueType="num">
                                       <p:cBhvr>
-                                        <p:cTn id="51" dur="500" fill="hold"/>
+                                        <p:cTn id="44" dur="500" fill="hold"/>
                                         <p:tgtEl>
                                           <p:spTgt spid="24"/>
                                         </p:tgtEl>
@@ -24055,7 +23007,7 @@
                                     </p:anim>
                                     <p:anim calcmode="lin" valueType="num">
                                       <p:cBhvr>
-                                        <p:cTn id="52" dur="500" fill="hold"/>
+                                        <p:cTn id="45" dur="500" fill="hold"/>
                                         <p:tgtEl>
                                           <p:spTgt spid="24"/>
                                         </p:tgtEl>
@@ -24078,7 +23030,7 @@
                                     </p:anim>
                                     <p:animEffect transition="in" filter="fade">
                                       <p:cBhvr>
-                                        <p:cTn id="53" dur="500"/>
+                                        <p:cTn id="46" dur="500"/>
                                         <p:tgtEl>
                                           <p:spTgt spid="24"/>
                                         </p:tgtEl>
@@ -24087,24 +23039,15 @@
                                   </p:childTnLst>
                                 </p:cTn>
                               </p:par>
-                            </p:childTnLst>
-                          </p:cTn>
-                        </p:par>
-                        <p:par>
-                          <p:cTn id="54" fill="hold">
-                            <p:stCondLst>
-                              <p:cond delay="5000"/>
-                            </p:stCondLst>
-                            <p:childTnLst>
                               <p:par>
-                                <p:cTn id="55" presetID="53" presetClass="entr" presetSubtype="0" fill="hold" nodeType="afterEffect">
+                                <p:cTn id="47" presetID="53" presetClass="entr" presetSubtype="0" fill="hold" nodeType="withEffect">
                                   <p:stCondLst>
                                     <p:cond delay="0"/>
                                   </p:stCondLst>
                                   <p:childTnLst>
                                     <p:set>
                                       <p:cBhvr>
-                                        <p:cTn id="56" dur="1" fill="hold">
+                                        <p:cTn id="48" dur="1" fill="hold">
                                           <p:stCondLst>
                                             <p:cond delay="0"/>
                                           </p:stCondLst>
@@ -24122,7 +23065,7 @@
                                     </p:set>
                                     <p:anim calcmode="lin" valueType="num">
                                       <p:cBhvr>
-                                        <p:cTn id="57" dur="500" fill="hold"/>
+                                        <p:cTn id="49" dur="500" fill="hold"/>
                                         <p:tgtEl>
                                           <p:spTgt spid="27"/>
                                         </p:tgtEl>
@@ -24145,7 +23088,7 @@
                                     </p:anim>
                                     <p:anim calcmode="lin" valueType="num">
                                       <p:cBhvr>
-                                        <p:cTn id="58" dur="500" fill="hold"/>
+                                        <p:cTn id="50" dur="500" fill="hold"/>
                                         <p:tgtEl>
                                           <p:spTgt spid="27"/>
                                         </p:tgtEl>
@@ -24168,7 +23111,7 @@
                                     </p:anim>
                                     <p:animEffect transition="in" filter="fade">
                                       <p:cBhvr>
-                                        <p:cTn id="59" dur="500"/>
+                                        <p:cTn id="51" dur="500"/>
                                         <p:tgtEl>
                                           <p:spTgt spid="27"/>
                                         </p:tgtEl>
@@ -24181,20 +23124,20 @@
                           </p:cTn>
                         </p:par>
                         <p:par>
-                          <p:cTn id="60" fill="hold">
+                          <p:cTn id="52" fill="hold">
                             <p:stCondLst>
-                              <p:cond delay="5500"/>
+                              <p:cond delay="2000"/>
                             </p:stCondLst>
                             <p:childTnLst>
                               <p:par>
-                                <p:cTn id="61" presetID="8" presetClass="entr" presetSubtype="16" fill="hold" nodeType="afterEffect">
+                                <p:cTn id="53" presetID="8" presetClass="entr" presetSubtype="16" fill="hold" nodeType="afterEffect">
                                   <p:stCondLst>
                                     <p:cond delay="0"/>
                                   </p:stCondLst>
                                   <p:childTnLst>
                                     <p:set>
                                       <p:cBhvr>
-                                        <p:cTn id="62" dur="1" fill="hold">
+                                        <p:cTn id="54" dur="1" fill="hold">
                                           <p:stCondLst>
                                             <p:cond delay="0"/>
                                           </p:stCondLst>
@@ -24212,7 +23155,7 @@
                                     </p:set>
                                     <p:animEffect transition="in" filter="diamond(in)">
                                       <p:cBhvr>
-                                        <p:cTn id="63" dur="500"/>
+                                        <p:cTn id="55" dur="1000"/>
                                         <p:tgtEl>
                                           <p:spTgt spid="35"/>
                                         </p:tgtEl>
@@ -24221,24 +23164,15 @@
                                   </p:childTnLst>
                                 </p:cTn>
                               </p:par>
-                            </p:childTnLst>
-                          </p:cTn>
-                        </p:par>
-                        <p:par>
-                          <p:cTn id="64" fill="hold">
-                            <p:stCondLst>
-                              <p:cond delay="6000"/>
-                            </p:stCondLst>
-                            <p:childTnLst>
                               <p:par>
-                                <p:cTn id="65" presetID="8" presetClass="entr" presetSubtype="16" fill="hold" nodeType="afterEffect">
+                                <p:cTn id="56" presetID="8" presetClass="entr" presetSubtype="16" fill="hold" nodeType="withEffect">
                                   <p:stCondLst>
                                     <p:cond delay="0"/>
                                   </p:stCondLst>
                                   <p:childTnLst>
                                     <p:set>
                                       <p:cBhvr>
-                                        <p:cTn id="66" dur="1" fill="hold">
+                                        <p:cTn id="57" dur="1" fill="hold">
                                           <p:stCondLst>
                                             <p:cond delay="0"/>
                                           </p:stCondLst>
@@ -24256,7 +23190,7 @@
                                     </p:set>
                                     <p:animEffect transition="in" filter="diamond(in)">
                                       <p:cBhvr>
-                                        <p:cTn id="67" dur="500"/>
+                                        <p:cTn id="58" dur="1000"/>
                                         <p:tgtEl>
                                           <p:spTgt spid="37"/>
                                         </p:tgtEl>
@@ -24269,20 +23203,20 @@
                           </p:cTn>
                         </p:par>
                         <p:par>
-                          <p:cTn id="68" fill="hold">
+                          <p:cTn id="59" fill="hold">
                             <p:stCondLst>
-                              <p:cond delay="6500"/>
+                              <p:cond delay="3000"/>
                             </p:stCondLst>
                             <p:childTnLst>
                               <p:par>
-                                <p:cTn id="69" presetID="53" presetClass="entr" presetSubtype="0" fill="hold" nodeType="afterEffect">
+                                <p:cTn id="60" presetID="53" presetClass="entr" presetSubtype="0" fill="hold" nodeType="afterEffect">
                                   <p:stCondLst>
                                     <p:cond delay="0"/>
                                   </p:stCondLst>
                                   <p:childTnLst>
                                     <p:set>
                                       <p:cBhvr>
-                                        <p:cTn id="70" dur="1" fill="hold">
+                                        <p:cTn id="61" dur="1" fill="hold">
                                           <p:stCondLst>
                                             <p:cond delay="0"/>
                                           </p:stCondLst>
@@ -24300,7 +23234,7 @@
                                     </p:set>
                                     <p:anim calcmode="lin" valueType="num">
                                       <p:cBhvr>
-                                        <p:cTn id="71" dur="500" fill="hold"/>
+                                        <p:cTn id="62" dur="500" fill="hold"/>
                                         <p:tgtEl>
                                           <p:spTgt spid="29"/>
                                         </p:tgtEl>
@@ -24323,7 +23257,7 @@
                                     </p:anim>
                                     <p:anim calcmode="lin" valueType="num">
                                       <p:cBhvr>
-                                        <p:cTn id="72" dur="500" fill="hold"/>
+                                        <p:cTn id="63" dur="500" fill="hold"/>
                                         <p:tgtEl>
                                           <p:spTgt spid="29"/>
                                         </p:tgtEl>
@@ -24346,7 +23280,7 @@
                                     </p:anim>
                                     <p:animEffect transition="in" filter="fade">
                                       <p:cBhvr>
-                                        <p:cTn id="73" dur="500"/>
+                                        <p:cTn id="64" dur="500"/>
                                         <p:tgtEl>
                                           <p:spTgt spid="29"/>
                                         </p:tgtEl>
@@ -24355,24 +23289,15 @@
                                   </p:childTnLst>
                                 </p:cTn>
                               </p:par>
-                            </p:childTnLst>
-                          </p:cTn>
-                        </p:par>
-                        <p:par>
-                          <p:cTn id="74" fill="hold">
-                            <p:stCondLst>
-                              <p:cond delay="7000"/>
-                            </p:stCondLst>
-                            <p:childTnLst>
                               <p:par>
-                                <p:cTn id="75" presetID="53" presetClass="entr" presetSubtype="0" fill="hold" nodeType="afterEffect">
+                                <p:cTn id="65" presetID="53" presetClass="entr" presetSubtype="0" fill="hold" nodeType="withEffect">
                                   <p:stCondLst>
                                     <p:cond delay="0"/>
                                   </p:stCondLst>
                                   <p:childTnLst>
                                     <p:set>
                                       <p:cBhvr>
-                                        <p:cTn id="76" dur="1" fill="hold">
+                                        <p:cTn id="66" dur="1" fill="hold">
                                           <p:stCondLst>
                                             <p:cond delay="0"/>
                                           </p:stCondLst>
@@ -24390,7 +23315,7 @@
                                     </p:set>
                                     <p:anim calcmode="lin" valueType="num">
                                       <p:cBhvr>
-                                        <p:cTn id="77" dur="500" fill="hold"/>
+                                        <p:cTn id="67" dur="500" fill="hold"/>
                                         <p:tgtEl>
                                           <p:spTgt spid="31"/>
                                         </p:tgtEl>
@@ -24413,7 +23338,7 @@
                                     </p:anim>
                                     <p:anim calcmode="lin" valueType="num">
                                       <p:cBhvr>
-                                        <p:cTn id="78" dur="500" fill="hold"/>
+                                        <p:cTn id="68" dur="500" fill="hold"/>
                                         <p:tgtEl>
                                           <p:spTgt spid="31"/>
                                         </p:tgtEl>
@@ -24436,7 +23361,7 @@
                                     </p:anim>
                                     <p:animEffect transition="in" filter="fade">
                                       <p:cBhvr>
-                                        <p:cTn id="79" dur="500"/>
+                                        <p:cTn id="69" dur="500"/>
                                         <p:tgtEl>
                                           <p:spTgt spid="31"/>
                                         </p:tgtEl>
@@ -24449,20 +23374,20 @@
                           </p:cTn>
                         </p:par>
                         <p:par>
-                          <p:cTn id="80" fill="hold">
+                          <p:cTn id="70" fill="hold">
                             <p:stCondLst>
-                              <p:cond delay="7500"/>
+                              <p:cond delay="3500"/>
                             </p:stCondLst>
                             <p:childTnLst>
                               <p:par>
-                                <p:cTn id="81" presetID="8" presetClass="entr" presetSubtype="16" fill="hold" nodeType="afterEffect">
+                                <p:cTn id="71" presetID="8" presetClass="entr" presetSubtype="16" fill="hold" nodeType="afterEffect">
                                   <p:stCondLst>
                                     <p:cond delay="0"/>
                                   </p:stCondLst>
                                   <p:childTnLst>
                                     <p:set>
                                       <p:cBhvr>
-                                        <p:cTn id="82" dur="1" fill="hold">
+                                        <p:cTn id="72" dur="1" fill="hold">
                                           <p:stCondLst>
                                             <p:cond delay="0"/>
                                           </p:stCondLst>
@@ -24480,7 +23405,7 @@
                                     </p:set>
                                     <p:animEffect transition="in" filter="diamond(in)">
                                       <p:cBhvr>
-                                        <p:cTn id="83" dur="500"/>
+                                        <p:cTn id="73" dur="1000"/>
                                         <p:tgtEl>
                                           <p:spTgt spid="42"/>
                                         </p:tgtEl>
@@ -24489,24 +23414,15 @@
                                   </p:childTnLst>
                                 </p:cTn>
                               </p:par>
-                            </p:childTnLst>
-                          </p:cTn>
-                        </p:par>
-                        <p:par>
-                          <p:cTn id="84" fill="hold">
-                            <p:stCondLst>
-                              <p:cond delay="8000"/>
-                            </p:stCondLst>
-                            <p:childTnLst>
                               <p:par>
-                                <p:cTn id="85" presetID="8" presetClass="entr" presetSubtype="16" fill="hold" nodeType="afterEffect">
+                                <p:cTn id="74" presetID="8" presetClass="entr" presetSubtype="16" fill="hold" nodeType="withEffect">
                                   <p:stCondLst>
                                     <p:cond delay="0"/>
                                   </p:stCondLst>
                                   <p:childTnLst>
                                     <p:set>
                                       <p:cBhvr>
-                                        <p:cTn id="86" dur="1" fill="hold">
+                                        <p:cTn id="75" dur="1" fill="hold">
                                           <p:stCondLst>
                                             <p:cond delay="0"/>
                                           </p:stCondLst>
@@ -24524,7 +23440,7 @@
                                     </p:set>
                                     <p:animEffect transition="in" filter="diamond(in)">
                                       <p:cBhvr>
-                                        <p:cTn id="87" dur="500"/>
+                                        <p:cTn id="76" dur="1000"/>
                                         <p:tgtEl>
                                           <p:spTgt spid="39"/>
                                         </p:tgtEl>
@@ -24537,20 +23453,20 @@
                           </p:cTn>
                         </p:par>
                         <p:par>
-                          <p:cTn id="88" fill="hold">
+                          <p:cTn id="77" fill="hold">
                             <p:stCondLst>
-                              <p:cond delay="8500"/>
+                              <p:cond delay="4500"/>
                             </p:stCondLst>
                             <p:childTnLst>
                               <p:par>
-                                <p:cTn id="89" presetID="53" presetClass="entr" presetSubtype="0" fill="hold" nodeType="afterEffect">
+                                <p:cTn id="78" presetID="53" presetClass="entr" presetSubtype="0" fill="hold" nodeType="afterEffect">
                                   <p:stCondLst>
                                     <p:cond delay="0"/>
                                   </p:stCondLst>
                                   <p:childTnLst>
                                     <p:set>
                                       <p:cBhvr>
-                                        <p:cTn id="90" dur="1" fill="hold">
+                                        <p:cTn id="79" dur="1" fill="hold">
                                           <p:stCondLst>
                                             <p:cond delay="0"/>
                                           </p:stCondLst>
@@ -24568,7 +23484,7 @@
                                     </p:set>
                                     <p:anim calcmode="lin" valueType="num">
                                       <p:cBhvr>
-                                        <p:cTn id="91" dur="500" fill="hold"/>
+                                        <p:cTn id="80" dur="500" fill="hold"/>
                                         <p:tgtEl>
                                           <p:spTgt spid="33"/>
                                         </p:tgtEl>
@@ -24591,7 +23507,7 @@
                                     </p:anim>
                                     <p:anim calcmode="lin" valueType="num">
                                       <p:cBhvr>
-                                        <p:cTn id="92" dur="500" fill="hold"/>
+                                        <p:cTn id="81" dur="500" fill="hold"/>
                                         <p:tgtEl>
                                           <p:spTgt spid="33"/>
                                         </p:tgtEl>
@@ -24614,7 +23530,7 @@
                                     </p:anim>
                                     <p:animEffect transition="in" filter="fade">
                                       <p:cBhvr>
-                                        <p:cTn id="93" dur="500"/>
+                                        <p:cTn id="82" dur="500"/>
                                         <p:tgtEl>
                                           <p:spTgt spid="33"/>
                                         </p:tgtEl>
@@ -24623,30 +23539,21 @@
                                   </p:childTnLst>
                                 </p:cTn>
                               </p:par>
-                            </p:childTnLst>
-                          </p:cTn>
-                        </p:par>
-                        <p:par>
-                          <p:cTn id="94" fill="hold">
-                            <p:stCondLst>
-                              <p:cond delay="9000"/>
-                            </p:stCondLst>
-                            <p:childTnLst>
                               <p:par>
-                                <p:cTn id="95" presetID="8" presetClass="entr" presetSubtype="16" fill="hold" nodeType="afterEffect">
+                                <p:cTn id="83" presetID="8" presetClass="entr" presetSubtype="16" fill="hold" nodeType="withEffect">
                                   <p:stCondLst>
                                     <p:cond delay="0"/>
                                   </p:stCondLst>
                                   <p:childTnLst>
                                     <p:set>
                                       <p:cBhvr>
-                                        <p:cTn id="96" dur="1" fill="hold">
+                                        <p:cTn id="84" dur="1" fill="hold">
                                           <p:stCondLst>
                                             <p:cond delay="0"/>
                                           </p:stCondLst>
                                         </p:cTn>
                                         <p:tgtEl>
-                                          <p:spTgt spid="45"/>
+                                          <p:spTgt spid="48"/>
                                         </p:tgtEl>
                                         <p:attrNameLst>
                                           <p:attrName>style.visibility</p:attrName>
@@ -24658,9 +23565,9 @@
                                     </p:set>
                                     <p:animEffect transition="in" filter="diamond(in)">
                                       <p:cBhvr>
-                                        <p:cTn id="97" dur="500"/>
+                                        <p:cTn id="85" dur="1000"/>
                                         <p:tgtEl>
-                                          <p:spTgt spid="45"/>
+                                          <p:spTgt spid="48"/>
                                         </p:tgtEl>
                                       </p:cBhvr>
                                     </p:animEffect>
@@ -24671,20 +23578,20 @@
                           </p:cTn>
                         </p:par>
                         <p:par>
-                          <p:cTn id="98" fill="hold">
+                          <p:cTn id="86" fill="hold">
                             <p:stCondLst>
-                              <p:cond delay="9500"/>
+                              <p:cond delay="5500"/>
                             </p:stCondLst>
                             <p:childTnLst>
                               <p:par>
-                                <p:cTn id="99" presetID="53" presetClass="entr" presetSubtype="0" fill="hold" nodeType="afterEffect">
+                                <p:cTn id="87" presetID="53" presetClass="entr" presetSubtype="0" fill="hold" nodeType="afterEffect">
                                   <p:stCondLst>
                                     <p:cond delay="0"/>
                                   </p:stCondLst>
                                   <p:childTnLst>
                                     <p:set>
                                       <p:cBhvr>
-                                        <p:cTn id="100" dur="1" fill="hold">
+                                        <p:cTn id="88" dur="1" fill="hold">
                                           <p:stCondLst>
                                             <p:cond delay="0"/>
                                           </p:stCondLst>
@@ -24702,7 +23609,7 @@
                                     </p:set>
                                     <p:anim calcmode="lin" valueType="num">
                                       <p:cBhvr>
-                                        <p:cTn id="101" dur="500" fill="hold"/>
+                                        <p:cTn id="89" dur="500" fill="hold"/>
                                         <p:tgtEl>
                                           <p:spTgt spid="26"/>
                                         </p:tgtEl>
@@ -24725,7 +23632,7 @@
                                     </p:anim>
                                     <p:anim calcmode="lin" valueType="num">
                                       <p:cBhvr>
-                                        <p:cTn id="102" dur="500" fill="hold"/>
+                                        <p:cTn id="90" dur="500" fill="hold"/>
                                         <p:tgtEl>
                                           <p:spTgt spid="26"/>
                                         </p:tgtEl>
@@ -24748,7 +23655,7 @@
                                     </p:anim>
                                     <p:animEffect transition="in" filter="fade">
                                       <p:cBhvr>
-                                        <p:cTn id="103" dur="500"/>
+                                        <p:cTn id="91" dur="500"/>
                                         <p:tgtEl>
                                           <p:spTgt spid="26"/>
                                         </p:tgtEl>
@@ -24757,30 +23664,21 @@
                                   </p:childTnLst>
                                 </p:cTn>
                               </p:par>
-                            </p:childTnLst>
-                          </p:cTn>
-                        </p:par>
-                        <p:par>
-                          <p:cTn id="104" fill="hold">
-                            <p:stCondLst>
-                              <p:cond delay="10000"/>
-                            </p:stCondLst>
-                            <p:childTnLst>
                               <p:par>
-                                <p:cTn id="105" presetID="8" presetClass="entr" presetSubtype="16" fill="hold" nodeType="afterEffect">
+                                <p:cTn id="92" presetID="8" presetClass="entr" presetSubtype="16" fill="hold" nodeType="withEffect">
                                   <p:stCondLst>
                                     <p:cond delay="0"/>
                                   </p:stCondLst>
                                   <p:childTnLst>
                                     <p:set>
                                       <p:cBhvr>
-                                        <p:cTn id="106" dur="1" fill="hold">
+                                        <p:cTn id="93" dur="1" fill="hold">
                                           <p:stCondLst>
                                             <p:cond delay="0"/>
                                           </p:stCondLst>
                                         </p:cTn>
                                         <p:tgtEl>
-                                          <p:spTgt spid="48"/>
+                                          <p:spTgt spid="45"/>
                                         </p:tgtEl>
                                         <p:attrNameLst>
                                           <p:attrName>style.visibility</p:attrName>
@@ -24792,9 +23690,9 @@
                                     </p:set>
                                     <p:animEffect transition="in" filter="diamond(in)">
                                       <p:cBhvr>
-                                        <p:cTn id="107" dur="500"/>
+                                        <p:cTn id="94" dur="1000"/>
                                         <p:tgtEl>
-                                          <p:spTgt spid="48"/>
+                                          <p:spTgt spid="45"/>
                                         </p:tgtEl>
                                       </p:cBhvr>
                                     </p:animEffect>
@@ -28134,7 +27032,7 @@
     <a:masterClrMapping/>
   </p:clrMapOvr>
   <p:transition>
-    <p:push/>
+    <p:cover dir="u"/>
   </p:transition>
   <p:timing>
     <p:tnLst>
@@ -29900,7 +28798,7 @@
     <a:masterClrMapping/>
   </p:clrMapOvr>
   <p:transition>
-    <p:push/>
+    <p:cover dir="u"/>
   </p:transition>
   <p:timing>
     <p:tnLst>
@@ -31203,7 +30101,7 @@
     <a:masterClrMapping/>
   </p:clrMapOvr>
   <p:transition>
-    <p:push/>
+    <p:cover dir="u"/>
   </p:transition>
   <p:timing>
     <p:tnLst>
@@ -31217,6 +30115,9 @@
                     <p:cTn id="3" fill="hold">
                       <p:stCondLst>
                         <p:cond delay="indefinite"/>
+                        <p:cond evt="onBegin" delay="0">
+                          <p:tn val="2"/>
+                        </p:cond>
                       </p:stCondLst>
                       <p:childTnLst>
                         <p:par>
@@ -31226,7 +30127,7 @@
                             </p:stCondLst>
                             <p:childTnLst>
                               <p:par>
-                                <p:cTn id="5" presetID="12" presetClass="entr" presetSubtype="4" fill="hold" nodeType="clickEffect">
+                                <p:cTn id="5" presetID="12" presetClass="entr" presetSubtype="4" fill="hold" nodeType="afterEffect">
                                   <p:stCondLst>
                                     <p:cond delay="0"/>
                                   </p:stCondLst>
@@ -31274,7 +30175,7 @@
                                           </p:stCondLst>
                                         </p:cTn>
                                         <p:tgtEl>
-                                          <p:spTgt spid="16"/>
+                                          <p:spTgt spid="41"/>
                                         </p:tgtEl>
                                         <p:attrNameLst>
                                           <p:attrName>style.visibility</p:attrName>
@@ -31288,37 +30189,28 @@
                                       <p:cBhvr>
                                         <p:cTn id="10" dur="500"/>
                                         <p:tgtEl>
-                                          <p:spTgt spid="16"/>
+                                          <p:spTgt spid="41"/>
                                         </p:tgtEl>
                                       </p:cBhvr>
                                     </p:animEffect>
                                   </p:childTnLst>
                                 </p:cTn>
                               </p:par>
-                            </p:childTnLst>
-                          </p:cTn>
-                        </p:par>
-                        <p:par>
-                          <p:cTn id="11" fill="hold">
-                            <p:stCondLst>
-                              <p:cond delay="500"/>
-                            </p:stCondLst>
-                            <p:childTnLst>
                               <p:par>
-                                <p:cTn id="12" presetID="12" presetClass="entr" presetSubtype="4" fill="hold" nodeType="afterEffect">
+                                <p:cTn id="11" presetID="12" presetClass="entr" presetSubtype="4" fill="hold" nodeType="withEffect">
                                   <p:stCondLst>
                                     <p:cond delay="0"/>
                                   </p:stCondLst>
                                   <p:childTnLst>
                                     <p:set>
                                       <p:cBhvr>
-                                        <p:cTn id="13" dur="1" fill="hold">
+                                        <p:cTn id="12" dur="1" fill="hold">
                                           <p:stCondLst>
                                             <p:cond delay="0"/>
                                           </p:stCondLst>
                                         </p:cTn>
                                         <p:tgtEl>
-                                          <p:spTgt spid="41"/>
+                                          <p:spTgt spid="42"/>
                                         </p:tgtEl>
                                         <p:attrNameLst>
                                           <p:attrName>style.visibility</p:attrName>
@@ -31330,9 +30222,79 @@
                                     </p:set>
                                     <p:animEffect transition="in" filter="slide(fromBottom)">
                                       <p:cBhvr>
-                                        <p:cTn id="14" dur="500"/>
+                                        <p:cTn id="13" dur="500"/>
                                         <p:tgtEl>
-                                          <p:spTgt spid="41"/>
+                                          <p:spTgt spid="42"/>
+                                        </p:tgtEl>
+                                      </p:cBhvr>
+                                    </p:animEffect>
+                                  </p:childTnLst>
+                                </p:cTn>
+                              </p:par>
+                              <p:par>
+                                <p:cTn id="14" presetID="12" presetClass="entr" presetSubtype="4" fill="hold" nodeType="withEffect">
+                                  <p:stCondLst>
+                                    <p:cond delay="0"/>
+                                  </p:stCondLst>
+                                  <p:childTnLst>
+                                    <p:set>
+                                      <p:cBhvr>
+                                        <p:cTn id="15" dur="1" fill="hold">
+                                          <p:stCondLst>
+                                            <p:cond delay="0"/>
+                                          </p:stCondLst>
+                                        </p:cTn>
+                                        <p:tgtEl>
+                                          <p:spTgt spid="43"/>
+                                        </p:tgtEl>
+                                        <p:attrNameLst>
+                                          <p:attrName>style.visibility</p:attrName>
+                                        </p:attrNameLst>
+                                      </p:cBhvr>
+                                      <p:to>
+                                        <p:strVal val="visible"/>
+                                      </p:to>
+                                    </p:set>
+                                    <p:animEffect transition="in" filter="slide(fromBottom)">
+                                      <p:cBhvr>
+                                        <p:cTn id="16" dur="500"/>
+                                        <p:tgtEl>
+                                          <p:spTgt spid="43"/>
+                                        </p:tgtEl>
+                                      </p:cBhvr>
+                                    </p:animEffect>
+                                  </p:childTnLst>
+                                </p:cTn>
+                              </p:par>
+                              <p:par>
+                                <p:cTn id="17" presetID="12" presetClass="entr" presetSubtype="4" fill="hold" nodeType="withEffect">
+                                  <p:stCondLst>
+                                    <p:cond delay="0"/>
+                                  </p:stCondLst>
+                                  <p:childTnLst>
+                                    <p:set>
+                                      <p:cBhvr>
+                                        <p:cTn id="18" dur="1" fill="hold">
+                                          <p:stCondLst>
+                                            <p:cond delay="0"/>
+                                          </p:stCondLst>
+                                        </p:cTn>
+                                        <p:tgtEl>
+                                          <p:spTgt spid="44"/>
+                                        </p:tgtEl>
+                                        <p:attrNameLst>
+                                          <p:attrName>style.visibility</p:attrName>
+                                        </p:attrNameLst>
+                                      </p:cBhvr>
+                                      <p:to>
+                                        <p:strVal val="visible"/>
+                                      </p:to>
+                                    </p:set>
+                                    <p:animEffect transition="in" filter="slide(fromBottom)">
+                                      <p:cBhvr>
+                                        <p:cTn id="19" dur="500"/>
+                                        <p:tgtEl>
+                                          <p:spTgt spid="44"/>
                                         </p:tgtEl>
                                       </p:cBhvr>
                                     </p:animEffect>
@@ -31343,20 +30305,55 @@
                           </p:cTn>
                         </p:par>
                         <p:par>
-                          <p:cTn id="15" fill="hold">
+                          <p:cTn id="20" fill="hold">
                             <p:stCondLst>
-                              <p:cond delay="1000"/>
+                              <p:cond delay="500"/>
                             </p:stCondLst>
                             <p:childTnLst>
                               <p:par>
-                                <p:cTn id="16" presetID="12" presetClass="entr" presetSubtype="4" fill="hold" nodeType="afterEffect">
+                                <p:cTn id="21" presetID="12" presetClass="entr" presetSubtype="4" fill="hold" nodeType="afterEffect">
                                   <p:stCondLst>
                                     <p:cond delay="0"/>
                                   </p:stCondLst>
                                   <p:childTnLst>
                                     <p:set>
                                       <p:cBhvr>
-                                        <p:cTn id="17" dur="1" fill="hold">
+                                        <p:cTn id="22" dur="1" fill="hold">
+                                          <p:stCondLst>
+                                            <p:cond delay="0"/>
+                                          </p:stCondLst>
+                                        </p:cTn>
+                                        <p:tgtEl>
+                                          <p:spTgt spid="16"/>
+                                        </p:tgtEl>
+                                        <p:attrNameLst>
+                                          <p:attrName>style.visibility</p:attrName>
+                                        </p:attrNameLst>
+                                      </p:cBhvr>
+                                      <p:to>
+                                        <p:strVal val="visible"/>
+                                      </p:to>
+                                    </p:set>
+                                    <p:animEffect transition="in" filter="slide(fromBottom)">
+                                      <p:cBhvr>
+                                        <p:cTn id="23" dur="500"/>
+                                        <p:tgtEl>
+                                          <p:spTgt spid="16"/>
+                                        </p:tgtEl>
+                                      </p:cBhvr>
+                                    </p:animEffect>
+                                  </p:childTnLst>
+                                </p:cTn>
+                              </p:par>
+                              <p:par>
+                                <p:cTn id="24" presetID="12" presetClass="entr" presetSubtype="4" fill="hold" nodeType="withEffect">
+                                  <p:stCondLst>
+                                    <p:cond delay="0"/>
+                                  </p:stCondLst>
+                                  <p:childTnLst>
+                                    <p:set>
+                                      <p:cBhvr>
+                                        <p:cTn id="25" dur="1" fill="hold">
                                           <p:stCondLst>
                                             <p:cond delay="0"/>
                                           </p:stCondLst>
@@ -31374,7 +30371,7 @@
                                     </p:set>
                                     <p:animEffect transition="in" filter="slide(fromBottom)">
                                       <p:cBhvr>
-                                        <p:cTn id="18" dur="500"/>
+                                        <p:cTn id="26" dur="500"/>
                                         <p:tgtEl>
                                           <p:spTgt spid="25"/>
                                         </p:tgtEl>
@@ -31383,68 +30380,15 @@
                                   </p:childTnLst>
                                 </p:cTn>
                               </p:par>
-                            </p:childTnLst>
-                          </p:cTn>
-                        </p:par>
-                        <p:par>
-                          <p:cTn id="19" fill="hold">
-                            <p:stCondLst>
-                              <p:cond delay="1500"/>
-                            </p:stCondLst>
-                            <p:childTnLst>
                               <p:par>
-                                <p:cTn id="20" presetID="12" presetClass="entr" presetSubtype="4" fill="hold" nodeType="afterEffect">
+                                <p:cTn id="27" presetID="12" presetClass="entr" presetSubtype="4" fill="hold" nodeType="withEffect">
                                   <p:stCondLst>
                                     <p:cond delay="0"/>
                                   </p:stCondLst>
                                   <p:childTnLst>
                                     <p:set>
                                       <p:cBhvr>
-                                        <p:cTn id="21" dur="1" fill="hold">
-                                          <p:stCondLst>
-                                            <p:cond delay="0"/>
-                                          </p:stCondLst>
-                                        </p:cTn>
-                                        <p:tgtEl>
-                                          <p:spTgt spid="42"/>
-                                        </p:tgtEl>
-                                        <p:attrNameLst>
-                                          <p:attrName>style.visibility</p:attrName>
-                                        </p:attrNameLst>
-                                      </p:cBhvr>
-                                      <p:to>
-                                        <p:strVal val="visible"/>
-                                      </p:to>
-                                    </p:set>
-                                    <p:animEffect transition="in" filter="slide(fromBottom)">
-                                      <p:cBhvr>
-                                        <p:cTn id="22" dur="500"/>
-                                        <p:tgtEl>
-                                          <p:spTgt spid="42"/>
-                                        </p:tgtEl>
-                                      </p:cBhvr>
-                                    </p:animEffect>
-                                  </p:childTnLst>
-                                </p:cTn>
-                              </p:par>
-                            </p:childTnLst>
-                          </p:cTn>
-                        </p:par>
-                        <p:par>
-                          <p:cTn id="23" fill="hold">
-                            <p:stCondLst>
-                              <p:cond delay="2000"/>
-                            </p:stCondLst>
-                            <p:childTnLst>
-                              <p:par>
-                                <p:cTn id="24" presetID="12" presetClass="entr" presetSubtype="4" fill="hold" nodeType="afterEffect">
-                                  <p:stCondLst>
-                                    <p:cond delay="0"/>
-                                  </p:stCondLst>
-                                  <p:childTnLst>
-                                    <p:set>
-                                      <p:cBhvr>
-                                        <p:cTn id="25" dur="1" fill="hold">
+                                        <p:cTn id="28" dur="1" fill="hold">
                                           <p:stCondLst>
                                             <p:cond delay="0"/>
                                           </p:stCondLst>
@@ -31462,7 +30406,7 @@
                                     </p:set>
                                     <p:animEffect transition="in" filter="slide(fromBottom)">
                                       <p:cBhvr>
-                                        <p:cTn id="26" dur="500"/>
+                                        <p:cTn id="29" dur="500"/>
                                         <p:tgtEl>
                                           <p:spTgt spid="22"/>
                                         </p:tgtEl>
@@ -31471,68 +30415,15 @@
                                   </p:childTnLst>
                                 </p:cTn>
                               </p:par>
-                            </p:childTnLst>
-                          </p:cTn>
-                        </p:par>
-                        <p:par>
-                          <p:cTn id="27" fill="hold">
-                            <p:stCondLst>
-                              <p:cond delay="2500"/>
-                            </p:stCondLst>
-                            <p:childTnLst>
                               <p:par>
-                                <p:cTn id="28" presetID="12" presetClass="entr" presetSubtype="4" fill="hold" nodeType="afterEffect">
+                                <p:cTn id="30" presetID="12" presetClass="entr" presetSubtype="4" fill="hold" nodeType="withEffect">
                                   <p:stCondLst>
                                     <p:cond delay="0"/>
                                   </p:stCondLst>
                                   <p:childTnLst>
                                     <p:set>
                                       <p:cBhvr>
-                                        <p:cTn id="29" dur="1" fill="hold">
-                                          <p:stCondLst>
-                                            <p:cond delay="0"/>
-                                          </p:stCondLst>
-                                        </p:cTn>
-                                        <p:tgtEl>
-                                          <p:spTgt spid="43"/>
-                                        </p:tgtEl>
-                                        <p:attrNameLst>
-                                          <p:attrName>style.visibility</p:attrName>
-                                        </p:attrNameLst>
-                                      </p:cBhvr>
-                                      <p:to>
-                                        <p:strVal val="visible"/>
-                                      </p:to>
-                                    </p:set>
-                                    <p:animEffect transition="in" filter="slide(fromBottom)">
-                                      <p:cBhvr>
-                                        <p:cTn id="30" dur="500"/>
-                                        <p:tgtEl>
-                                          <p:spTgt spid="43"/>
-                                        </p:tgtEl>
-                                      </p:cBhvr>
-                                    </p:animEffect>
-                                  </p:childTnLst>
-                                </p:cTn>
-                              </p:par>
-                            </p:childTnLst>
-                          </p:cTn>
-                        </p:par>
-                        <p:par>
-                          <p:cTn id="31" fill="hold">
-                            <p:stCondLst>
-                              <p:cond delay="3000"/>
-                            </p:stCondLst>
-                            <p:childTnLst>
-                              <p:par>
-                                <p:cTn id="32" presetID="12" presetClass="entr" presetSubtype="4" fill="hold" nodeType="afterEffect">
-                                  <p:stCondLst>
-                                    <p:cond delay="0"/>
-                                  </p:stCondLst>
-                                  <p:childTnLst>
-                                    <p:set>
-                                      <p:cBhvr>
-                                        <p:cTn id="33" dur="1" fill="hold">
+                                        <p:cTn id="31" dur="1" fill="hold">
                                           <p:stCondLst>
                                             <p:cond delay="0"/>
                                           </p:stCondLst>
@@ -31550,7 +30441,7 @@
                                     </p:set>
                                     <p:animEffect transition="in" filter="slide(fromBottom)">
                                       <p:cBhvr>
-                                        <p:cTn id="34" dur="500"/>
+                                        <p:cTn id="32" dur="500"/>
                                         <p:tgtEl>
                                           <p:spTgt spid="28"/>
                                         </p:tgtEl>
@@ -31559,68 +30450,15 @@
                                   </p:childTnLst>
                                 </p:cTn>
                               </p:par>
-                            </p:childTnLst>
-                          </p:cTn>
-                        </p:par>
-                        <p:par>
-                          <p:cTn id="35" fill="hold">
-                            <p:stCondLst>
-                              <p:cond delay="3500"/>
-                            </p:stCondLst>
-                            <p:childTnLst>
                               <p:par>
-                                <p:cTn id="36" presetID="12" presetClass="entr" presetSubtype="4" fill="hold" nodeType="afterEffect">
+                                <p:cTn id="33" presetID="12" presetClass="entr" presetSubtype="4" fill="hold" nodeType="withEffect">
                                   <p:stCondLst>
                                     <p:cond delay="0"/>
                                   </p:stCondLst>
                                   <p:childTnLst>
                                     <p:set>
                                       <p:cBhvr>
-                                        <p:cTn id="37" dur="1" fill="hold">
-                                          <p:stCondLst>
-                                            <p:cond delay="0"/>
-                                          </p:stCondLst>
-                                        </p:cTn>
-                                        <p:tgtEl>
-                                          <p:spTgt spid="44"/>
-                                        </p:tgtEl>
-                                        <p:attrNameLst>
-                                          <p:attrName>style.visibility</p:attrName>
-                                        </p:attrNameLst>
-                                      </p:cBhvr>
-                                      <p:to>
-                                        <p:strVal val="visible"/>
-                                      </p:to>
-                                    </p:set>
-                                    <p:animEffect transition="in" filter="slide(fromBottom)">
-                                      <p:cBhvr>
-                                        <p:cTn id="38" dur="500"/>
-                                        <p:tgtEl>
-                                          <p:spTgt spid="44"/>
-                                        </p:tgtEl>
-                                      </p:cBhvr>
-                                    </p:animEffect>
-                                  </p:childTnLst>
-                                </p:cTn>
-                              </p:par>
-                            </p:childTnLst>
-                          </p:cTn>
-                        </p:par>
-                        <p:par>
-                          <p:cTn id="39" fill="hold">
-                            <p:stCondLst>
-                              <p:cond delay="4000"/>
-                            </p:stCondLst>
-                            <p:childTnLst>
-                              <p:par>
-                                <p:cTn id="40" presetID="12" presetClass="entr" presetSubtype="4" fill="hold" nodeType="afterEffect">
-                                  <p:stCondLst>
-                                    <p:cond delay="0"/>
-                                  </p:stCondLst>
-                                  <p:childTnLst>
-                                    <p:set>
-                                      <p:cBhvr>
-                                        <p:cTn id="41" dur="1" fill="hold">
+                                        <p:cTn id="34" dur="1" fill="hold">
                                           <p:stCondLst>
                                             <p:cond delay="0"/>
                                           </p:stCondLst>
@@ -31638,7 +30476,7 @@
                                     </p:set>
                                     <p:animEffect transition="in" filter="slide(fromBottom)">
                                       <p:cBhvr>
-                                        <p:cTn id="42" dur="500"/>
+                                        <p:cTn id="35" dur="500"/>
                                         <p:tgtEl>
                                           <p:spTgt spid="31"/>
                                         </p:tgtEl>
@@ -31647,24 +30485,15 @@
                                   </p:childTnLst>
                                 </p:cTn>
                               </p:par>
-                            </p:childTnLst>
-                          </p:cTn>
-                        </p:par>
-                        <p:par>
-                          <p:cTn id="43" fill="hold">
-                            <p:stCondLst>
-                              <p:cond delay="4500"/>
-                            </p:stCondLst>
-                            <p:childTnLst>
                               <p:par>
-                                <p:cTn id="44" presetID="12" presetClass="entr" presetSubtype="4" fill="hold" nodeType="afterEffect">
+                                <p:cTn id="36" presetID="12" presetClass="entr" presetSubtype="4" fill="hold" nodeType="withEffect">
                                   <p:stCondLst>
                                     <p:cond delay="0"/>
                                   </p:stCondLst>
                                   <p:childTnLst>
                                     <p:set>
                                       <p:cBhvr>
-                                        <p:cTn id="45" dur="1" fill="hold">
+                                        <p:cTn id="37" dur="1" fill="hold">
                                           <p:stCondLst>
                                             <p:cond delay="0"/>
                                           </p:stCondLst>
@@ -31682,7 +30511,7 @@
                                     </p:set>
                                     <p:animEffect transition="in" filter="slide(fromBottom)">
                                       <p:cBhvr>
-                                        <p:cTn id="46" dur="500"/>
+                                        <p:cTn id="38" dur="500"/>
                                         <p:tgtEl>
                                           <p:spTgt spid="35"/>
                                         </p:tgtEl>

</xml_diff>